<commit_message>
versión final antes de ensayo general
</commit_message>
<xml_diff>
--- a/Defensa/presentaciónFinal_v2.pptx
+++ b/Defensa/presentaciónFinal_v2.pptx
@@ -39,14 +39,14 @@
   <p:notesSz cx="6858000" cy="9144000"/>
   <p:embeddedFontLst>
     <p:embeddedFont>
-      <p:font typeface="Quattrocento Sans" charset="0"/>
+      <p:font typeface="Lora" panose="020B0604020202020204" charset="0"/>
       <p:regular r:id="rId29"/>
       <p:bold r:id="rId30"/>
       <p:italic r:id="rId31"/>
       <p:boldItalic r:id="rId32"/>
     </p:embeddedFont>
     <p:embeddedFont>
-      <p:font typeface="Lora" charset="0"/>
+      <p:font typeface="Quattrocento Sans" panose="020B0604020202020204" charset="0"/>
       <p:regular r:id="rId33"/>
       <p:bold r:id="rId34"/>
       <p:italic r:id="rId35"/>
@@ -284,7 +284,7 @@
   </p:defaultTextStyle>
   <p:extLst>
     <p:ext uri="{EFAFB233-063F-42B5-8137-9DF3F51BA10A}">
-      <p15:sldGuideLst xmlns:p15="http://schemas.microsoft.com/office/powerpoint/2012/main" xmlns="">
+      <p15:sldGuideLst xmlns:p15="http://schemas.microsoft.com/office/powerpoint/2012/main">
         <p15:guide id="1" orient="horz" pos="1620">
           <p15:clr>
             <a:srgbClr val="A4A3A4"/>
@@ -5103,13 +5103,6 @@
         </dgm:presLayoutVars>
       </dgm:prSet>
       <dgm:spPr/>
-      <dgm:t>
-        <a:bodyPr/>
-        <a:lstStyle/>
-        <a:p>
-          <a:endParaRPr lang="es-ES"/>
-        </a:p>
-      </dgm:t>
     </dgm:pt>
     <dgm:pt modelId="{46548575-B147-4483-9D08-87E5E3627F13}" type="pres">
       <dgm:prSet presAssocID="{83E4B80B-23EF-4E0D-9337-B81B16054847}" presName="node" presStyleLbl="node1" presStyleIdx="0" presStyleCnt="3" custRadScaleRad="29221" custRadScaleInc="-286720">
@@ -5118,13 +5111,6 @@
         </dgm:presLayoutVars>
       </dgm:prSet>
       <dgm:spPr/>
-      <dgm:t>
-        <a:bodyPr/>
-        <a:lstStyle/>
-        <a:p>
-          <a:endParaRPr lang="es-ES"/>
-        </a:p>
-      </dgm:t>
     </dgm:pt>
     <dgm:pt modelId="{B062B9D6-77DB-4D33-90F4-C9AF7E9F0E15}" type="pres">
       <dgm:prSet presAssocID="{425D598D-178F-444B-A4C0-1730043742F6}" presName="sibTrans" presStyleLbl="sibTrans2D1" presStyleIdx="0" presStyleCnt="3" custAng="21246209" custScaleX="111332" custLinFactNeighborX="7571" custLinFactNeighborY="850"/>
@@ -5133,24 +5119,10 @@
           <a:avLst/>
         </a:prstGeom>
       </dgm:spPr>
-      <dgm:t>
-        <a:bodyPr/>
-        <a:lstStyle/>
-        <a:p>
-          <a:endParaRPr lang="es-ES"/>
-        </a:p>
-      </dgm:t>
     </dgm:pt>
     <dgm:pt modelId="{21DC4FFE-F344-4244-9E6A-DEF2E3B39008}" type="pres">
       <dgm:prSet presAssocID="{425D598D-178F-444B-A4C0-1730043742F6}" presName="connectorText" presStyleLbl="sibTrans2D1" presStyleIdx="0" presStyleCnt="3"/>
       <dgm:spPr/>
-      <dgm:t>
-        <a:bodyPr/>
-        <a:lstStyle/>
-        <a:p>
-          <a:endParaRPr lang="es-ES"/>
-        </a:p>
-      </dgm:t>
     </dgm:pt>
     <dgm:pt modelId="{212A5B31-3FE1-4DC5-9211-6FDB5FA6A4FB}" type="pres">
       <dgm:prSet presAssocID="{A741432F-3C06-49D4-B4A5-67F190C4826C}" presName="node" presStyleLbl="node1" presStyleIdx="1" presStyleCnt="3" custScaleX="105126" custScaleY="95832" custRadScaleRad="164268" custRadScaleInc="-110836">
@@ -5159,13 +5131,6 @@
         </dgm:presLayoutVars>
       </dgm:prSet>
       <dgm:spPr/>
-      <dgm:t>
-        <a:bodyPr/>
-        <a:lstStyle/>
-        <a:p>
-          <a:endParaRPr lang="es-ES"/>
-        </a:p>
-      </dgm:t>
     </dgm:pt>
     <dgm:pt modelId="{55877E58-FC51-46D5-B155-169AA4F3723B}" type="pres">
       <dgm:prSet presAssocID="{E81B54BA-3A97-4FAA-B155-6C228C0EE895}" presName="sibTrans" presStyleLbl="sibTrans2D1" presStyleIdx="1" presStyleCnt="3" custAng="21565535" custLinFactNeighborX="-7681" custLinFactNeighborY="-26540"/>
@@ -5174,24 +5139,10 @@
           <a:avLst/>
         </a:prstGeom>
       </dgm:spPr>
-      <dgm:t>
-        <a:bodyPr/>
-        <a:lstStyle/>
-        <a:p>
-          <a:endParaRPr lang="es-ES"/>
-        </a:p>
-      </dgm:t>
     </dgm:pt>
     <dgm:pt modelId="{244EFB65-762F-4137-BFD5-A34B8FB3D55E}" type="pres">
       <dgm:prSet presAssocID="{E81B54BA-3A97-4FAA-B155-6C228C0EE895}" presName="connectorText" presStyleLbl="sibTrans2D1" presStyleIdx="1" presStyleCnt="3"/>
       <dgm:spPr/>
-      <dgm:t>
-        <a:bodyPr/>
-        <a:lstStyle/>
-        <a:p>
-          <a:endParaRPr lang="es-ES"/>
-        </a:p>
-      </dgm:t>
     </dgm:pt>
     <dgm:pt modelId="{0EA6C051-DD76-4DAF-8943-BCCE1D1A0EEA}" type="pres">
       <dgm:prSet presAssocID="{5A88C638-89DD-4E23-B0AE-5F4590F674CE}" presName="node" presStyleLbl="node1" presStyleIdx="2" presStyleCnt="3" custRadScaleRad="174452" custRadScaleInc="107590">
@@ -5200,13 +5151,6 @@
         </dgm:presLayoutVars>
       </dgm:prSet>
       <dgm:spPr/>
-      <dgm:t>
-        <a:bodyPr/>
-        <a:lstStyle/>
-        <a:p>
-          <a:endParaRPr lang="es-ES"/>
-        </a:p>
-      </dgm:t>
     </dgm:pt>
     <dgm:pt modelId="{9E3C2575-948C-4489-AB9B-D336DC19D807}" type="pres">
       <dgm:prSet presAssocID="{015027F2-35D8-472A-9CFD-3D1CF9437633}" presName="sibTrans" presStyleLbl="sibTrans2D1" presStyleIdx="2" presStyleCnt="3" custAng="618666" custLinFactNeighborX="-11298" custLinFactNeighborY="-1504"/>
@@ -5215,40 +5159,26 @@
           <a:avLst/>
         </a:prstGeom>
       </dgm:spPr>
-      <dgm:t>
-        <a:bodyPr/>
-        <a:lstStyle/>
-        <a:p>
-          <a:endParaRPr lang="es-ES"/>
-        </a:p>
-      </dgm:t>
     </dgm:pt>
     <dgm:pt modelId="{8C8B06FB-0502-4183-A107-E116249C3B4D}" type="pres">
       <dgm:prSet presAssocID="{015027F2-35D8-472A-9CFD-3D1CF9437633}" presName="connectorText" presStyleLbl="sibTrans2D1" presStyleIdx="2" presStyleCnt="3"/>
       <dgm:spPr/>
-      <dgm:t>
-        <a:bodyPr/>
-        <a:lstStyle/>
-        <a:p>
-          <a:endParaRPr lang="es-ES"/>
-        </a:p>
-      </dgm:t>
     </dgm:pt>
   </dgm:ptLst>
   <dgm:cxnLst>
+    <dgm:cxn modelId="{5DC78A07-CF38-4E2A-813A-993466D488D9}" type="presOf" srcId="{425D598D-178F-444B-A4C0-1730043742F6}" destId="{B062B9D6-77DB-4D33-90F4-C9AF7E9F0E15}" srcOrd="0" destOrd="0" presId="urn:microsoft.com/office/officeart/2005/8/layout/cycle7"/>
+    <dgm:cxn modelId="{9A6BD716-BCD8-4947-9533-FF0D5952C904}" type="presOf" srcId="{83E4B80B-23EF-4E0D-9337-B81B16054847}" destId="{46548575-B147-4483-9D08-87E5E3627F13}" srcOrd="0" destOrd="0" presId="urn:microsoft.com/office/officeart/2005/8/layout/cycle7"/>
+    <dgm:cxn modelId="{3D924028-F46D-4AB2-8E9C-5E0B797E1722}" type="presOf" srcId="{E81B54BA-3A97-4FAA-B155-6C228C0EE895}" destId="{244EFB65-762F-4137-BFD5-A34B8FB3D55E}" srcOrd="1" destOrd="0" presId="urn:microsoft.com/office/officeart/2005/8/layout/cycle7"/>
+    <dgm:cxn modelId="{E93BB84F-D78A-4A8A-9E9D-D2B77F8AB7AD}" srcId="{7FE0189D-D635-42D2-AF2D-4D7468A09CDF}" destId="{83E4B80B-23EF-4E0D-9337-B81B16054847}" srcOrd="0" destOrd="0" parTransId="{C6D664F3-32EF-4A28-88BE-990DD43AF6F1}" sibTransId="{425D598D-178F-444B-A4C0-1730043742F6}"/>
+    <dgm:cxn modelId="{86848689-7406-41B3-AFC6-5FF099A9DBDA}" type="presOf" srcId="{015027F2-35D8-472A-9CFD-3D1CF9437633}" destId="{8C8B06FB-0502-4183-A107-E116249C3B4D}" srcOrd="1" destOrd="0" presId="urn:microsoft.com/office/officeart/2005/8/layout/cycle7"/>
+    <dgm:cxn modelId="{942D418A-84C4-42D2-9412-1FEFB188DC9C}" srcId="{7FE0189D-D635-42D2-AF2D-4D7468A09CDF}" destId="{A741432F-3C06-49D4-B4A5-67F190C4826C}" srcOrd="1" destOrd="0" parTransId="{0F39ED45-A7F4-4B79-90BB-1E6F067B4E49}" sibTransId="{E81B54BA-3A97-4FAA-B155-6C228C0EE895}"/>
+    <dgm:cxn modelId="{ED75028E-B6AD-4186-A313-7ACBB2E73673}" type="presOf" srcId="{7FE0189D-D635-42D2-AF2D-4D7468A09CDF}" destId="{35A825AF-94C8-4E7D-9246-A0C0ED4E21BA}" srcOrd="0" destOrd="0" presId="urn:microsoft.com/office/officeart/2005/8/layout/cycle7"/>
+    <dgm:cxn modelId="{EC80FF92-0FDE-47B4-9AAA-D9ACD41DB648}" type="presOf" srcId="{425D598D-178F-444B-A4C0-1730043742F6}" destId="{21DC4FFE-F344-4244-9E6A-DEF2E3B39008}" srcOrd="1" destOrd="0" presId="urn:microsoft.com/office/officeart/2005/8/layout/cycle7"/>
     <dgm:cxn modelId="{6DE340D0-773F-40FB-9964-90ED585B06F8}" type="presOf" srcId="{5A88C638-89DD-4E23-B0AE-5F4590F674CE}" destId="{0EA6C051-DD76-4DAF-8943-BCCE1D1A0EEA}" srcOrd="0" destOrd="0" presId="urn:microsoft.com/office/officeart/2005/8/layout/cycle7"/>
     <dgm:cxn modelId="{1EFDEED4-4F3F-4BBE-B8E6-C63C7C46E414}" type="presOf" srcId="{E81B54BA-3A97-4FAA-B155-6C228C0EE895}" destId="{55877E58-FC51-46D5-B155-169AA4F3723B}" srcOrd="0" destOrd="0" presId="urn:microsoft.com/office/officeart/2005/8/layout/cycle7"/>
-    <dgm:cxn modelId="{5DC78A07-CF38-4E2A-813A-993466D488D9}" type="presOf" srcId="{425D598D-178F-444B-A4C0-1730043742F6}" destId="{B062B9D6-77DB-4D33-90F4-C9AF7E9F0E15}" srcOrd="0" destOrd="0" presId="urn:microsoft.com/office/officeart/2005/8/layout/cycle7"/>
-    <dgm:cxn modelId="{9A6BD716-BCD8-4947-9533-FF0D5952C904}" type="presOf" srcId="{83E4B80B-23EF-4E0D-9337-B81B16054847}" destId="{46548575-B147-4483-9D08-87E5E3627F13}" srcOrd="0" destOrd="0" presId="urn:microsoft.com/office/officeart/2005/8/layout/cycle7"/>
+    <dgm:cxn modelId="{CE785DE2-1CC5-4BF7-B5B0-EFBD5A24FA4D}" srcId="{7FE0189D-D635-42D2-AF2D-4D7468A09CDF}" destId="{5A88C638-89DD-4E23-B0AE-5F4590F674CE}" srcOrd="2" destOrd="0" parTransId="{25160C39-658F-4A4D-979E-56080EE838E8}" sibTransId="{015027F2-35D8-472A-9CFD-3D1CF9437633}"/>
     <dgm:cxn modelId="{F813F4E3-B1FF-477F-8C9F-DE2FF63BC0BE}" type="presOf" srcId="{015027F2-35D8-472A-9CFD-3D1CF9437633}" destId="{9E3C2575-948C-4489-AB9B-D336DC19D807}" srcOrd="0" destOrd="0" presId="urn:microsoft.com/office/officeart/2005/8/layout/cycle7"/>
-    <dgm:cxn modelId="{EC80FF92-0FDE-47B4-9AAA-D9ACD41DB648}" type="presOf" srcId="{425D598D-178F-444B-A4C0-1730043742F6}" destId="{21DC4FFE-F344-4244-9E6A-DEF2E3B39008}" srcOrd="1" destOrd="0" presId="urn:microsoft.com/office/officeart/2005/8/layout/cycle7"/>
-    <dgm:cxn modelId="{CE785DE2-1CC5-4BF7-B5B0-EFBD5A24FA4D}" srcId="{7FE0189D-D635-42D2-AF2D-4D7468A09CDF}" destId="{5A88C638-89DD-4E23-B0AE-5F4590F674CE}" srcOrd="2" destOrd="0" parTransId="{25160C39-658F-4A4D-979E-56080EE838E8}" sibTransId="{015027F2-35D8-472A-9CFD-3D1CF9437633}"/>
-    <dgm:cxn modelId="{3D924028-F46D-4AB2-8E9C-5E0B797E1722}" type="presOf" srcId="{E81B54BA-3A97-4FAA-B155-6C228C0EE895}" destId="{244EFB65-762F-4137-BFD5-A34B8FB3D55E}" srcOrd="1" destOrd="0" presId="urn:microsoft.com/office/officeart/2005/8/layout/cycle7"/>
-    <dgm:cxn modelId="{942D418A-84C4-42D2-9412-1FEFB188DC9C}" srcId="{7FE0189D-D635-42D2-AF2D-4D7468A09CDF}" destId="{A741432F-3C06-49D4-B4A5-67F190C4826C}" srcOrd="1" destOrd="0" parTransId="{0F39ED45-A7F4-4B79-90BB-1E6F067B4E49}" sibTransId="{E81B54BA-3A97-4FAA-B155-6C228C0EE895}"/>
     <dgm:cxn modelId="{EB440BFE-B0BD-452B-BC6B-0D2B13E7FDE5}" type="presOf" srcId="{A741432F-3C06-49D4-B4A5-67F190C4826C}" destId="{212A5B31-3FE1-4DC5-9211-6FDB5FA6A4FB}" srcOrd="0" destOrd="0" presId="urn:microsoft.com/office/officeart/2005/8/layout/cycle7"/>
-    <dgm:cxn modelId="{E93BB84F-D78A-4A8A-9E9D-D2B77F8AB7AD}" srcId="{7FE0189D-D635-42D2-AF2D-4D7468A09CDF}" destId="{83E4B80B-23EF-4E0D-9337-B81B16054847}" srcOrd="0" destOrd="0" parTransId="{C6D664F3-32EF-4A28-88BE-990DD43AF6F1}" sibTransId="{425D598D-178F-444B-A4C0-1730043742F6}"/>
-    <dgm:cxn modelId="{86848689-7406-41B3-AFC6-5FF099A9DBDA}" type="presOf" srcId="{015027F2-35D8-472A-9CFD-3D1CF9437633}" destId="{8C8B06FB-0502-4183-A107-E116249C3B4D}" srcOrd="1" destOrd="0" presId="urn:microsoft.com/office/officeart/2005/8/layout/cycle7"/>
-    <dgm:cxn modelId="{ED75028E-B6AD-4186-A313-7ACBB2E73673}" type="presOf" srcId="{7FE0189D-D635-42D2-AF2D-4D7468A09CDF}" destId="{35A825AF-94C8-4E7D-9246-A0C0ED4E21BA}" srcOrd="0" destOrd="0" presId="urn:microsoft.com/office/officeart/2005/8/layout/cycle7"/>
     <dgm:cxn modelId="{20D9B2FD-CF34-44BC-8EE9-2A9C5FCD7F78}" type="presParOf" srcId="{35A825AF-94C8-4E7D-9246-A0C0ED4E21BA}" destId="{46548575-B147-4483-9D08-87E5E3627F13}" srcOrd="0" destOrd="0" presId="urn:microsoft.com/office/officeart/2005/8/layout/cycle7"/>
     <dgm:cxn modelId="{9DE44946-5522-47C4-9A4B-BEC648D0BE0C}" type="presParOf" srcId="{35A825AF-94C8-4E7D-9246-A0C0ED4E21BA}" destId="{B062B9D6-77DB-4D33-90F4-C9AF7E9F0E15}" srcOrd="1" destOrd="0" presId="urn:microsoft.com/office/officeart/2005/8/layout/cycle7"/>
     <dgm:cxn modelId="{C472A755-76D7-45CB-9B06-3A224BC5607D}" type="presParOf" srcId="{B062B9D6-77DB-4D33-90F4-C9AF7E9F0E15}" destId="{21DC4FFE-F344-4244-9E6A-DEF2E3B39008}" srcOrd="0" destOrd="0" presId="urn:microsoft.com/office/officeart/2005/8/layout/cycle7"/>
@@ -5510,13 +5440,6 @@
         </dgm:presLayoutVars>
       </dgm:prSet>
       <dgm:spPr/>
-      <dgm:t>
-        <a:bodyPr/>
-        <a:lstStyle/>
-        <a:p>
-          <a:endParaRPr lang="es-ES"/>
-        </a:p>
-      </dgm:t>
     </dgm:pt>
     <dgm:pt modelId="{734847CF-A9E7-4C2C-9B57-8F81BF39A8B5}" type="pres">
       <dgm:prSet presAssocID="{25465040-D6E0-491F-BFEF-7AC6C4CCA63A}" presName="root" presStyleCnt="0"/>
@@ -5529,24 +5452,10 @@
     <dgm:pt modelId="{CE28435D-B376-4163-AC41-2497B13A172F}" type="pres">
       <dgm:prSet presAssocID="{25465040-D6E0-491F-BFEF-7AC6C4CCA63A}" presName="rootText" presStyleLbl="node1" presStyleIdx="0" presStyleCnt="4"/>
       <dgm:spPr/>
-      <dgm:t>
-        <a:bodyPr/>
-        <a:lstStyle/>
-        <a:p>
-          <a:endParaRPr lang="es-ES"/>
-        </a:p>
-      </dgm:t>
     </dgm:pt>
     <dgm:pt modelId="{F3017D3E-C05D-4C8F-B70E-1E60F1001CA2}" type="pres">
       <dgm:prSet presAssocID="{25465040-D6E0-491F-BFEF-7AC6C4CCA63A}" presName="rootConnector" presStyleLbl="node1" presStyleIdx="0" presStyleCnt="4"/>
       <dgm:spPr/>
-      <dgm:t>
-        <a:bodyPr/>
-        <a:lstStyle/>
-        <a:p>
-          <a:endParaRPr lang="es-ES"/>
-        </a:p>
-      </dgm:t>
     </dgm:pt>
     <dgm:pt modelId="{CCB6724C-81B1-43CD-BBE2-8C1C50A33A71}" type="pres">
       <dgm:prSet presAssocID="{25465040-D6E0-491F-BFEF-7AC6C4CCA63A}" presName="childShape" presStyleCnt="0"/>
@@ -5563,24 +5472,10 @@
     <dgm:pt modelId="{7DA67872-206B-414C-BFEF-8083B8E77315}" type="pres">
       <dgm:prSet presAssocID="{218B3E38-4A00-4E9A-BB70-A1F2DE838927}" presName="rootText" presStyleLbl="node1" presStyleIdx="1" presStyleCnt="4"/>
       <dgm:spPr/>
-      <dgm:t>
-        <a:bodyPr/>
-        <a:lstStyle/>
-        <a:p>
-          <a:endParaRPr lang="es-ES"/>
-        </a:p>
-      </dgm:t>
     </dgm:pt>
     <dgm:pt modelId="{DDE1B986-2DD5-4C78-9E33-D403B70F0C7A}" type="pres">
       <dgm:prSet presAssocID="{218B3E38-4A00-4E9A-BB70-A1F2DE838927}" presName="rootConnector" presStyleLbl="node1" presStyleIdx="1" presStyleCnt="4"/>
       <dgm:spPr/>
-      <dgm:t>
-        <a:bodyPr/>
-        <a:lstStyle/>
-        <a:p>
-          <a:endParaRPr lang="es-ES"/>
-        </a:p>
-      </dgm:t>
     </dgm:pt>
     <dgm:pt modelId="{BC6457A6-4BF9-4320-99DF-01319131D181}" type="pres">
       <dgm:prSet presAssocID="{218B3E38-4A00-4E9A-BB70-A1F2DE838927}" presName="childShape" presStyleCnt="0"/>
@@ -5597,24 +5492,10 @@
     <dgm:pt modelId="{DE96B33B-217C-487F-BB0A-6221B07EB71D}" type="pres">
       <dgm:prSet presAssocID="{7FDF271C-A7B8-4591-A64C-02DFF4691E8B}" presName="rootText" presStyleLbl="node1" presStyleIdx="2" presStyleCnt="4"/>
       <dgm:spPr/>
-      <dgm:t>
-        <a:bodyPr/>
-        <a:lstStyle/>
-        <a:p>
-          <a:endParaRPr lang="es-ES"/>
-        </a:p>
-      </dgm:t>
     </dgm:pt>
     <dgm:pt modelId="{7974BD2B-0244-4BCB-B01C-0607E3296C97}" type="pres">
       <dgm:prSet presAssocID="{7FDF271C-A7B8-4591-A64C-02DFF4691E8B}" presName="rootConnector" presStyleLbl="node1" presStyleIdx="2" presStyleCnt="4"/>
       <dgm:spPr/>
-      <dgm:t>
-        <a:bodyPr/>
-        <a:lstStyle/>
-        <a:p>
-          <a:endParaRPr lang="es-ES"/>
-        </a:p>
-      </dgm:t>
     </dgm:pt>
     <dgm:pt modelId="{0FFBFF49-948B-4BEF-88EF-19630CFC44CF}" type="pres">
       <dgm:prSet presAssocID="{7FDF271C-A7B8-4591-A64C-02DFF4691E8B}" presName="childShape" presStyleCnt="0"/>
@@ -5631,24 +5512,10 @@
     <dgm:pt modelId="{004CAB0C-727E-414A-BAE4-C81F7A83C224}" type="pres">
       <dgm:prSet presAssocID="{B6168D25-DF91-4C0F-A4D9-FD1DE8A4805C}" presName="rootText" presStyleLbl="node1" presStyleIdx="3" presStyleCnt="4"/>
       <dgm:spPr/>
-      <dgm:t>
-        <a:bodyPr/>
-        <a:lstStyle/>
-        <a:p>
-          <a:endParaRPr lang="es-ES"/>
-        </a:p>
-      </dgm:t>
     </dgm:pt>
     <dgm:pt modelId="{EAB2509E-91BC-4428-8887-67378842D7FC}" type="pres">
       <dgm:prSet presAssocID="{B6168D25-DF91-4C0F-A4D9-FD1DE8A4805C}" presName="rootConnector" presStyleLbl="node1" presStyleIdx="3" presStyleCnt="4"/>
       <dgm:spPr/>
-      <dgm:t>
-        <a:bodyPr/>
-        <a:lstStyle/>
-        <a:p>
-          <a:endParaRPr lang="es-ES"/>
-        </a:p>
-      </dgm:t>
     </dgm:pt>
     <dgm:pt modelId="{15B89692-C86A-4107-B458-BB8DF7506AC3}" type="pres">
       <dgm:prSet presAssocID="{B6168D25-DF91-4C0F-A4D9-FD1DE8A4805C}" presName="childShape" presStyleCnt="0"/>
@@ -5656,19 +5523,19 @@
     </dgm:pt>
   </dgm:ptLst>
   <dgm:cxnLst>
+    <dgm:cxn modelId="{CD7BF50D-61C5-4216-9A27-0B8F428564D6}" srcId="{271DD4EE-57F8-40F7-845C-22470035B818}" destId="{7FDF271C-A7B8-4591-A64C-02DFF4691E8B}" srcOrd="2" destOrd="0" parTransId="{97294BDC-6B36-457C-B678-7A4DDDF901FE}" sibTransId="{3592D8B4-A2D7-48E5-9697-B2B93175D739}"/>
+    <dgm:cxn modelId="{37132925-E602-4B7C-B64E-115DD12A118C}" type="presOf" srcId="{B6168D25-DF91-4C0F-A4D9-FD1DE8A4805C}" destId="{EAB2509E-91BC-4428-8887-67378842D7FC}" srcOrd="1" destOrd="0" presId="urn:microsoft.com/office/officeart/2005/8/layout/hierarchy3"/>
     <dgm:cxn modelId="{59C0A032-8562-4714-B832-4A6A41B4A4D6}" srcId="{271DD4EE-57F8-40F7-845C-22470035B818}" destId="{218B3E38-4A00-4E9A-BB70-A1F2DE838927}" srcOrd="1" destOrd="0" parTransId="{B3190613-65B9-4B35-A3C9-B1EE9CE92680}" sibTransId="{B91D1E2B-0197-41C8-A204-2B2A910CCBAD}"/>
+    <dgm:cxn modelId="{A1C3DD6B-51F3-42C4-A970-9AE9C141FA42}" type="presOf" srcId="{25465040-D6E0-491F-BFEF-7AC6C4CCA63A}" destId="{F3017D3E-C05D-4C8F-B70E-1E60F1001CA2}" srcOrd="1" destOrd="0" presId="urn:microsoft.com/office/officeart/2005/8/layout/hierarchy3"/>
+    <dgm:cxn modelId="{17BDBC88-D1C8-48C1-99B8-EAE98FDFD552}" srcId="{271DD4EE-57F8-40F7-845C-22470035B818}" destId="{B6168D25-DF91-4C0F-A4D9-FD1DE8A4805C}" srcOrd="3" destOrd="0" parTransId="{E84122A5-0E57-40A3-8643-3D76A28F7568}" sibTransId="{50C5F863-F1ED-4139-AF47-63DBC27B1E48}"/>
     <dgm:cxn modelId="{85B4629C-8910-4A50-B815-AC345A4D5F20}" srcId="{271DD4EE-57F8-40F7-845C-22470035B818}" destId="{25465040-D6E0-491F-BFEF-7AC6C4CCA63A}" srcOrd="0" destOrd="0" parTransId="{D247150F-8E05-44B4-B153-B6236E19DAA9}" sibTransId="{AACE7D99-FD8A-4D3A-9B1F-F52509A4917A}"/>
+    <dgm:cxn modelId="{CCD49FA4-94A3-4E73-8C91-3A89268FFA74}" type="presOf" srcId="{271DD4EE-57F8-40F7-845C-22470035B818}" destId="{A03DC827-6941-4A36-AFE8-7AAE941C4E0E}" srcOrd="0" destOrd="0" presId="urn:microsoft.com/office/officeart/2005/8/layout/hierarchy3"/>
+    <dgm:cxn modelId="{70F064A8-A2B7-4F89-B9FD-8B9E09568FC7}" type="presOf" srcId="{7FDF271C-A7B8-4591-A64C-02DFF4691E8B}" destId="{7974BD2B-0244-4BCB-B01C-0607E3296C97}" srcOrd="1" destOrd="0" presId="urn:microsoft.com/office/officeart/2005/8/layout/hierarchy3"/>
+    <dgm:cxn modelId="{6C9A63CD-A9F0-454E-9F95-EF876E44D2C3}" type="presOf" srcId="{7FDF271C-A7B8-4591-A64C-02DFF4691E8B}" destId="{DE96B33B-217C-487F-BB0A-6221B07EB71D}" srcOrd="0" destOrd="0" presId="urn:microsoft.com/office/officeart/2005/8/layout/hierarchy3"/>
+    <dgm:cxn modelId="{B2E32CCF-9525-41EC-B42E-8CF037FF3B8D}" type="presOf" srcId="{25465040-D6E0-491F-BFEF-7AC6C4CCA63A}" destId="{CE28435D-B376-4163-AC41-2497B13A172F}" srcOrd="0" destOrd="0" presId="urn:microsoft.com/office/officeart/2005/8/layout/hierarchy3"/>
     <dgm:cxn modelId="{995BBFD6-AA9B-45F1-8DF1-688F0C67C254}" type="presOf" srcId="{B6168D25-DF91-4C0F-A4D9-FD1DE8A4805C}" destId="{004CAB0C-727E-414A-BAE4-C81F7A83C224}" srcOrd="0" destOrd="0" presId="urn:microsoft.com/office/officeart/2005/8/layout/hierarchy3"/>
-    <dgm:cxn modelId="{CCD49FA4-94A3-4E73-8C91-3A89268FFA74}" type="presOf" srcId="{271DD4EE-57F8-40F7-845C-22470035B818}" destId="{A03DC827-6941-4A36-AFE8-7AAE941C4E0E}" srcOrd="0" destOrd="0" presId="urn:microsoft.com/office/officeart/2005/8/layout/hierarchy3"/>
-    <dgm:cxn modelId="{CD7BF50D-61C5-4216-9A27-0B8F428564D6}" srcId="{271DD4EE-57F8-40F7-845C-22470035B818}" destId="{7FDF271C-A7B8-4591-A64C-02DFF4691E8B}" srcOrd="2" destOrd="0" parTransId="{97294BDC-6B36-457C-B678-7A4DDDF901FE}" sibTransId="{3592D8B4-A2D7-48E5-9697-B2B93175D739}"/>
+    <dgm:cxn modelId="{74F1A4D9-DE41-4109-BC43-F98D07E2FEDB}" type="presOf" srcId="{218B3E38-4A00-4E9A-BB70-A1F2DE838927}" destId="{DDE1B986-2DD5-4C78-9E33-D403B70F0C7A}" srcOrd="1" destOrd="0" presId="urn:microsoft.com/office/officeart/2005/8/layout/hierarchy3"/>
     <dgm:cxn modelId="{C83CF9EA-2BB4-482B-8267-4DFBDC7D763C}" type="presOf" srcId="{218B3E38-4A00-4E9A-BB70-A1F2DE838927}" destId="{7DA67872-206B-414C-BFEF-8083B8E77315}" srcOrd="0" destOrd="0" presId="urn:microsoft.com/office/officeart/2005/8/layout/hierarchy3"/>
-    <dgm:cxn modelId="{74F1A4D9-DE41-4109-BC43-F98D07E2FEDB}" type="presOf" srcId="{218B3E38-4A00-4E9A-BB70-A1F2DE838927}" destId="{DDE1B986-2DD5-4C78-9E33-D403B70F0C7A}" srcOrd="1" destOrd="0" presId="urn:microsoft.com/office/officeart/2005/8/layout/hierarchy3"/>
-    <dgm:cxn modelId="{6C9A63CD-A9F0-454E-9F95-EF876E44D2C3}" type="presOf" srcId="{7FDF271C-A7B8-4591-A64C-02DFF4691E8B}" destId="{DE96B33B-217C-487F-BB0A-6221B07EB71D}" srcOrd="0" destOrd="0" presId="urn:microsoft.com/office/officeart/2005/8/layout/hierarchy3"/>
-    <dgm:cxn modelId="{A1C3DD6B-51F3-42C4-A970-9AE9C141FA42}" type="presOf" srcId="{25465040-D6E0-491F-BFEF-7AC6C4CCA63A}" destId="{F3017D3E-C05D-4C8F-B70E-1E60F1001CA2}" srcOrd="1" destOrd="0" presId="urn:microsoft.com/office/officeart/2005/8/layout/hierarchy3"/>
-    <dgm:cxn modelId="{37132925-E602-4B7C-B64E-115DD12A118C}" type="presOf" srcId="{B6168D25-DF91-4C0F-A4D9-FD1DE8A4805C}" destId="{EAB2509E-91BC-4428-8887-67378842D7FC}" srcOrd="1" destOrd="0" presId="urn:microsoft.com/office/officeart/2005/8/layout/hierarchy3"/>
-    <dgm:cxn modelId="{17BDBC88-D1C8-48C1-99B8-EAE98FDFD552}" srcId="{271DD4EE-57F8-40F7-845C-22470035B818}" destId="{B6168D25-DF91-4C0F-A4D9-FD1DE8A4805C}" srcOrd="3" destOrd="0" parTransId="{E84122A5-0E57-40A3-8643-3D76A28F7568}" sibTransId="{50C5F863-F1ED-4139-AF47-63DBC27B1E48}"/>
-    <dgm:cxn modelId="{70F064A8-A2B7-4F89-B9FD-8B9E09568FC7}" type="presOf" srcId="{7FDF271C-A7B8-4591-A64C-02DFF4691E8B}" destId="{7974BD2B-0244-4BCB-B01C-0607E3296C97}" srcOrd="1" destOrd="0" presId="urn:microsoft.com/office/officeart/2005/8/layout/hierarchy3"/>
-    <dgm:cxn modelId="{B2E32CCF-9525-41EC-B42E-8CF037FF3B8D}" type="presOf" srcId="{25465040-D6E0-491F-BFEF-7AC6C4CCA63A}" destId="{CE28435D-B376-4163-AC41-2497B13A172F}" srcOrd="0" destOrd="0" presId="urn:microsoft.com/office/officeart/2005/8/layout/hierarchy3"/>
     <dgm:cxn modelId="{D1C011A3-1792-4386-A7C1-3FB0331B7F9F}" type="presParOf" srcId="{A03DC827-6941-4A36-AFE8-7AAE941C4E0E}" destId="{734847CF-A9E7-4C2C-9B57-8F81BF39A8B5}" srcOrd="0" destOrd="0" presId="urn:microsoft.com/office/officeart/2005/8/layout/hierarchy3"/>
     <dgm:cxn modelId="{C12E7157-B440-434A-8ABD-50721DD48B19}" type="presParOf" srcId="{734847CF-A9E7-4C2C-9B57-8F81BF39A8B5}" destId="{E18E96CD-3DAB-4DDE-979C-A293DF7BF4B7}" srcOrd="0" destOrd="0" presId="urn:microsoft.com/office/officeart/2005/8/layout/hierarchy3"/>
     <dgm:cxn modelId="{9129C7FD-B467-4C8F-9612-0DE5CBFB02AA}" type="presParOf" srcId="{E18E96CD-3DAB-4DDE-979C-A293DF7BF4B7}" destId="{CE28435D-B376-4163-AC41-2497B13A172F}" srcOrd="0" destOrd="0" presId="urn:microsoft.com/office/officeart/2005/8/layout/hierarchy3"/>
@@ -5694,7 +5561,7 @@
   <dgm:whole/>
   <dgm:extLst>
     <a:ext uri="http://schemas.microsoft.com/office/drawing/2008/diagram">
-      <dsp:dataModelExt xmlns:dsp="http://schemas.microsoft.com/office/drawing/2008/diagram" relId="rId7" minVer="http://schemas.openxmlformats.org/drawingml/2006/diagram"/>
+      <dsp:dataModelExt xmlns:dsp="http://schemas.microsoft.com/office/drawing/2008/diagram" relId="rId8" minVer="http://schemas.openxmlformats.org/drawingml/2006/diagram"/>
     </a:ext>
   </dgm:extLst>
 </dgm:dataModel>
@@ -5977,13 +5844,6 @@
         </dgm:presLayoutVars>
       </dgm:prSet>
       <dgm:spPr/>
-      <dgm:t>
-        <a:bodyPr/>
-        <a:lstStyle/>
-        <a:p>
-          <a:endParaRPr lang="es-ES"/>
-        </a:p>
-      </dgm:t>
     </dgm:pt>
     <dgm:pt modelId="{3B3D4009-2D07-4F1A-BDEF-C348B37A9CB6}" type="pres">
       <dgm:prSet presAssocID="{271DD4EE-57F8-40F7-845C-22470035B818}" presName="dummyMaxCanvas" presStyleCnt="0">
@@ -5998,13 +5858,6 @@
         </dgm:presLayoutVars>
       </dgm:prSet>
       <dgm:spPr/>
-      <dgm:t>
-        <a:bodyPr/>
-        <a:lstStyle/>
-        <a:p>
-          <a:endParaRPr lang="es-ES"/>
-        </a:p>
-      </dgm:t>
     </dgm:pt>
     <dgm:pt modelId="{CB5B90B0-EC9F-4B63-8D21-B17090BA3857}" type="pres">
       <dgm:prSet presAssocID="{271DD4EE-57F8-40F7-845C-22470035B818}" presName="FiveNodes_2" presStyleLbl="node1" presStyleIdx="1" presStyleCnt="5">
@@ -6013,13 +5866,6 @@
         </dgm:presLayoutVars>
       </dgm:prSet>
       <dgm:spPr/>
-      <dgm:t>
-        <a:bodyPr/>
-        <a:lstStyle/>
-        <a:p>
-          <a:endParaRPr lang="es-ES"/>
-        </a:p>
-      </dgm:t>
     </dgm:pt>
     <dgm:pt modelId="{52D48580-1518-41E4-BB8E-6E29D9715AC0}" type="pres">
       <dgm:prSet presAssocID="{271DD4EE-57F8-40F7-845C-22470035B818}" presName="FiveNodes_3" presStyleLbl="node1" presStyleIdx="2" presStyleCnt="5">
@@ -6028,13 +5874,6 @@
         </dgm:presLayoutVars>
       </dgm:prSet>
       <dgm:spPr/>
-      <dgm:t>
-        <a:bodyPr/>
-        <a:lstStyle/>
-        <a:p>
-          <a:endParaRPr lang="es-ES"/>
-        </a:p>
-      </dgm:t>
     </dgm:pt>
     <dgm:pt modelId="{0A594760-2D87-472F-A10D-A65F004336E6}" type="pres">
       <dgm:prSet presAssocID="{271DD4EE-57F8-40F7-845C-22470035B818}" presName="FiveNodes_4" presStyleLbl="node1" presStyleIdx="3" presStyleCnt="5">
@@ -6043,13 +5882,6 @@
         </dgm:presLayoutVars>
       </dgm:prSet>
       <dgm:spPr/>
-      <dgm:t>
-        <a:bodyPr/>
-        <a:lstStyle/>
-        <a:p>
-          <a:endParaRPr lang="es-ES"/>
-        </a:p>
-      </dgm:t>
     </dgm:pt>
     <dgm:pt modelId="{593AA8DC-4C5D-4210-B768-7F1DA7BC899B}" type="pres">
       <dgm:prSet presAssocID="{271DD4EE-57F8-40F7-845C-22470035B818}" presName="FiveNodes_5" presStyleLbl="node1" presStyleIdx="4" presStyleCnt="5">
@@ -6058,13 +5890,6 @@
         </dgm:presLayoutVars>
       </dgm:prSet>
       <dgm:spPr/>
-      <dgm:t>
-        <a:bodyPr/>
-        <a:lstStyle/>
-        <a:p>
-          <a:endParaRPr lang="es-ES"/>
-        </a:p>
-      </dgm:t>
     </dgm:pt>
     <dgm:pt modelId="{A655F6FF-C64E-432B-A89F-5BEEE4E78B94}" type="pres">
       <dgm:prSet presAssocID="{271DD4EE-57F8-40F7-845C-22470035B818}" presName="FiveConn_1-2" presStyleLbl="fgAccFollowNode1" presStyleIdx="0" presStyleCnt="4">
@@ -6073,13 +5898,6 @@
         </dgm:presLayoutVars>
       </dgm:prSet>
       <dgm:spPr/>
-      <dgm:t>
-        <a:bodyPr/>
-        <a:lstStyle/>
-        <a:p>
-          <a:endParaRPr lang="es-ES"/>
-        </a:p>
-      </dgm:t>
     </dgm:pt>
     <dgm:pt modelId="{5857C2BA-3C51-45C9-93DE-C1F54E2A1205}" type="pres">
       <dgm:prSet presAssocID="{271DD4EE-57F8-40F7-845C-22470035B818}" presName="FiveConn_2-3" presStyleLbl="fgAccFollowNode1" presStyleIdx="1" presStyleCnt="4">
@@ -6088,13 +5906,6 @@
         </dgm:presLayoutVars>
       </dgm:prSet>
       <dgm:spPr/>
-      <dgm:t>
-        <a:bodyPr/>
-        <a:lstStyle/>
-        <a:p>
-          <a:endParaRPr lang="es-ES"/>
-        </a:p>
-      </dgm:t>
     </dgm:pt>
     <dgm:pt modelId="{A97AF2A3-D5A1-4153-92D4-0401739D13ED}" type="pres">
       <dgm:prSet presAssocID="{271DD4EE-57F8-40F7-845C-22470035B818}" presName="FiveConn_3-4" presStyleLbl="fgAccFollowNode1" presStyleIdx="2" presStyleCnt="4">
@@ -6103,13 +5914,6 @@
         </dgm:presLayoutVars>
       </dgm:prSet>
       <dgm:spPr/>
-      <dgm:t>
-        <a:bodyPr/>
-        <a:lstStyle/>
-        <a:p>
-          <a:endParaRPr lang="es-ES"/>
-        </a:p>
-      </dgm:t>
     </dgm:pt>
     <dgm:pt modelId="{965DEC57-8D5F-40A3-8E09-5ED42BE4B685}" type="pres">
       <dgm:prSet presAssocID="{271DD4EE-57F8-40F7-845C-22470035B818}" presName="FiveConn_4-5" presStyleLbl="fgAccFollowNode1" presStyleIdx="3" presStyleCnt="4">
@@ -6118,13 +5922,6 @@
         </dgm:presLayoutVars>
       </dgm:prSet>
       <dgm:spPr/>
-      <dgm:t>
-        <a:bodyPr/>
-        <a:lstStyle/>
-        <a:p>
-          <a:endParaRPr lang="es-ES"/>
-        </a:p>
-      </dgm:t>
     </dgm:pt>
     <dgm:pt modelId="{142FCFD9-0A5F-4610-AAD4-6813F27702AF}" type="pres">
       <dgm:prSet presAssocID="{271DD4EE-57F8-40F7-845C-22470035B818}" presName="FiveNodes_1_text" presStyleLbl="node1" presStyleIdx="4" presStyleCnt="5">
@@ -6133,13 +5930,6 @@
         </dgm:presLayoutVars>
       </dgm:prSet>
       <dgm:spPr/>
-      <dgm:t>
-        <a:bodyPr/>
-        <a:lstStyle/>
-        <a:p>
-          <a:endParaRPr lang="es-ES"/>
-        </a:p>
-      </dgm:t>
     </dgm:pt>
     <dgm:pt modelId="{76B61CA4-4286-4B65-9CFA-9B996CBED5A6}" type="pres">
       <dgm:prSet presAssocID="{271DD4EE-57F8-40F7-845C-22470035B818}" presName="FiveNodes_2_text" presStyleLbl="node1" presStyleIdx="4" presStyleCnt="5">
@@ -6148,13 +5938,6 @@
         </dgm:presLayoutVars>
       </dgm:prSet>
       <dgm:spPr/>
-      <dgm:t>
-        <a:bodyPr/>
-        <a:lstStyle/>
-        <a:p>
-          <a:endParaRPr lang="es-ES"/>
-        </a:p>
-      </dgm:t>
     </dgm:pt>
     <dgm:pt modelId="{6AC27933-09AC-4592-B378-AA65F7851254}" type="pres">
       <dgm:prSet presAssocID="{271DD4EE-57F8-40F7-845C-22470035B818}" presName="FiveNodes_3_text" presStyleLbl="node1" presStyleIdx="4" presStyleCnt="5">
@@ -6163,13 +5946,6 @@
         </dgm:presLayoutVars>
       </dgm:prSet>
       <dgm:spPr/>
-      <dgm:t>
-        <a:bodyPr/>
-        <a:lstStyle/>
-        <a:p>
-          <a:endParaRPr lang="es-ES"/>
-        </a:p>
-      </dgm:t>
     </dgm:pt>
     <dgm:pt modelId="{488307EB-D907-48A6-9F69-577A71182CFB}" type="pres">
       <dgm:prSet presAssocID="{271DD4EE-57F8-40F7-845C-22470035B818}" presName="FiveNodes_4_text" presStyleLbl="node1" presStyleIdx="4" presStyleCnt="5">
@@ -6178,13 +5954,6 @@
         </dgm:presLayoutVars>
       </dgm:prSet>
       <dgm:spPr/>
-      <dgm:t>
-        <a:bodyPr/>
-        <a:lstStyle/>
-        <a:p>
-          <a:endParaRPr lang="es-ES"/>
-        </a:p>
-      </dgm:t>
     </dgm:pt>
     <dgm:pt modelId="{8B1FBEDF-11BD-4039-8E45-6106C5B2464E}" type="pres">
       <dgm:prSet presAssocID="{271DD4EE-57F8-40F7-845C-22470035B818}" presName="FiveNodes_5_text" presStyleLbl="node1" presStyleIdx="4" presStyleCnt="5">
@@ -6193,36 +5962,29 @@
         </dgm:presLayoutVars>
       </dgm:prSet>
       <dgm:spPr/>
-      <dgm:t>
-        <a:bodyPr/>
-        <a:lstStyle/>
-        <a:p>
-          <a:endParaRPr lang="es-ES"/>
-        </a:p>
-      </dgm:t>
     </dgm:pt>
   </dgm:ptLst>
   <dgm:cxnLst>
+    <dgm:cxn modelId="{7CC44602-3BDC-4E88-BC5D-17B53709B663}" type="presOf" srcId="{B6168D25-DF91-4C0F-A4D9-FD1DE8A4805C}" destId="{593AA8DC-4C5D-4210-B768-7F1DA7BC899B}" srcOrd="0" destOrd="0" presId="urn:microsoft.com/office/officeart/2005/8/layout/vProcess5"/>
+    <dgm:cxn modelId="{30B25B04-B17C-4426-9D0B-E590BD74E995}" type="presOf" srcId="{7FDF271C-A7B8-4591-A64C-02DFF4691E8B}" destId="{0A594760-2D87-472F-A10D-A65F004336E6}" srcOrd="0" destOrd="0" presId="urn:microsoft.com/office/officeart/2005/8/layout/vProcess5"/>
+    <dgm:cxn modelId="{CD7BF50D-61C5-4216-9A27-0B8F428564D6}" srcId="{271DD4EE-57F8-40F7-845C-22470035B818}" destId="{7FDF271C-A7B8-4591-A64C-02DFF4691E8B}" srcOrd="3" destOrd="0" parTransId="{97294BDC-6B36-457C-B678-7A4DDDF901FE}" sibTransId="{3592D8B4-A2D7-48E5-9697-B2B93175D739}"/>
+    <dgm:cxn modelId="{20097012-B6B4-4812-816E-E1EB06E38458}" type="presOf" srcId="{C880C0E0-BCEF-46A2-AA9D-D0E21C861779}" destId="{142FCFD9-0A5F-4610-AAD4-6813F27702AF}" srcOrd="1" destOrd="0" presId="urn:microsoft.com/office/officeart/2005/8/layout/vProcess5"/>
+    <dgm:cxn modelId="{1778C017-53CF-4790-B941-206295FD90E9}" type="presOf" srcId="{3592D8B4-A2D7-48E5-9697-B2B93175D739}" destId="{965DEC57-8D5F-40A3-8E09-5ED42BE4B685}" srcOrd="0" destOrd="0" presId="urn:microsoft.com/office/officeart/2005/8/layout/vProcess5"/>
+    <dgm:cxn modelId="{C903F12A-2924-4FA4-8A76-58C47342E98E}" type="presOf" srcId="{25465040-D6E0-491F-BFEF-7AC6C4CCA63A}" destId="{CB5B90B0-EC9F-4B63-8D21-B17090BA3857}" srcOrd="0" destOrd="0" presId="urn:microsoft.com/office/officeart/2005/8/layout/vProcess5"/>
+    <dgm:cxn modelId="{59C0A032-8562-4714-B832-4A6A41B4A4D6}" srcId="{271DD4EE-57F8-40F7-845C-22470035B818}" destId="{218B3E38-4A00-4E9A-BB70-A1F2DE838927}" srcOrd="2" destOrd="0" parTransId="{B3190613-65B9-4B35-A3C9-B1EE9CE92680}" sibTransId="{B91D1E2B-0197-41C8-A204-2B2A910CCBAD}"/>
+    <dgm:cxn modelId="{FA5D5B64-5DD2-4685-8B35-41CDFF477759}" type="presOf" srcId="{7FDF271C-A7B8-4591-A64C-02DFF4691E8B}" destId="{488307EB-D907-48A6-9F69-577A71182CFB}" srcOrd="1" destOrd="0" presId="urn:microsoft.com/office/officeart/2005/8/layout/vProcess5"/>
+    <dgm:cxn modelId="{C2282945-792F-4E2A-A0CE-1F8CA8136F42}" type="presOf" srcId="{C880C0E0-BCEF-46A2-AA9D-D0E21C861779}" destId="{A8121A04-B714-4533-9F72-D7EBB5EDC57D}" srcOrd="0" destOrd="0" presId="urn:microsoft.com/office/officeart/2005/8/layout/vProcess5"/>
+    <dgm:cxn modelId="{17BDBC88-D1C8-48C1-99B8-EAE98FDFD552}" srcId="{271DD4EE-57F8-40F7-845C-22470035B818}" destId="{B6168D25-DF91-4C0F-A4D9-FD1DE8A4805C}" srcOrd="4" destOrd="0" parTransId="{E84122A5-0E57-40A3-8643-3D76A28F7568}" sibTransId="{50C5F863-F1ED-4139-AF47-63DBC27B1E48}"/>
+    <dgm:cxn modelId="{F75EC590-8C71-485C-B965-4331391691C9}" type="presOf" srcId="{B6168D25-DF91-4C0F-A4D9-FD1DE8A4805C}" destId="{8B1FBEDF-11BD-4039-8E45-6106C5B2464E}" srcOrd="1" destOrd="0" presId="urn:microsoft.com/office/officeart/2005/8/layout/vProcess5"/>
+    <dgm:cxn modelId="{17BC6C91-3EBC-4643-9840-6938A827DE5C}" type="presOf" srcId="{218B3E38-4A00-4E9A-BB70-A1F2DE838927}" destId="{6AC27933-09AC-4592-B378-AA65F7851254}" srcOrd="1" destOrd="0" presId="urn:microsoft.com/office/officeart/2005/8/layout/vProcess5"/>
+    <dgm:cxn modelId="{85B4629C-8910-4A50-B815-AC345A4D5F20}" srcId="{271DD4EE-57F8-40F7-845C-22470035B818}" destId="{25465040-D6E0-491F-BFEF-7AC6C4CCA63A}" srcOrd="1" destOrd="0" parTransId="{D247150F-8E05-44B4-B153-B6236E19DAA9}" sibTransId="{AACE7D99-FD8A-4D3A-9B1F-F52509A4917A}"/>
+    <dgm:cxn modelId="{1C112DB7-EEAC-49EC-A683-2CDC57AE4024}" type="presOf" srcId="{CC95784C-DA6A-4D2E-B6B8-F27AA84E7558}" destId="{A655F6FF-C64E-432B-A89F-5BEEE4E78B94}" srcOrd="0" destOrd="0" presId="urn:microsoft.com/office/officeart/2005/8/layout/vProcess5"/>
+    <dgm:cxn modelId="{AB710DC0-513E-4FF4-8B4F-218B2AFFD007}" type="presOf" srcId="{AACE7D99-FD8A-4D3A-9B1F-F52509A4917A}" destId="{5857C2BA-3C51-45C9-93DE-C1F54E2A1205}" srcOrd="0" destOrd="0" presId="urn:microsoft.com/office/officeart/2005/8/layout/vProcess5"/>
     <dgm:cxn modelId="{0CB44BD6-88F8-4C2E-A008-A46737663FBF}" type="presOf" srcId="{271DD4EE-57F8-40F7-845C-22470035B818}" destId="{CDDA9C92-60D0-40B1-81C7-600474E2C4E7}" srcOrd="0" destOrd="0" presId="urn:microsoft.com/office/officeart/2005/8/layout/vProcess5"/>
-    <dgm:cxn modelId="{59C0A032-8562-4714-B832-4A6A41B4A4D6}" srcId="{271DD4EE-57F8-40F7-845C-22470035B818}" destId="{218B3E38-4A00-4E9A-BB70-A1F2DE838927}" srcOrd="2" destOrd="0" parTransId="{B3190613-65B9-4B35-A3C9-B1EE9CE92680}" sibTransId="{B91D1E2B-0197-41C8-A204-2B2A910CCBAD}"/>
     <dgm:cxn modelId="{E83556E2-E91B-4BA9-99D1-436A774A99FE}" type="presOf" srcId="{218B3E38-4A00-4E9A-BB70-A1F2DE838927}" destId="{52D48580-1518-41E4-BB8E-6E29D9715AC0}" srcOrd="0" destOrd="0" presId="urn:microsoft.com/office/officeart/2005/8/layout/vProcess5"/>
+    <dgm:cxn modelId="{BA871EF4-D07B-4B92-84C7-0E8C0313B4EA}" type="presOf" srcId="{B91D1E2B-0197-41C8-A204-2B2A910CCBAD}" destId="{A97AF2A3-D5A1-4153-92D4-0401739D13ED}" srcOrd="0" destOrd="0" presId="urn:microsoft.com/office/officeart/2005/8/layout/vProcess5"/>
     <dgm:cxn modelId="{7D4089F5-0F12-4F75-A641-14E46E5BA109}" srcId="{271DD4EE-57F8-40F7-845C-22470035B818}" destId="{C880C0E0-BCEF-46A2-AA9D-D0E21C861779}" srcOrd="0" destOrd="0" parTransId="{2F424606-04C5-48A9-BF1B-E91203DECF26}" sibTransId="{CC95784C-DA6A-4D2E-B6B8-F27AA84E7558}"/>
-    <dgm:cxn modelId="{85B4629C-8910-4A50-B815-AC345A4D5F20}" srcId="{271DD4EE-57F8-40F7-845C-22470035B818}" destId="{25465040-D6E0-491F-BFEF-7AC6C4CCA63A}" srcOrd="1" destOrd="0" parTransId="{D247150F-8E05-44B4-B153-B6236E19DAA9}" sibTransId="{AACE7D99-FD8A-4D3A-9B1F-F52509A4917A}"/>
-    <dgm:cxn modelId="{20097012-B6B4-4812-816E-E1EB06E38458}" type="presOf" srcId="{C880C0E0-BCEF-46A2-AA9D-D0E21C861779}" destId="{142FCFD9-0A5F-4610-AAD4-6813F27702AF}" srcOrd="1" destOrd="0" presId="urn:microsoft.com/office/officeart/2005/8/layout/vProcess5"/>
-    <dgm:cxn modelId="{CD7BF50D-61C5-4216-9A27-0B8F428564D6}" srcId="{271DD4EE-57F8-40F7-845C-22470035B818}" destId="{7FDF271C-A7B8-4591-A64C-02DFF4691E8B}" srcOrd="3" destOrd="0" parTransId="{97294BDC-6B36-457C-B678-7A4DDDF901FE}" sibTransId="{3592D8B4-A2D7-48E5-9697-B2B93175D739}"/>
-    <dgm:cxn modelId="{FA5D5B64-5DD2-4685-8B35-41CDFF477759}" type="presOf" srcId="{7FDF271C-A7B8-4591-A64C-02DFF4691E8B}" destId="{488307EB-D907-48A6-9F69-577A71182CFB}" srcOrd="1" destOrd="0" presId="urn:microsoft.com/office/officeart/2005/8/layout/vProcess5"/>
-    <dgm:cxn modelId="{BA871EF4-D07B-4B92-84C7-0E8C0313B4EA}" type="presOf" srcId="{B91D1E2B-0197-41C8-A204-2B2A910CCBAD}" destId="{A97AF2A3-D5A1-4153-92D4-0401739D13ED}" srcOrd="0" destOrd="0" presId="urn:microsoft.com/office/officeart/2005/8/layout/vProcess5"/>
-    <dgm:cxn modelId="{C2282945-792F-4E2A-A0CE-1F8CA8136F42}" type="presOf" srcId="{C880C0E0-BCEF-46A2-AA9D-D0E21C861779}" destId="{A8121A04-B714-4533-9F72-D7EBB5EDC57D}" srcOrd="0" destOrd="0" presId="urn:microsoft.com/office/officeart/2005/8/layout/vProcess5"/>
-    <dgm:cxn modelId="{30B25B04-B17C-4426-9D0B-E590BD74E995}" type="presOf" srcId="{7FDF271C-A7B8-4591-A64C-02DFF4691E8B}" destId="{0A594760-2D87-472F-A10D-A65F004336E6}" srcOrd="0" destOrd="0" presId="urn:microsoft.com/office/officeart/2005/8/layout/vProcess5"/>
-    <dgm:cxn modelId="{1778C017-53CF-4790-B941-206295FD90E9}" type="presOf" srcId="{3592D8B4-A2D7-48E5-9697-B2B93175D739}" destId="{965DEC57-8D5F-40A3-8E09-5ED42BE4B685}" srcOrd="0" destOrd="0" presId="urn:microsoft.com/office/officeart/2005/8/layout/vProcess5"/>
-    <dgm:cxn modelId="{1C112DB7-EEAC-49EC-A683-2CDC57AE4024}" type="presOf" srcId="{CC95784C-DA6A-4D2E-B6B8-F27AA84E7558}" destId="{A655F6FF-C64E-432B-A89F-5BEEE4E78B94}" srcOrd="0" destOrd="0" presId="urn:microsoft.com/office/officeart/2005/8/layout/vProcess5"/>
-    <dgm:cxn modelId="{17BC6C91-3EBC-4643-9840-6938A827DE5C}" type="presOf" srcId="{218B3E38-4A00-4E9A-BB70-A1F2DE838927}" destId="{6AC27933-09AC-4592-B378-AA65F7851254}" srcOrd="1" destOrd="0" presId="urn:microsoft.com/office/officeart/2005/8/layout/vProcess5"/>
-    <dgm:cxn modelId="{AB710DC0-513E-4FF4-8B4F-218B2AFFD007}" type="presOf" srcId="{AACE7D99-FD8A-4D3A-9B1F-F52509A4917A}" destId="{5857C2BA-3C51-45C9-93DE-C1F54E2A1205}" srcOrd="0" destOrd="0" presId="urn:microsoft.com/office/officeart/2005/8/layout/vProcess5"/>
-    <dgm:cxn modelId="{C903F12A-2924-4FA4-8A76-58C47342E98E}" type="presOf" srcId="{25465040-D6E0-491F-BFEF-7AC6C4CCA63A}" destId="{CB5B90B0-EC9F-4B63-8D21-B17090BA3857}" srcOrd="0" destOrd="0" presId="urn:microsoft.com/office/officeart/2005/8/layout/vProcess5"/>
-    <dgm:cxn modelId="{17BDBC88-D1C8-48C1-99B8-EAE98FDFD552}" srcId="{271DD4EE-57F8-40F7-845C-22470035B818}" destId="{B6168D25-DF91-4C0F-A4D9-FD1DE8A4805C}" srcOrd="4" destOrd="0" parTransId="{E84122A5-0E57-40A3-8643-3D76A28F7568}" sibTransId="{50C5F863-F1ED-4139-AF47-63DBC27B1E48}"/>
     <dgm:cxn modelId="{7B8A52F6-5F99-45AD-9609-AEE4E4F8B00C}" type="presOf" srcId="{25465040-D6E0-491F-BFEF-7AC6C4CCA63A}" destId="{76B61CA4-4286-4B65-9CFA-9B996CBED5A6}" srcOrd="1" destOrd="0" presId="urn:microsoft.com/office/officeart/2005/8/layout/vProcess5"/>
-    <dgm:cxn modelId="{7CC44602-3BDC-4E88-BC5D-17B53709B663}" type="presOf" srcId="{B6168D25-DF91-4C0F-A4D9-FD1DE8A4805C}" destId="{593AA8DC-4C5D-4210-B768-7F1DA7BC899B}" srcOrd="0" destOrd="0" presId="urn:microsoft.com/office/officeart/2005/8/layout/vProcess5"/>
-    <dgm:cxn modelId="{F75EC590-8C71-485C-B965-4331391691C9}" type="presOf" srcId="{B6168D25-DF91-4C0F-A4D9-FD1DE8A4805C}" destId="{8B1FBEDF-11BD-4039-8E45-6106C5B2464E}" srcOrd="1" destOrd="0" presId="urn:microsoft.com/office/officeart/2005/8/layout/vProcess5"/>
     <dgm:cxn modelId="{59904291-E3EC-4544-B679-312A4BD42EC5}" type="presParOf" srcId="{CDDA9C92-60D0-40B1-81C7-600474E2C4E7}" destId="{3B3D4009-2D07-4F1A-BDEF-C348B37A9CB6}" srcOrd="0" destOrd="0" presId="urn:microsoft.com/office/officeart/2005/8/layout/vProcess5"/>
     <dgm:cxn modelId="{6C1B8112-A4D5-41D8-B735-72598C54976F}" type="presParOf" srcId="{CDDA9C92-60D0-40B1-81C7-600474E2C4E7}" destId="{A8121A04-B714-4533-9F72-D7EBB5EDC57D}" srcOrd="1" destOrd="0" presId="urn:microsoft.com/office/officeart/2005/8/layout/vProcess5"/>
     <dgm:cxn modelId="{7553A56C-92C6-46F2-9160-EC6617D5A436}" type="presParOf" srcId="{CDDA9C92-60D0-40B1-81C7-600474E2C4E7}" destId="{CB5B90B0-EC9F-4B63-8D21-B17090BA3857}" srcOrd="2" destOrd="0" presId="urn:microsoft.com/office/officeart/2005/8/layout/vProcess5"/>
@@ -6243,7 +6005,7 @@
   <dgm:whole/>
   <dgm:extLst>
     <a:ext uri="http://schemas.microsoft.com/office/drawing/2008/diagram">
-      <dsp:dataModelExt xmlns:dsp="http://schemas.microsoft.com/office/drawing/2008/diagram" relId="rId7" minVer="http://schemas.openxmlformats.org/drawingml/2006/diagram"/>
+      <dsp:dataModelExt xmlns:dsp="http://schemas.microsoft.com/office/drawing/2008/diagram" relId="rId8" minVer="http://schemas.openxmlformats.org/drawingml/2006/diagram"/>
     </a:ext>
   </dgm:extLst>
 </dgm:dataModel>
@@ -6476,13 +6238,6 @@
         </dgm:presLayoutVars>
       </dgm:prSet>
       <dgm:spPr/>
-      <dgm:t>
-        <a:bodyPr/>
-        <a:lstStyle/>
-        <a:p>
-          <a:endParaRPr lang="es-ES"/>
-        </a:p>
-      </dgm:t>
     </dgm:pt>
     <dgm:pt modelId="{06FEC478-3763-4C9F-96EB-0D855ECB2175}" type="pres">
       <dgm:prSet presAssocID="{FFB78F1D-7997-45FE-90D0-22AFBF48BA1B}" presName="arrow" presStyleLbl="bgShp" presStyleIdx="0" presStyleCnt="1"/>
@@ -6503,13 +6258,6 @@
         </dgm:presLayoutVars>
       </dgm:prSet>
       <dgm:spPr/>
-      <dgm:t>
-        <a:bodyPr/>
-        <a:lstStyle/>
-        <a:p>
-          <a:endParaRPr lang="es-ES"/>
-        </a:p>
-      </dgm:t>
     </dgm:pt>
     <dgm:pt modelId="{57A5E7D5-8EF2-4AAB-ADB9-97CD76290BB1}" type="pres">
       <dgm:prSet presAssocID="{925D3A10-FFE3-486C-9E5A-80B39F9BBE1F}" presName="circleA" presStyleLbl="node1" presStyleIdx="0" presStyleCnt="5"/>
@@ -6534,13 +6282,6 @@
         </dgm:presLayoutVars>
       </dgm:prSet>
       <dgm:spPr/>
-      <dgm:t>
-        <a:bodyPr/>
-        <a:lstStyle/>
-        <a:p>
-          <a:endParaRPr lang="es-ES"/>
-        </a:p>
-      </dgm:t>
     </dgm:pt>
     <dgm:pt modelId="{EF1CF030-0BD9-4A62-A450-33AC5755D388}" type="pres">
       <dgm:prSet presAssocID="{3A6F725F-4AD4-4091-A821-0B359E9F1F16}" presName="circleB" presStyleLbl="node1" presStyleIdx="1" presStyleCnt="5"/>
@@ -6565,13 +6306,6 @@
         </dgm:presLayoutVars>
       </dgm:prSet>
       <dgm:spPr/>
-      <dgm:t>
-        <a:bodyPr/>
-        <a:lstStyle/>
-        <a:p>
-          <a:endParaRPr lang="es-ES"/>
-        </a:p>
-      </dgm:t>
     </dgm:pt>
     <dgm:pt modelId="{50AE2BFB-BC30-40F4-A2C1-4CA1C683B9D2}" type="pres">
       <dgm:prSet presAssocID="{742647B7-2853-45A5-BC2D-E7EBFB1C9647}" presName="circleA" presStyleLbl="node1" presStyleIdx="2" presStyleCnt="5"/>
@@ -6596,13 +6330,6 @@
         </dgm:presLayoutVars>
       </dgm:prSet>
       <dgm:spPr/>
-      <dgm:t>
-        <a:bodyPr/>
-        <a:lstStyle/>
-        <a:p>
-          <a:endParaRPr lang="es-ES"/>
-        </a:p>
-      </dgm:t>
     </dgm:pt>
     <dgm:pt modelId="{46D2E244-4BEB-448C-A4B4-4E3DD4AF4769}" type="pres">
       <dgm:prSet presAssocID="{BC94A9CA-59AE-4237-87C3-9114DD6F446A}" presName="circleB" presStyleLbl="node1" presStyleIdx="3" presStyleCnt="5"/>
@@ -6627,13 +6354,6 @@
         </dgm:presLayoutVars>
       </dgm:prSet>
       <dgm:spPr/>
-      <dgm:t>
-        <a:bodyPr/>
-        <a:lstStyle/>
-        <a:p>
-          <a:endParaRPr lang="es-ES"/>
-        </a:p>
-      </dgm:t>
     </dgm:pt>
     <dgm:pt modelId="{408C14BE-95FC-4266-93B0-6958C9620755}" type="pres">
       <dgm:prSet presAssocID="{F33B6B21-EC65-46A8-8F89-18AB900B1D9F}" presName="circleA" presStyleLbl="node1" presStyleIdx="4" presStyleCnt="5"/>
@@ -6646,16 +6366,16 @@
   </dgm:ptLst>
   <dgm:cxnLst>
     <dgm:cxn modelId="{D55D1806-837E-4188-AF96-AAD92E68DEF4}" type="presOf" srcId="{742647B7-2853-45A5-BC2D-E7EBFB1C9647}" destId="{FE53D0EC-30C1-4A72-8CB8-606F2F15A87A}" srcOrd="0" destOrd="0" presId="urn:microsoft.com/office/officeart/2005/8/layout/hProcess11"/>
-    <dgm:cxn modelId="{70EA14DD-43A9-4CB5-B3B6-69911DF21451}" srcId="{FFB78F1D-7997-45FE-90D0-22AFBF48BA1B}" destId="{3A6F725F-4AD4-4091-A821-0B359E9F1F16}" srcOrd="1" destOrd="0" parTransId="{F4468C8C-9F57-496B-90DA-5142D35B8813}" sibTransId="{D734F0F8-EF51-4CB6-89E1-0B50A95A2F6B}"/>
+    <dgm:cxn modelId="{0797AB1B-893D-44E6-8026-8124D36B404C}" type="presOf" srcId="{925D3A10-FFE3-486C-9E5A-80B39F9BBE1F}" destId="{7170267B-56FA-4B0F-B86C-2CCE81C91A82}" srcOrd="0" destOrd="0" presId="urn:microsoft.com/office/officeart/2005/8/layout/hProcess11"/>
+    <dgm:cxn modelId="{3573B11B-E013-40C2-8E15-02D08606AE0E}" srcId="{FFB78F1D-7997-45FE-90D0-22AFBF48BA1B}" destId="{925D3A10-FFE3-486C-9E5A-80B39F9BBE1F}" srcOrd="0" destOrd="0" parTransId="{14C7FFBB-7902-405D-A84C-EDA6C0561116}" sibTransId="{F8245B3A-A3C9-4E9F-9E05-A02CC9DB55A8}"/>
     <dgm:cxn modelId="{A6C4F35C-5E1F-4972-A003-44F47F42C76C}" srcId="{FFB78F1D-7997-45FE-90D0-22AFBF48BA1B}" destId="{BC94A9CA-59AE-4237-87C3-9114DD6F446A}" srcOrd="3" destOrd="0" parTransId="{8A275AAB-4186-4621-9DA1-F4F2D071287B}" sibTransId="{80904D73-3347-4765-9CB8-9C4A42D120D3}"/>
-    <dgm:cxn modelId="{3573B11B-E013-40C2-8E15-02D08606AE0E}" srcId="{FFB78F1D-7997-45FE-90D0-22AFBF48BA1B}" destId="{925D3A10-FFE3-486C-9E5A-80B39F9BBE1F}" srcOrd="0" destOrd="0" parTransId="{14C7FFBB-7902-405D-A84C-EDA6C0561116}" sibTransId="{F8245B3A-A3C9-4E9F-9E05-A02CC9DB55A8}"/>
-    <dgm:cxn modelId="{0797AB1B-893D-44E6-8026-8124D36B404C}" type="presOf" srcId="{925D3A10-FFE3-486C-9E5A-80B39F9BBE1F}" destId="{7170267B-56FA-4B0F-B86C-2CCE81C91A82}" srcOrd="0" destOrd="0" presId="urn:microsoft.com/office/officeart/2005/8/layout/hProcess11"/>
-    <dgm:cxn modelId="{8C908388-E7E0-40CE-91FB-A7729A02F8DA}" type="presOf" srcId="{FFB78F1D-7997-45FE-90D0-22AFBF48BA1B}" destId="{A1C7DF7C-399B-4BE0-A991-1B3E8F23A39A}" srcOrd="0" destOrd="0" presId="urn:microsoft.com/office/officeart/2005/8/layout/hProcess11"/>
     <dgm:cxn modelId="{06FF305D-5AD6-4017-9CA5-B51316310B0D}" type="presOf" srcId="{F33B6B21-EC65-46A8-8F89-18AB900B1D9F}" destId="{6BA6D5D1-59BE-429F-A63B-5554EEFFFC69}" srcOrd="0" destOrd="0" presId="urn:microsoft.com/office/officeart/2005/8/layout/hProcess11"/>
     <dgm:cxn modelId="{B008F14C-175F-4DAE-A7A6-11451FA065E4}" srcId="{FFB78F1D-7997-45FE-90D0-22AFBF48BA1B}" destId="{742647B7-2853-45A5-BC2D-E7EBFB1C9647}" srcOrd="2" destOrd="0" parTransId="{833C21DA-A23C-4CC0-AEC1-B166653AF2AF}" sibTransId="{246570F2-0F59-44C7-BD9C-DB41579259CB}"/>
+    <dgm:cxn modelId="{9FB5C070-C1F0-4D4A-BF22-05E542BA10D7}" type="presOf" srcId="{3A6F725F-4AD4-4091-A821-0B359E9F1F16}" destId="{7E9EB6B0-13CB-4576-B8D2-BD502C63E18D}" srcOrd="0" destOrd="0" presId="urn:microsoft.com/office/officeart/2005/8/layout/hProcess11"/>
+    <dgm:cxn modelId="{8C908388-E7E0-40CE-91FB-A7729A02F8DA}" type="presOf" srcId="{FFB78F1D-7997-45FE-90D0-22AFBF48BA1B}" destId="{A1C7DF7C-399B-4BE0-A991-1B3E8F23A39A}" srcOrd="0" destOrd="0" presId="urn:microsoft.com/office/officeart/2005/8/layout/hProcess11"/>
     <dgm:cxn modelId="{5C0BA0BC-C3DA-4B77-AE21-668257A57AB5}" srcId="{FFB78F1D-7997-45FE-90D0-22AFBF48BA1B}" destId="{F33B6B21-EC65-46A8-8F89-18AB900B1D9F}" srcOrd="4" destOrd="0" parTransId="{AC08EA0A-11FF-45B0-87D8-9CAEF7212E03}" sibTransId="{64F3AF6F-DC76-41D6-9634-1D2222FC770B}"/>
+    <dgm:cxn modelId="{70EA14DD-43A9-4CB5-B3B6-69911DF21451}" srcId="{FFB78F1D-7997-45FE-90D0-22AFBF48BA1B}" destId="{3A6F725F-4AD4-4091-A821-0B359E9F1F16}" srcOrd="1" destOrd="0" parTransId="{F4468C8C-9F57-496B-90DA-5142D35B8813}" sibTransId="{D734F0F8-EF51-4CB6-89E1-0B50A95A2F6B}"/>
     <dgm:cxn modelId="{84E00EE2-BE97-4928-9C18-FA98F6B1C8F1}" type="presOf" srcId="{BC94A9CA-59AE-4237-87C3-9114DD6F446A}" destId="{937D5AD5-F981-497E-8B56-D44F1371293F}" srcOrd="0" destOrd="0" presId="urn:microsoft.com/office/officeart/2005/8/layout/hProcess11"/>
-    <dgm:cxn modelId="{9FB5C070-C1F0-4D4A-BF22-05E542BA10D7}" type="presOf" srcId="{3A6F725F-4AD4-4091-A821-0B359E9F1F16}" destId="{7E9EB6B0-13CB-4576-B8D2-BD502C63E18D}" srcOrd="0" destOrd="0" presId="urn:microsoft.com/office/officeart/2005/8/layout/hProcess11"/>
     <dgm:cxn modelId="{18480525-2B89-45AA-B0AF-6B71F648E31A}" type="presParOf" srcId="{A1C7DF7C-399B-4BE0-A991-1B3E8F23A39A}" destId="{06FEC478-3763-4C9F-96EB-0D855ECB2175}" srcOrd="0" destOrd="0" presId="urn:microsoft.com/office/officeart/2005/8/layout/hProcess11"/>
     <dgm:cxn modelId="{B0A371FD-01C4-421C-B3D6-A2D9D9188E61}" type="presParOf" srcId="{A1C7DF7C-399B-4BE0-A991-1B3E8F23A39A}" destId="{65B4F677-DBB3-4D19-B386-ACCD22FF3EB9}" srcOrd="1" destOrd="0" presId="urn:microsoft.com/office/officeart/2005/8/layout/hProcess11"/>
     <dgm:cxn modelId="{9A0928C3-C8D6-4433-AB3F-EF33B59B93F8}" type="presParOf" srcId="{65B4F677-DBB3-4D19-B386-ACCD22FF3EB9}" destId="{620B2A13-D65A-4684-8951-DBD720E1DE2A}" srcOrd="0" destOrd="0" presId="urn:microsoft.com/office/officeart/2005/8/layout/hProcess11"/>
@@ -6687,7 +6407,7 @@
   <dgm:whole/>
   <dgm:extLst>
     <a:ext uri="http://schemas.microsoft.com/office/drawing/2008/diagram">
-      <dsp:dataModelExt xmlns:dsp="http://schemas.microsoft.com/office/drawing/2008/diagram" relId="rId6" minVer="http://schemas.openxmlformats.org/drawingml/2006/diagram"/>
+      <dsp:dataModelExt xmlns:dsp="http://schemas.microsoft.com/office/drawing/2008/diagram" relId="rId7" minVer="http://schemas.openxmlformats.org/drawingml/2006/diagram"/>
     </a:ext>
   </dgm:extLst>
 </dgm:dataModel>
@@ -6715,10 +6435,14 @@
         <a:lstStyle/>
         <a:p>
           <a:r>
-            <a:rPr lang="en-GB" sz="1400" b="0" i="0" dirty="0"/>
+            <a:rPr lang="en-GB" sz="1400" b="0" i="0" dirty="0">
+              <a:latin typeface="Quattrocento Sans" panose="020B0604020202020204" charset="0"/>
+            </a:rPr>
             <a:t>Early research on adaptability and on Bluetooth technology. </a:t>
           </a:r>
-          <a:endParaRPr lang="es-ES" sz="1400" dirty="0"/>
+          <a:endParaRPr lang="es-ES" sz="1400" dirty="0">
+            <a:latin typeface="Quattrocento Sans" panose="020B0604020202020204" charset="0"/>
+          </a:endParaRPr>
         </a:p>
       </dgm:t>
     </dgm:pt>
@@ -6729,7 +6453,9 @@
         <a:bodyPr/>
         <a:lstStyle/>
         <a:p>
-          <a:endParaRPr lang="es-ES" sz="1400"/>
+          <a:endParaRPr lang="es-ES" sz="1400">
+            <a:latin typeface="Quattrocento Sans" panose="020B0604020202020204" charset="0"/>
+          </a:endParaRPr>
         </a:p>
       </dgm:t>
     </dgm:pt>
@@ -6740,7 +6466,9 @@
         <a:bodyPr/>
         <a:lstStyle/>
         <a:p>
-          <a:endParaRPr lang="es-ES" sz="1400"/>
+          <a:endParaRPr lang="es-ES" sz="1400">
+            <a:latin typeface="Quattrocento Sans" panose="020B0604020202020204" charset="0"/>
+          </a:endParaRPr>
         </a:p>
       </dgm:t>
     </dgm:pt>
@@ -6752,10 +6480,14 @@
         <a:lstStyle/>
         <a:p>
           <a:r>
-            <a:rPr lang="en-GB" sz="1400" b="0" i="0" dirty="0"/>
+            <a:rPr lang="en-GB" sz="1400" b="0" i="0" dirty="0">
+              <a:latin typeface="Quattrocento Sans" panose="020B0604020202020204" charset="0"/>
+            </a:rPr>
             <a:t>Applications that allow us to test the accuracy of the beacons.</a:t>
           </a:r>
-          <a:endParaRPr lang="es-ES" sz="1400" dirty="0"/>
+          <a:endParaRPr lang="es-ES" sz="1400" dirty="0">
+            <a:latin typeface="Quattrocento Sans" panose="020B0604020202020204" charset="0"/>
+          </a:endParaRPr>
         </a:p>
       </dgm:t>
     </dgm:pt>
@@ -6766,7 +6498,9 @@
         <a:bodyPr/>
         <a:lstStyle/>
         <a:p>
-          <a:endParaRPr lang="es-ES" sz="1400"/>
+          <a:endParaRPr lang="es-ES" sz="1400">
+            <a:latin typeface="Quattrocento Sans" panose="020B0604020202020204" charset="0"/>
+          </a:endParaRPr>
         </a:p>
       </dgm:t>
     </dgm:pt>
@@ -6777,7 +6511,9 @@
         <a:bodyPr/>
         <a:lstStyle/>
         <a:p>
-          <a:endParaRPr lang="es-ES" sz="1400"/>
+          <a:endParaRPr lang="es-ES" sz="1400">
+            <a:latin typeface="Quattrocento Sans" panose="020B0604020202020204" charset="0"/>
+          </a:endParaRPr>
         </a:p>
       </dgm:t>
     </dgm:pt>
@@ -6793,14 +6529,19 @@
               <a:highlight>
                 <a:srgbClr val="CC95ED"/>
               </a:highlight>
+              <a:latin typeface="Quattrocento Sans" panose="020B0604020202020204" charset="0"/>
             </a:rPr>
             <a:t>Evaluation</a:t>
           </a:r>
           <a:r>
-            <a:rPr lang="en-GB" sz="1400" b="0" i="0" dirty="0"/>
+            <a:rPr lang="en-GB" sz="1400" b="0" i="0" dirty="0">
+              <a:latin typeface="Quattrocento Sans" panose="020B0604020202020204" charset="0"/>
+            </a:rPr>
             <a:t> of the application.</a:t>
           </a:r>
-          <a:endParaRPr lang="es-ES" sz="1400" dirty="0"/>
+          <a:endParaRPr lang="es-ES" sz="1400" dirty="0">
+            <a:latin typeface="Quattrocento Sans" panose="020B0604020202020204" charset="0"/>
+          </a:endParaRPr>
         </a:p>
       </dgm:t>
     </dgm:pt>
@@ -6811,7 +6552,9 @@
         <a:bodyPr/>
         <a:lstStyle/>
         <a:p>
-          <a:endParaRPr lang="es-ES" sz="1400"/>
+          <a:endParaRPr lang="es-ES" sz="1400">
+            <a:latin typeface="Quattrocento Sans" panose="020B0604020202020204" charset="0"/>
+          </a:endParaRPr>
         </a:p>
       </dgm:t>
     </dgm:pt>
@@ -6822,7 +6565,9 @@
         <a:bodyPr/>
         <a:lstStyle/>
         <a:p>
-          <a:endParaRPr lang="es-ES" sz="1400"/>
+          <a:endParaRPr lang="es-ES" sz="1400">
+            <a:latin typeface="Quattrocento Sans" panose="020B0604020202020204" charset="0"/>
+          </a:endParaRPr>
         </a:p>
       </dgm:t>
     </dgm:pt>
@@ -6834,7 +6579,9 @@
         <a:lstStyle/>
         <a:p>
           <a:r>
-            <a:rPr lang="en-GB" sz="1400" b="0" i="0" dirty="0"/>
+            <a:rPr lang="en-GB" sz="1400" b="0" i="0" dirty="0">
+              <a:latin typeface="Quattrocento Sans" panose="020B0604020202020204" charset="0"/>
+            </a:rPr>
             <a:t>Adaptation of the </a:t>
           </a:r>
           <a:r>
@@ -6842,14 +6589,19 @@
               <a:highlight>
                 <a:srgbClr val="CC95ED"/>
               </a:highlight>
+              <a:latin typeface="Quattrocento Sans" panose="020B0604020202020204" charset="0"/>
             </a:rPr>
             <a:t>server</a:t>
           </a:r>
           <a:r>
-            <a:rPr lang="en-GB" sz="1400" b="0" i="0" dirty="0"/>
+            <a:rPr lang="en-GB" sz="1400" b="0" i="0" dirty="0">
+              <a:latin typeface="Quattrocento Sans" panose="020B0604020202020204" charset="0"/>
+            </a:rPr>
             <a:t> code.</a:t>
           </a:r>
-          <a:endParaRPr lang="es-ES" sz="1400" dirty="0"/>
+          <a:endParaRPr lang="es-ES" sz="1400" dirty="0">
+            <a:latin typeface="Quattrocento Sans" panose="020B0604020202020204" charset="0"/>
+          </a:endParaRPr>
         </a:p>
       </dgm:t>
     </dgm:pt>
@@ -6860,7 +6612,9 @@
         <a:bodyPr/>
         <a:lstStyle/>
         <a:p>
-          <a:endParaRPr lang="es-ES" sz="1400"/>
+          <a:endParaRPr lang="es-ES" sz="1400">
+            <a:latin typeface="Quattrocento Sans" panose="020B0604020202020204" charset="0"/>
+          </a:endParaRPr>
         </a:p>
       </dgm:t>
     </dgm:pt>
@@ -6871,7 +6625,9 @@
         <a:bodyPr/>
         <a:lstStyle/>
         <a:p>
-          <a:endParaRPr lang="es-ES" sz="1400"/>
+          <a:endParaRPr lang="es-ES" sz="1400">
+            <a:latin typeface="Quattrocento Sans" panose="020B0604020202020204" charset="0"/>
+          </a:endParaRPr>
         </a:p>
       </dgm:t>
     </dgm:pt>
@@ -6883,7 +6639,9 @@
         <a:lstStyle/>
         <a:p>
           <a:r>
-            <a:rPr lang="en-GB" sz="1400" b="0" i="0" dirty="0"/>
+            <a:rPr lang="en-GB" sz="1400" b="0" i="0" dirty="0">
+              <a:latin typeface="Quattrocento Sans" panose="020B0604020202020204" charset="0"/>
+            </a:rPr>
             <a:t>Mute and how to use functionalities and code necessary regarding </a:t>
           </a:r>
           <a:r>
@@ -6891,22 +6649,31 @@
               <a:highlight>
                 <a:srgbClr val="CC95ED"/>
               </a:highlight>
+              <a:latin typeface="Quattrocento Sans" panose="020B0604020202020204" charset="0"/>
             </a:rPr>
             <a:t>route monitoring</a:t>
           </a:r>
           <a:r>
-            <a:rPr lang="en-GB" sz="1400" b="0" i="0" dirty="0"/>
+            <a:rPr lang="en-GB" sz="1400" b="0" i="0" dirty="0">
+              <a:latin typeface="Quattrocento Sans" panose="020B0604020202020204" charset="0"/>
+            </a:rPr>
             <a:t> in the </a:t>
           </a:r>
           <a:r>
-            <a:rPr lang="en-GB" sz="1400" b="0" i="0" u="none" dirty="0"/>
+            <a:rPr lang="en-GB" sz="1400" b="0" i="0" u="none" dirty="0">
+              <a:latin typeface="Quattrocento Sans" panose="020B0604020202020204" charset="0"/>
+            </a:rPr>
             <a:t>client</a:t>
           </a:r>
           <a:r>
-            <a:rPr lang="en-GB" sz="1400" b="0" i="0" dirty="0"/>
+            <a:rPr lang="en-GB" sz="1400" b="0" i="0" dirty="0">
+              <a:latin typeface="Quattrocento Sans" panose="020B0604020202020204" charset="0"/>
+            </a:rPr>
             <a:t>.</a:t>
           </a:r>
-          <a:endParaRPr lang="es-ES" sz="1400" dirty="0"/>
+          <a:endParaRPr lang="es-ES" sz="1400" dirty="0">
+            <a:latin typeface="Quattrocento Sans" panose="020B0604020202020204" charset="0"/>
+          </a:endParaRPr>
         </a:p>
       </dgm:t>
     </dgm:pt>
@@ -6917,7 +6684,9 @@
         <a:bodyPr/>
         <a:lstStyle/>
         <a:p>
-          <a:endParaRPr lang="es-ES" sz="1400"/>
+          <a:endParaRPr lang="es-ES" sz="1400">
+            <a:latin typeface="Quattrocento Sans" panose="020B0604020202020204" charset="0"/>
+          </a:endParaRPr>
         </a:p>
       </dgm:t>
     </dgm:pt>
@@ -6928,7 +6697,9 @@
         <a:bodyPr/>
         <a:lstStyle/>
         <a:p>
-          <a:endParaRPr lang="es-ES" sz="1400"/>
+          <a:endParaRPr lang="es-ES" sz="1400">
+            <a:latin typeface="Quattrocento Sans" panose="020B0604020202020204" charset="0"/>
+          </a:endParaRPr>
         </a:p>
       </dgm:t>
     </dgm:pt>
@@ -6941,13 +6712,6 @@
         </dgm:presLayoutVars>
       </dgm:prSet>
       <dgm:spPr/>
-      <dgm:t>
-        <a:bodyPr/>
-        <a:lstStyle/>
-        <a:p>
-          <a:endParaRPr lang="es-ES"/>
-        </a:p>
-      </dgm:t>
     </dgm:pt>
     <dgm:pt modelId="{4F5A4815-2E29-479E-8863-7ABAC99F7CE4}" type="pres">
       <dgm:prSet presAssocID="{40F480B9-5185-4903-84F4-F28DE27221CC}" presName="thickLine" presStyleLbl="alignNode1" presStyleIdx="0" presStyleCnt="5"/>
@@ -6960,13 +6724,6 @@
     <dgm:pt modelId="{29C823AE-3170-4FA5-A755-C88A48738C1C}" type="pres">
       <dgm:prSet presAssocID="{40F480B9-5185-4903-84F4-F28DE27221CC}" presName="tx1" presStyleLbl="revTx" presStyleIdx="0" presStyleCnt="5"/>
       <dgm:spPr/>
-      <dgm:t>
-        <a:bodyPr/>
-        <a:lstStyle/>
-        <a:p>
-          <a:endParaRPr lang="es-ES"/>
-        </a:p>
-      </dgm:t>
     </dgm:pt>
     <dgm:pt modelId="{A4DBB364-FFFB-417D-852F-C0384278785F}" type="pres">
       <dgm:prSet presAssocID="{40F480B9-5185-4903-84F4-F28DE27221CC}" presName="vert1" presStyleCnt="0"/>
@@ -6983,13 +6740,6 @@
     <dgm:pt modelId="{6FAA08E1-B284-4112-823F-2EDB0376823E}" type="pres">
       <dgm:prSet presAssocID="{4FE625AE-B256-46B5-B961-8C1705F8C13B}" presName="tx1" presStyleLbl="revTx" presStyleIdx="1" presStyleCnt="5"/>
       <dgm:spPr/>
-      <dgm:t>
-        <a:bodyPr/>
-        <a:lstStyle/>
-        <a:p>
-          <a:endParaRPr lang="es-ES"/>
-        </a:p>
-      </dgm:t>
     </dgm:pt>
     <dgm:pt modelId="{79E39EA6-18B0-4DAC-B6D6-E488C4AE0A40}" type="pres">
       <dgm:prSet presAssocID="{4FE625AE-B256-46B5-B961-8C1705F8C13B}" presName="vert1" presStyleCnt="0"/>
@@ -7006,13 +6756,6 @@
     <dgm:pt modelId="{F61C7BB7-4804-4ABF-B4FC-152C120EF1C4}" type="pres">
       <dgm:prSet presAssocID="{1A270EF2-B54C-42C5-90A0-BEAEEE0EA7F7}" presName="tx1" presStyleLbl="revTx" presStyleIdx="2" presStyleCnt="5"/>
       <dgm:spPr/>
-      <dgm:t>
-        <a:bodyPr/>
-        <a:lstStyle/>
-        <a:p>
-          <a:endParaRPr lang="es-ES"/>
-        </a:p>
-      </dgm:t>
     </dgm:pt>
     <dgm:pt modelId="{B8B9F9BC-A5CB-458D-A999-AE33B4441EDE}" type="pres">
       <dgm:prSet presAssocID="{1A270EF2-B54C-42C5-90A0-BEAEEE0EA7F7}" presName="vert1" presStyleCnt="0"/>
@@ -7029,13 +6772,6 @@
     <dgm:pt modelId="{08EA734C-D6D0-4A8D-9073-BF51B3BEFD5F}" type="pres">
       <dgm:prSet presAssocID="{E329FE42-B82D-44DF-8112-D0F6536418DB}" presName="tx1" presStyleLbl="revTx" presStyleIdx="3" presStyleCnt="5"/>
       <dgm:spPr/>
-      <dgm:t>
-        <a:bodyPr/>
-        <a:lstStyle/>
-        <a:p>
-          <a:endParaRPr lang="es-ES"/>
-        </a:p>
-      </dgm:t>
     </dgm:pt>
     <dgm:pt modelId="{12D6E2FD-7BBF-4CCF-994D-FF40FD7B171E}" type="pres">
       <dgm:prSet presAssocID="{E329FE42-B82D-44DF-8112-D0F6536418DB}" presName="vert1" presStyleCnt="0"/>
@@ -7052,13 +6788,6 @@
     <dgm:pt modelId="{1DAE29DE-17CA-4955-B3A4-6E962056C8F6}" type="pres">
       <dgm:prSet presAssocID="{F840A262-8447-467E-8CD1-6C1102C35342}" presName="tx1" presStyleLbl="revTx" presStyleIdx="4" presStyleCnt="5"/>
       <dgm:spPr/>
-      <dgm:t>
-        <a:bodyPr/>
-        <a:lstStyle/>
-        <a:p>
-          <a:endParaRPr lang="es-ES"/>
-        </a:p>
-      </dgm:t>
     </dgm:pt>
     <dgm:pt modelId="{AFC44F6C-8EAF-4270-9A20-C00402FB6F95}" type="pres">
       <dgm:prSet presAssocID="{F840A262-8447-467E-8CD1-6C1102C35342}" presName="vert1" presStyleCnt="0"/>
@@ -7066,17 +6795,17 @@
     </dgm:pt>
   </dgm:ptLst>
   <dgm:cxnLst>
+    <dgm:cxn modelId="{98BEF907-C20E-4B20-B419-F4DA9A8DBBF1}" srcId="{507EC6F4-C02D-4AAE-BBFA-25B753F7A16E}" destId="{E329FE42-B82D-44DF-8112-D0F6536418DB}" srcOrd="3" destOrd="0" parTransId="{DF653A61-F163-4BC5-BDDB-504B43550AB7}" sibTransId="{94BBFB75-5E46-4B02-AD9E-BE71BCE94379}"/>
+    <dgm:cxn modelId="{3577E339-F313-421D-8FFC-49A160D76F52}" srcId="{507EC6F4-C02D-4AAE-BBFA-25B753F7A16E}" destId="{4FE625AE-B256-46B5-B961-8C1705F8C13B}" srcOrd="1" destOrd="0" parTransId="{7C8CAFD8-44CD-4116-8F7B-260CFB8E1920}" sibTransId="{910A2A32-B4B0-4E86-93A2-83E7DBEE7F47}"/>
+    <dgm:cxn modelId="{AF896A68-AC72-421F-A181-043632A9C52E}" type="presOf" srcId="{F840A262-8447-467E-8CD1-6C1102C35342}" destId="{1DAE29DE-17CA-4955-B3A4-6E962056C8F6}" srcOrd="0" destOrd="0" presId="urn:microsoft.com/office/officeart/2008/layout/LinedList"/>
     <dgm:cxn modelId="{AC0DA08D-1ADE-4F2E-9E21-115C0678B741}" type="presOf" srcId="{1A270EF2-B54C-42C5-90A0-BEAEEE0EA7F7}" destId="{F61C7BB7-4804-4ABF-B4FC-152C120EF1C4}" srcOrd="0" destOrd="0" presId="urn:microsoft.com/office/officeart/2008/layout/LinedList"/>
-    <dgm:cxn modelId="{5B33D8B8-0533-4B81-8CEF-3C9DED6C4F47}" type="presOf" srcId="{E329FE42-B82D-44DF-8112-D0F6536418DB}" destId="{08EA734C-D6D0-4A8D-9073-BF51B3BEFD5F}" srcOrd="0" destOrd="0" presId="urn:microsoft.com/office/officeart/2008/layout/LinedList"/>
-    <dgm:cxn modelId="{231381AF-FA21-45FD-AC17-4894CF6D0DF5}" srcId="{507EC6F4-C02D-4AAE-BBFA-25B753F7A16E}" destId="{F840A262-8447-467E-8CD1-6C1102C35342}" srcOrd="4" destOrd="0" parTransId="{60ECE8FA-58D3-4ADB-A5AB-AAA314D6ABED}" sibTransId="{B351DFCA-8311-4F35-B05C-EB575BB6B63B}"/>
-    <dgm:cxn modelId="{C38E8BFC-5A15-4239-9D1B-2560E41A2E9A}" type="presOf" srcId="{4FE625AE-B256-46B5-B961-8C1705F8C13B}" destId="{6FAA08E1-B284-4112-823F-2EDB0376823E}" srcOrd="0" destOrd="0" presId="urn:microsoft.com/office/officeart/2008/layout/LinedList"/>
     <dgm:cxn modelId="{863BA08D-2113-44EF-96C2-5CF1AA26BB5F}" type="presOf" srcId="{40F480B9-5185-4903-84F4-F28DE27221CC}" destId="{29C823AE-3170-4FA5-A755-C88A48738C1C}" srcOrd="0" destOrd="0" presId="urn:microsoft.com/office/officeart/2008/layout/LinedList"/>
     <dgm:cxn modelId="{F7D0C692-9D6A-4B2A-ACE5-853E7DD64A80}" srcId="{507EC6F4-C02D-4AAE-BBFA-25B753F7A16E}" destId="{1A270EF2-B54C-42C5-90A0-BEAEEE0EA7F7}" srcOrd="2" destOrd="0" parTransId="{FD42FB86-9E66-45EA-9587-C007FF3559D1}" sibTransId="{E73DDF7A-6799-4674-B561-61F594E7DF3B}"/>
-    <dgm:cxn modelId="{AF896A68-AC72-421F-A181-043632A9C52E}" type="presOf" srcId="{F840A262-8447-467E-8CD1-6C1102C35342}" destId="{1DAE29DE-17CA-4955-B3A4-6E962056C8F6}" srcOrd="0" destOrd="0" presId="urn:microsoft.com/office/officeart/2008/layout/LinedList"/>
+    <dgm:cxn modelId="{231381AF-FA21-45FD-AC17-4894CF6D0DF5}" srcId="{507EC6F4-C02D-4AAE-BBFA-25B753F7A16E}" destId="{F840A262-8447-467E-8CD1-6C1102C35342}" srcOrd="4" destOrd="0" parTransId="{60ECE8FA-58D3-4ADB-A5AB-AAA314D6ABED}" sibTransId="{B351DFCA-8311-4F35-B05C-EB575BB6B63B}"/>
+    <dgm:cxn modelId="{5B33D8B8-0533-4B81-8CEF-3C9DED6C4F47}" type="presOf" srcId="{E329FE42-B82D-44DF-8112-D0F6536418DB}" destId="{08EA734C-D6D0-4A8D-9073-BF51B3BEFD5F}" srcOrd="0" destOrd="0" presId="urn:microsoft.com/office/officeart/2008/layout/LinedList"/>
+    <dgm:cxn modelId="{ED9FA7D5-8ABF-46A2-8A51-F1FE7AAD51C1}" type="presOf" srcId="{507EC6F4-C02D-4AAE-BBFA-25B753F7A16E}" destId="{E58C3805-475E-4689-8BA4-18F76034A3D4}" srcOrd="0" destOrd="0" presId="urn:microsoft.com/office/officeart/2008/layout/LinedList"/>
     <dgm:cxn modelId="{F55E7FEB-6D9B-4070-A66E-C088FC4807D6}" srcId="{507EC6F4-C02D-4AAE-BBFA-25B753F7A16E}" destId="{40F480B9-5185-4903-84F4-F28DE27221CC}" srcOrd="0" destOrd="0" parTransId="{32721A24-0FEA-4D0A-91AC-5BEDBC3B1509}" sibTransId="{F8F22EF7-3119-4F2E-BEA7-84827630CD99}"/>
-    <dgm:cxn modelId="{ED9FA7D5-8ABF-46A2-8A51-F1FE7AAD51C1}" type="presOf" srcId="{507EC6F4-C02D-4AAE-BBFA-25B753F7A16E}" destId="{E58C3805-475E-4689-8BA4-18F76034A3D4}" srcOrd="0" destOrd="0" presId="urn:microsoft.com/office/officeart/2008/layout/LinedList"/>
-    <dgm:cxn modelId="{98BEF907-C20E-4B20-B419-F4DA9A8DBBF1}" srcId="{507EC6F4-C02D-4AAE-BBFA-25B753F7A16E}" destId="{E329FE42-B82D-44DF-8112-D0F6536418DB}" srcOrd="3" destOrd="0" parTransId="{DF653A61-F163-4BC5-BDDB-504B43550AB7}" sibTransId="{94BBFB75-5E46-4B02-AD9E-BE71BCE94379}"/>
-    <dgm:cxn modelId="{3577E339-F313-421D-8FFC-49A160D76F52}" srcId="{507EC6F4-C02D-4AAE-BBFA-25B753F7A16E}" destId="{4FE625AE-B256-46B5-B961-8C1705F8C13B}" srcOrd="1" destOrd="0" parTransId="{7C8CAFD8-44CD-4116-8F7B-260CFB8E1920}" sibTransId="{910A2A32-B4B0-4E86-93A2-83E7DBEE7F47}"/>
+    <dgm:cxn modelId="{C38E8BFC-5A15-4239-9D1B-2560E41A2E9A}" type="presOf" srcId="{4FE625AE-B256-46B5-B961-8C1705F8C13B}" destId="{6FAA08E1-B284-4112-823F-2EDB0376823E}" srcOrd="0" destOrd="0" presId="urn:microsoft.com/office/officeart/2008/layout/LinedList"/>
     <dgm:cxn modelId="{9B2BF208-937C-4FA8-8964-5DFEAF599BDA}" type="presParOf" srcId="{E58C3805-475E-4689-8BA4-18F76034A3D4}" destId="{4F5A4815-2E29-479E-8863-7ABAC99F7CE4}" srcOrd="0" destOrd="0" presId="urn:microsoft.com/office/officeart/2008/layout/LinedList"/>
     <dgm:cxn modelId="{CCA46072-7E17-4E35-B40A-273B27A1BFB8}" type="presParOf" srcId="{E58C3805-475E-4689-8BA4-18F76034A3D4}" destId="{D66CD0F7-A12D-47C9-ACC4-BB160D692280}" srcOrd="1" destOrd="0" presId="urn:microsoft.com/office/officeart/2008/layout/LinedList"/>
     <dgm:cxn modelId="{5B838ABE-7AA3-4AB3-A8D7-1F0565121F50}" type="presParOf" srcId="{D66CD0F7-A12D-47C9-ACC4-BB160D692280}" destId="{29C823AE-3170-4FA5-A755-C88A48738C1C}" srcOrd="0" destOrd="0" presId="urn:microsoft.com/office/officeart/2008/layout/LinedList"/>
@@ -7102,7 +6831,7 @@
   <dgm:whole/>
   <dgm:extLst>
     <a:ext uri="http://schemas.microsoft.com/office/drawing/2008/diagram">
-      <dsp:dataModelExt xmlns:dsp="http://schemas.microsoft.com/office/drawing/2008/diagram" relId="rId6" minVer="http://schemas.openxmlformats.org/drawingml/2006/diagram"/>
+      <dsp:dataModelExt xmlns:dsp="http://schemas.microsoft.com/office/drawing/2008/diagram" relId="rId7" minVer="http://schemas.openxmlformats.org/drawingml/2006/diagram"/>
     </a:ext>
   </dgm:extLst>
 </dgm:dataModel>
@@ -7544,13 +7273,6 @@
         </dgm:presLayoutVars>
       </dgm:prSet>
       <dgm:spPr/>
-      <dgm:t>
-        <a:bodyPr/>
-        <a:lstStyle/>
-        <a:p>
-          <a:endParaRPr lang="es-ES"/>
-        </a:p>
-      </dgm:t>
     </dgm:pt>
     <dgm:pt modelId="{4F5A4815-2E29-479E-8863-7ABAC99F7CE4}" type="pres">
       <dgm:prSet presAssocID="{40F480B9-5185-4903-84F4-F28DE27221CC}" presName="thickLine" presStyleLbl="alignNode1" presStyleIdx="0" presStyleCnt="4"/>
@@ -7563,13 +7285,6 @@
     <dgm:pt modelId="{29C823AE-3170-4FA5-A755-C88A48738C1C}" type="pres">
       <dgm:prSet presAssocID="{40F480B9-5185-4903-84F4-F28DE27221CC}" presName="tx1" presStyleLbl="revTx" presStyleIdx="0" presStyleCnt="4"/>
       <dgm:spPr/>
-      <dgm:t>
-        <a:bodyPr/>
-        <a:lstStyle/>
-        <a:p>
-          <a:endParaRPr lang="es-ES"/>
-        </a:p>
-      </dgm:t>
     </dgm:pt>
     <dgm:pt modelId="{A4DBB364-FFFB-417D-852F-C0384278785F}" type="pres">
       <dgm:prSet presAssocID="{40F480B9-5185-4903-84F4-F28DE27221CC}" presName="vert1" presStyleCnt="0"/>
@@ -7586,13 +7301,6 @@
     <dgm:pt modelId="{6FAA08E1-B284-4112-823F-2EDB0376823E}" type="pres">
       <dgm:prSet presAssocID="{4FE625AE-B256-46B5-B961-8C1705F8C13B}" presName="tx1" presStyleLbl="revTx" presStyleIdx="1" presStyleCnt="4"/>
       <dgm:spPr/>
-      <dgm:t>
-        <a:bodyPr/>
-        <a:lstStyle/>
-        <a:p>
-          <a:endParaRPr lang="es-ES"/>
-        </a:p>
-      </dgm:t>
     </dgm:pt>
     <dgm:pt modelId="{79E39EA6-18B0-4DAC-B6D6-E488C4AE0A40}" type="pres">
       <dgm:prSet presAssocID="{4FE625AE-B256-46B5-B961-8C1705F8C13B}" presName="vert1" presStyleCnt="0"/>
@@ -7609,13 +7317,6 @@
     <dgm:pt modelId="{F61C7BB7-4804-4ABF-B4FC-152C120EF1C4}" type="pres">
       <dgm:prSet presAssocID="{1A270EF2-B54C-42C5-90A0-BEAEEE0EA7F7}" presName="tx1" presStyleLbl="revTx" presStyleIdx="2" presStyleCnt="4"/>
       <dgm:spPr/>
-      <dgm:t>
-        <a:bodyPr/>
-        <a:lstStyle/>
-        <a:p>
-          <a:endParaRPr lang="es-ES"/>
-        </a:p>
-      </dgm:t>
     </dgm:pt>
     <dgm:pt modelId="{B8B9F9BC-A5CB-458D-A999-AE33B4441EDE}" type="pres">
       <dgm:prSet presAssocID="{1A270EF2-B54C-42C5-90A0-BEAEEE0EA7F7}" presName="vert1" presStyleCnt="0"/>
@@ -7632,13 +7333,6 @@
     <dgm:pt modelId="{1DAE29DE-17CA-4955-B3A4-6E962056C8F6}" type="pres">
       <dgm:prSet presAssocID="{F840A262-8447-467E-8CD1-6C1102C35342}" presName="tx1" presStyleLbl="revTx" presStyleIdx="3" presStyleCnt="4"/>
       <dgm:spPr/>
-      <dgm:t>
-        <a:bodyPr/>
-        <a:lstStyle/>
-        <a:p>
-          <a:endParaRPr lang="es-ES"/>
-        </a:p>
-      </dgm:t>
     </dgm:pt>
     <dgm:pt modelId="{AFC44F6C-8EAF-4270-9A20-C00402FB6F95}" type="pres">
       <dgm:prSet presAssocID="{F840A262-8447-467E-8CD1-6C1102C35342}" presName="vert1" presStyleCnt="0"/>
@@ -7646,15 +7340,15 @@
     </dgm:pt>
   </dgm:ptLst>
   <dgm:cxnLst>
+    <dgm:cxn modelId="{3577E339-F313-421D-8FFC-49A160D76F52}" srcId="{507EC6F4-C02D-4AAE-BBFA-25B753F7A16E}" destId="{4FE625AE-B256-46B5-B961-8C1705F8C13B}" srcOrd="1" destOrd="0" parTransId="{7C8CAFD8-44CD-4116-8F7B-260CFB8E1920}" sibTransId="{910A2A32-B4B0-4E86-93A2-83E7DBEE7F47}"/>
     <dgm:cxn modelId="{E424BB4E-C3C0-4E0E-B376-AA58030F127D}" type="presOf" srcId="{40F480B9-5185-4903-84F4-F28DE27221CC}" destId="{29C823AE-3170-4FA5-A755-C88A48738C1C}" srcOrd="0" destOrd="0" presId="urn:microsoft.com/office/officeart/2008/layout/LinedList"/>
     <dgm:cxn modelId="{C7006883-4BF0-472B-9BCA-59E6D23AD832}" type="presOf" srcId="{F840A262-8447-467E-8CD1-6C1102C35342}" destId="{1DAE29DE-17CA-4955-B3A4-6E962056C8F6}" srcOrd="0" destOrd="0" presId="urn:microsoft.com/office/officeart/2008/layout/LinedList"/>
-    <dgm:cxn modelId="{231381AF-FA21-45FD-AC17-4894CF6D0DF5}" srcId="{507EC6F4-C02D-4AAE-BBFA-25B753F7A16E}" destId="{F840A262-8447-467E-8CD1-6C1102C35342}" srcOrd="3" destOrd="0" parTransId="{60ECE8FA-58D3-4ADB-A5AB-AAA314D6ABED}" sibTransId="{B351DFCA-8311-4F35-B05C-EB575BB6B63B}"/>
+    <dgm:cxn modelId="{27AAE783-DF65-493E-A558-5D9419C43B4F}" type="presOf" srcId="{1A270EF2-B54C-42C5-90A0-BEAEEE0EA7F7}" destId="{F61C7BB7-4804-4ABF-B4FC-152C120EF1C4}" srcOrd="0" destOrd="0" presId="urn:microsoft.com/office/officeart/2008/layout/LinedList"/>
     <dgm:cxn modelId="{F7D0C692-9D6A-4B2A-ACE5-853E7DD64A80}" srcId="{507EC6F4-C02D-4AAE-BBFA-25B753F7A16E}" destId="{1A270EF2-B54C-42C5-90A0-BEAEEE0EA7F7}" srcOrd="2" destOrd="0" parTransId="{FD42FB86-9E66-45EA-9587-C007FF3559D1}" sibTransId="{E73DDF7A-6799-4674-B561-61F594E7DF3B}"/>
     <dgm:cxn modelId="{A127259D-6C13-4D49-829A-116E5ADF2D0A}" type="presOf" srcId="{507EC6F4-C02D-4AAE-BBFA-25B753F7A16E}" destId="{E58C3805-475E-4689-8BA4-18F76034A3D4}" srcOrd="0" destOrd="0" presId="urn:microsoft.com/office/officeart/2008/layout/LinedList"/>
+    <dgm:cxn modelId="{231381AF-FA21-45FD-AC17-4894CF6D0DF5}" srcId="{507EC6F4-C02D-4AAE-BBFA-25B753F7A16E}" destId="{F840A262-8447-467E-8CD1-6C1102C35342}" srcOrd="3" destOrd="0" parTransId="{60ECE8FA-58D3-4ADB-A5AB-AAA314D6ABED}" sibTransId="{B351DFCA-8311-4F35-B05C-EB575BB6B63B}"/>
+    <dgm:cxn modelId="{FB691FB9-921C-40AB-850C-3CBB78035597}" type="presOf" srcId="{4FE625AE-B256-46B5-B961-8C1705F8C13B}" destId="{6FAA08E1-B284-4112-823F-2EDB0376823E}" srcOrd="0" destOrd="0" presId="urn:microsoft.com/office/officeart/2008/layout/LinedList"/>
     <dgm:cxn modelId="{F55E7FEB-6D9B-4070-A66E-C088FC4807D6}" srcId="{507EC6F4-C02D-4AAE-BBFA-25B753F7A16E}" destId="{40F480B9-5185-4903-84F4-F28DE27221CC}" srcOrd="0" destOrd="0" parTransId="{32721A24-0FEA-4D0A-91AC-5BEDBC3B1509}" sibTransId="{F8F22EF7-3119-4F2E-BEA7-84827630CD99}"/>
-    <dgm:cxn modelId="{27AAE783-DF65-493E-A558-5D9419C43B4F}" type="presOf" srcId="{1A270EF2-B54C-42C5-90A0-BEAEEE0EA7F7}" destId="{F61C7BB7-4804-4ABF-B4FC-152C120EF1C4}" srcOrd="0" destOrd="0" presId="urn:microsoft.com/office/officeart/2008/layout/LinedList"/>
-    <dgm:cxn modelId="{FB691FB9-921C-40AB-850C-3CBB78035597}" type="presOf" srcId="{4FE625AE-B256-46B5-B961-8C1705F8C13B}" destId="{6FAA08E1-B284-4112-823F-2EDB0376823E}" srcOrd="0" destOrd="0" presId="urn:microsoft.com/office/officeart/2008/layout/LinedList"/>
-    <dgm:cxn modelId="{3577E339-F313-421D-8FFC-49A160D76F52}" srcId="{507EC6F4-C02D-4AAE-BBFA-25B753F7A16E}" destId="{4FE625AE-B256-46B5-B961-8C1705F8C13B}" srcOrd="1" destOrd="0" parTransId="{7C8CAFD8-44CD-4116-8F7B-260CFB8E1920}" sibTransId="{910A2A32-B4B0-4E86-93A2-83E7DBEE7F47}"/>
     <dgm:cxn modelId="{B646635C-980B-422E-AB64-D4C3D49940DF}" type="presParOf" srcId="{E58C3805-475E-4689-8BA4-18F76034A3D4}" destId="{4F5A4815-2E29-479E-8863-7ABAC99F7CE4}" srcOrd="0" destOrd="0" presId="urn:microsoft.com/office/officeart/2008/layout/LinedList"/>
     <dgm:cxn modelId="{3150F983-E7D3-42AA-9D2C-11AABAFBFE1A}" type="presParOf" srcId="{E58C3805-475E-4689-8BA4-18F76034A3D4}" destId="{D66CD0F7-A12D-47C9-ACC4-BB160D692280}" srcOrd="1" destOrd="0" presId="urn:microsoft.com/office/officeart/2008/layout/LinedList"/>
     <dgm:cxn modelId="{F4C90A4F-14D2-42A3-B428-F3F82907418B}" type="presParOf" srcId="{D66CD0F7-A12D-47C9-ACC4-BB160D692280}" destId="{29C823AE-3170-4FA5-A755-C88A48738C1C}" srcOrd="0" destOrd="0" presId="urn:microsoft.com/office/officeart/2008/layout/LinedList"/>
@@ -7676,7 +7370,7 @@
   <dgm:whole/>
   <dgm:extLst>
     <a:ext uri="http://schemas.microsoft.com/office/drawing/2008/diagram">
-      <dsp:dataModelExt xmlns:dsp="http://schemas.microsoft.com/office/drawing/2008/diagram" relId="rId6" minVer="http://schemas.openxmlformats.org/drawingml/2006/diagram"/>
+      <dsp:dataModelExt xmlns:dsp="http://schemas.microsoft.com/office/drawing/2008/diagram" relId="rId7" minVer="http://schemas.openxmlformats.org/drawingml/2006/diagram"/>
     </a:ext>
   </dgm:extLst>
 </dgm:dataModel>
@@ -7746,7 +7440,7 @@
         </a:bodyPr>
         <a:lstStyle/>
         <a:p>
-          <a:pPr lvl="0" algn="ctr" defTabSz="1022350">
+          <a:pPr marL="0" lvl="0" indent="0" algn="ctr" defTabSz="1022350">
             <a:lnSpc>
               <a:spcPct val="90000"/>
             </a:lnSpc>
@@ -7756,6 +7450,7 @@
             <a:spcAft>
               <a:spcPct val="35000"/>
             </a:spcAft>
+            <a:buNone/>
           </a:pPr>
           <a:r>
             <a:rPr lang="es-ES" sz="2300" kern="1200" dirty="0"/>
@@ -7815,7 +7510,7 @@
         </a:bodyPr>
         <a:lstStyle/>
         <a:p>
-          <a:pPr lvl="0" algn="ctr" defTabSz="577850">
+          <a:pPr marL="0" lvl="0" indent="0" algn="ctr" defTabSz="577850">
             <a:lnSpc>
               <a:spcPct val="90000"/>
             </a:lnSpc>
@@ -7825,6 +7520,7 @@
             <a:spcAft>
               <a:spcPct val="35000"/>
             </a:spcAft>
+            <a:buNone/>
           </a:pPr>
           <a:endParaRPr lang="es-ES" sz="1300" kern="1200"/>
         </a:p>
@@ -7890,7 +7586,7 @@
         </a:bodyPr>
         <a:lstStyle/>
         <a:p>
-          <a:pPr lvl="0" algn="ctr" defTabSz="1022350">
+          <a:pPr marL="0" lvl="0" indent="0" algn="ctr" defTabSz="1022350">
             <a:lnSpc>
               <a:spcPct val="90000"/>
             </a:lnSpc>
@@ -7900,6 +7596,7 @@
             <a:spcAft>
               <a:spcPct val="35000"/>
             </a:spcAft>
+            <a:buNone/>
           </a:pPr>
           <a:r>
             <a:rPr lang="es-ES" sz="2300" kern="1200" dirty="0"/>
@@ -7959,7 +7656,7 @@
         </a:bodyPr>
         <a:lstStyle/>
         <a:p>
-          <a:pPr lvl="0" algn="ctr" defTabSz="577850">
+          <a:pPr marL="0" lvl="0" indent="0" algn="ctr" defTabSz="577850">
             <a:lnSpc>
               <a:spcPct val="90000"/>
             </a:lnSpc>
@@ -7969,6 +7666,7 @@
             <a:spcAft>
               <a:spcPct val="35000"/>
             </a:spcAft>
+            <a:buNone/>
           </a:pPr>
           <a:endParaRPr lang="es-ES" sz="1300" kern="1200"/>
         </a:p>
@@ -8034,7 +7732,7 @@
         </a:bodyPr>
         <a:lstStyle/>
         <a:p>
-          <a:pPr lvl="0" algn="ctr" defTabSz="1022350">
+          <a:pPr marL="0" lvl="0" indent="0" algn="ctr" defTabSz="1022350">
             <a:lnSpc>
               <a:spcPct val="90000"/>
             </a:lnSpc>
@@ -8044,6 +7742,7 @@
             <a:spcAft>
               <a:spcPct val="35000"/>
             </a:spcAft>
+            <a:buNone/>
           </a:pPr>
           <a:r>
             <a:rPr lang="es-ES" sz="2300" kern="1200" dirty="0"/>
@@ -8103,7 +7802,7 @@
         </a:bodyPr>
         <a:lstStyle/>
         <a:p>
-          <a:pPr lvl="0" algn="ctr" defTabSz="577850">
+          <a:pPr marL="0" lvl="0" indent="0" algn="ctr" defTabSz="577850">
             <a:lnSpc>
               <a:spcPct val="90000"/>
             </a:lnSpc>
@@ -8113,6 +7812,7 @@
             <a:spcAft>
               <a:spcPct val="35000"/>
             </a:spcAft>
+            <a:buNone/>
           </a:pPr>
           <a:endParaRPr lang="es-ES" sz="1300" kern="1200"/>
         </a:p>
@@ -8190,7 +7890,7 @@
         </a:bodyPr>
         <a:lstStyle/>
         <a:p>
-          <a:pPr lvl="0" algn="ctr" defTabSz="533400">
+          <a:pPr marL="0" lvl="0" indent="0" algn="ctr" defTabSz="533400">
             <a:lnSpc>
               <a:spcPct val="90000"/>
             </a:lnSpc>
@@ -8200,6 +7900,7 @@
             <a:spcAft>
               <a:spcPct val="35000"/>
             </a:spcAft>
+            <a:buNone/>
           </a:pPr>
           <a:r>
             <a:rPr lang="en-US" sz="1200" b="0" i="0" kern="1200" dirty="0"/>
@@ -8273,7 +7974,7 @@
         </a:bodyPr>
         <a:lstStyle/>
         <a:p>
-          <a:pPr lvl="0" algn="ctr" defTabSz="533400">
+          <a:pPr marL="0" lvl="0" indent="0" algn="ctr" defTabSz="533400">
             <a:lnSpc>
               <a:spcPct val="90000"/>
             </a:lnSpc>
@@ -8283,6 +7984,7 @@
             <a:spcAft>
               <a:spcPct val="35000"/>
             </a:spcAft>
+            <a:buNone/>
           </a:pPr>
           <a:r>
             <a:rPr lang="en-US" sz="1200" b="0" i="0" kern="1200" dirty="0" err="1"/>
@@ -8368,7 +8070,7 @@
         </a:bodyPr>
         <a:lstStyle/>
         <a:p>
-          <a:pPr lvl="0" algn="ctr" defTabSz="533400">
+          <a:pPr marL="0" lvl="0" indent="0" algn="ctr" defTabSz="533400">
             <a:lnSpc>
               <a:spcPct val="90000"/>
             </a:lnSpc>
@@ -8378,6 +8080,7 @@
             <a:spcAft>
               <a:spcPct val="35000"/>
             </a:spcAft>
+            <a:buNone/>
           </a:pPr>
           <a:r>
             <a:rPr lang="en-US" sz="1200" b="0" i="0" kern="1200" dirty="0" err="1"/>
@@ -8487,7 +8190,7 @@
         </a:bodyPr>
         <a:lstStyle/>
         <a:p>
-          <a:pPr lvl="0" algn="ctr" defTabSz="533400">
+          <a:pPr marL="0" lvl="0" indent="0" algn="ctr" defTabSz="533400">
             <a:lnSpc>
               <a:spcPct val="90000"/>
             </a:lnSpc>
@@ -8497,6 +8200,7 @@
             <a:spcAft>
               <a:spcPct val="35000"/>
             </a:spcAft>
+            <a:buNone/>
           </a:pPr>
           <a:r>
             <a:rPr lang="en-US" sz="1200" b="0" i="0" kern="1200" dirty="0" err="1"/>
@@ -8586,7 +8290,7 @@
         </a:bodyPr>
         <a:lstStyle/>
         <a:p>
-          <a:pPr lvl="0" algn="l" defTabSz="444500">
+          <a:pPr marL="0" lvl="0" indent="0" algn="l" defTabSz="444500">
             <a:lnSpc>
               <a:spcPct val="90000"/>
             </a:lnSpc>
@@ -8596,6 +8300,7 @@
             <a:spcAft>
               <a:spcPct val="35000"/>
             </a:spcAft>
+            <a:buNone/>
           </a:pPr>
           <a:r>
             <a:rPr lang="es-ES" sz="1000" b="0" kern="1200" dirty="0"/>
@@ -8680,7 +8385,7 @@
         </a:bodyPr>
         <a:lstStyle/>
         <a:p>
-          <a:pPr lvl="0" algn="l" defTabSz="444500">
+          <a:pPr marL="0" lvl="0" indent="0" algn="l" defTabSz="444500">
             <a:lnSpc>
               <a:spcPct val="90000"/>
             </a:lnSpc>
@@ -8690,6 +8395,7 @@
             <a:spcAft>
               <a:spcPct val="35000"/>
             </a:spcAft>
+            <a:buNone/>
           </a:pPr>
           <a:r>
             <a:rPr lang="en-US" sz="1000" b="0" i="0" kern="1200" dirty="0" err="1"/>
@@ -8783,7 +8489,7 @@
         </a:bodyPr>
         <a:lstStyle/>
         <a:p>
-          <a:pPr lvl="0" algn="l" defTabSz="444500">
+          <a:pPr marL="0" lvl="0" indent="0" algn="l" defTabSz="444500">
             <a:lnSpc>
               <a:spcPct val="90000"/>
             </a:lnSpc>
@@ -8793,6 +8499,7 @@
             <a:spcAft>
               <a:spcPct val="35000"/>
             </a:spcAft>
+            <a:buNone/>
           </a:pPr>
           <a:r>
             <a:rPr lang="es-ES" sz="1000" b="0" kern="1200" dirty="0"/>
@@ -8869,7 +8576,7 @@
         </a:bodyPr>
         <a:lstStyle/>
         <a:p>
-          <a:pPr lvl="0" algn="l" defTabSz="444500">
+          <a:pPr marL="0" lvl="0" indent="0" algn="l" defTabSz="444500">
             <a:lnSpc>
               <a:spcPct val="90000"/>
             </a:lnSpc>
@@ -8879,6 +8586,7 @@
             <a:spcAft>
               <a:spcPct val="35000"/>
             </a:spcAft>
+            <a:buNone/>
           </a:pPr>
           <a:r>
             <a:rPr lang="en-US" sz="1000" b="0" i="0" kern="1200" dirty="0" err="1"/>
@@ -8964,7 +8672,7 @@
         </a:bodyPr>
         <a:lstStyle/>
         <a:p>
-          <a:pPr lvl="0" algn="l" defTabSz="444500">
+          <a:pPr marL="0" lvl="0" indent="0" algn="l" defTabSz="444500">
             <a:lnSpc>
               <a:spcPct val="90000"/>
             </a:lnSpc>
@@ -8974,6 +8682,7 @@
             <a:spcAft>
               <a:spcPct val="35000"/>
             </a:spcAft>
+            <a:buNone/>
           </a:pPr>
           <a:r>
             <a:rPr lang="es-ES" sz="1000" b="0" kern="1200" dirty="0"/>
@@ -9053,7 +8762,7 @@
         </a:bodyPr>
         <a:lstStyle/>
         <a:p>
-          <a:pPr lvl="0" algn="ctr" defTabSz="444500">
+          <a:pPr marL="0" lvl="0" indent="0" algn="ctr" defTabSz="444500">
             <a:lnSpc>
               <a:spcPct val="90000"/>
             </a:lnSpc>
@@ -9063,6 +8772,7 @@
             <a:spcAft>
               <a:spcPct val="35000"/>
             </a:spcAft>
+            <a:buNone/>
           </a:pPr>
           <a:endParaRPr lang="es-ES" sz="1000" kern="1200"/>
         </a:p>
@@ -9131,7 +8841,7 @@
         </a:bodyPr>
         <a:lstStyle/>
         <a:p>
-          <a:pPr lvl="0" algn="ctr" defTabSz="444500">
+          <a:pPr marL="0" lvl="0" indent="0" algn="ctr" defTabSz="444500">
             <a:lnSpc>
               <a:spcPct val="90000"/>
             </a:lnSpc>
@@ -9141,6 +8851,7 @@
             <a:spcAft>
               <a:spcPct val="35000"/>
             </a:spcAft>
+            <a:buNone/>
           </a:pPr>
           <a:endParaRPr lang="es-ES" sz="1000" kern="1200"/>
         </a:p>
@@ -9209,7 +8920,7 @@
         </a:bodyPr>
         <a:lstStyle/>
         <a:p>
-          <a:pPr lvl="0" algn="ctr" defTabSz="444500">
+          <a:pPr marL="0" lvl="0" indent="0" algn="ctr" defTabSz="444500">
             <a:lnSpc>
               <a:spcPct val="90000"/>
             </a:lnSpc>
@@ -9219,6 +8930,7 @@
             <a:spcAft>
               <a:spcPct val="35000"/>
             </a:spcAft>
+            <a:buNone/>
           </a:pPr>
           <a:endParaRPr lang="es-ES" sz="1000" kern="1200"/>
         </a:p>
@@ -9287,7 +8999,7 @@
         </a:bodyPr>
         <a:lstStyle/>
         <a:p>
-          <a:pPr lvl="0" algn="ctr" defTabSz="444500">
+          <a:pPr marL="0" lvl="0" indent="0" algn="ctr" defTabSz="444500">
             <a:lnSpc>
               <a:spcPct val="90000"/>
             </a:lnSpc>
@@ -9297,6 +9009,7 @@
             <a:spcAft>
               <a:spcPct val="35000"/>
             </a:spcAft>
+            <a:buNone/>
           </a:pPr>
           <a:endParaRPr lang="es-ES" sz="1000" kern="1200"/>
         </a:p>
@@ -9395,7 +9108,7 @@
         </a:bodyPr>
         <a:lstStyle/>
         <a:p>
-          <a:pPr lvl="0" algn="ctr" defTabSz="533400">
+          <a:pPr marL="0" lvl="0" indent="0" algn="ctr" defTabSz="533400">
             <a:lnSpc>
               <a:spcPct val="90000"/>
             </a:lnSpc>
@@ -9405,6 +9118,7 @@
             <a:spcAft>
               <a:spcPct val="35000"/>
             </a:spcAft>
+            <a:buNone/>
           </a:pPr>
           <a:r>
             <a:rPr lang="es-ES" sz="1200" b="0" i="0" kern="1200" dirty="0">
@@ -9508,7 +9222,7 @@
         </a:bodyPr>
         <a:lstStyle/>
         <a:p>
-          <a:pPr lvl="0" algn="ctr" defTabSz="533400">
+          <a:pPr marL="0" lvl="0" indent="0" algn="ctr" defTabSz="533400">
             <a:lnSpc>
               <a:spcPct val="90000"/>
             </a:lnSpc>
@@ -9518,6 +9232,7 @@
             <a:spcAft>
               <a:spcPct val="35000"/>
             </a:spcAft>
+            <a:buNone/>
           </a:pPr>
           <a:r>
             <a:rPr lang="es-ES" sz="1200" b="0" i="0" kern="1200" dirty="0">
@@ -9621,7 +9336,7 @@
         </a:bodyPr>
         <a:lstStyle/>
         <a:p>
-          <a:pPr lvl="0" algn="ctr" defTabSz="533400">
+          <a:pPr marL="0" lvl="0" indent="0" algn="ctr" defTabSz="533400">
             <a:lnSpc>
               <a:spcPct val="90000"/>
             </a:lnSpc>
@@ -9631,6 +9346,7 @@
             <a:spcAft>
               <a:spcPct val="35000"/>
             </a:spcAft>
+            <a:buNone/>
           </a:pPr>
           <a:r>
             <a:rPr lang="es-ES" sz="1200" b="0" i="0" kern="1200" dirty="0">
@@ -9734,7 +9450,7 @@
         </a:bodyPr>
         <a:lstStyle/>
         <a:p>
-          <a:pPr lvl="0" algn="ctr" defTabSz="533400">
+          <a:pPr marL="0" lvl="0" indent="0" algn="ctr" defTabSz="533400">
             <a:lnSpc>
               <a:spcPct val="90000"/>
             </a:lnSpc>
@@ -9744,6 +9460,7 @@
             <a:spcAft>
               <a:spcPct val="35000"/>
             </a:spcAft>
+            <a:buNone/>
           </a:pPr>
           <a:r>
             <a:rPr lang="es-ES" sz="1200" b="0" i="0" kern="1200" dirty="0">
@@ -9847,7 +9564,7 @@
         </a:bodyPr>
         <a:lstStyle/>
         <a:p>
-          <a:pPr lvl="0" algn="ctr" defTabSz="533400">
+          <a:pPr marL="0" lvl="0" indent="0" algn="ctr" defTabSz="533400">
             <a:lnSpc>
               <a:spcPct val="90000"/>
             </a:lnSpc>
@@ -9857,6 +9574,7 @@
             <a:spcAft>
               <a:spcPct val="35000"/>
             </a:spcAft>
+            <a:buNone/>
           </a:pPr>
           <a:r>
             <a:rPr lang="es-ES" sz="1200" b="0" i="0" kern="1200" dirty="0">
@@ -10022,7 +9740,7 @@
         </a:bodyPr>
         <a:lstStyle/>
         <a:p>
-          <a:pPr lvl="0" algn="l" defTabSz="622300">
+          <a:pPr marL="0" lvl="0" indent="0" algn="l" defTabSz="622300">
             <a:lnSpc>
               <a:spcPct val="90000"/>
             </a:lnSpc>
@@ -10032,12 +9750,17 @@
             <a:spcAft>
               <a:spcPct val="35000"/>
             </a:spcAft>
+            <a:buNone/>
           </a:pPr>
           <a:r>
-            <a:rPr lang="en-GB" sz="1400" b="0" i="0" kern="1200" dirty="0"/>
+            <a:rPr lang="en-GB" sz="1400" b="0" i="0" kern="1200" dirty="0">
+              <a:latin typeface="Quattrocento Sans" panose="020B0604020202020204" charset="0"/>
+            </a:rPr>
             <a:t>Early research on adaptability and on Bluetooth technology. </a:t>
           </a:r>
-          <a:endParaRPr lang="es-ES" sz="1400" kern="1200" dirty="0"/>
+          <a:endParaRPr lang="es-ES" sz="1400" kern="1200" dirty="0">
+            <a:latin typeface="Quattrocento Sans" panose="020B0604020202020204" charset="0"/>
+          </a:endParaRPr>
         </a:p>
       </dsp:txBody>
       <dsp:txXfrm>
@@ -10132,7 +9855,7 @@
         </a:bodyPr>
         <a:lstStyle/>
         <a:p>
-          <a:pPr lvl="0" algn="l" defTabSz="622300">
+          <a:pPr marL="0" lvl="0" indent="0" algn="l" defTabSz="622300">
             <a:lnSpc>
               <a:spcPct val="90000"/>
             </a:lnSpc>
@@ -10142,12 +9865,17 @@
             <a:spcAft>
               <a:spcPct val="35000"/>
             </a:spcAft>
+            <a:buNone/>
           </a:pPr>
           <a:r>
-            <a:rPr lang="en-GB" sz="1400" b="0" i="0" kern="1200" dirty="0"/>
+            <a:rPr lang="en-GB" sz="1400" b="0" i="0" kern="1200" dirty="0">
+              <a:latin typeface="Quattrocento Sans" panose="020B0604020202020204" charset="0"/>
+            </a:rPr>
             <a:t>Applications that allow us to test the accuracy of the beacons.</a:t>
           </a:r>
-          <a:endParaRPr lang="es-ES" sz="1400" kern="1200" dirty="0"/>
+          <a:endParaRPr lang="es-ES" sz="1400" kern="1200" dirty="0">
+            <a:latin typeface="Quattrocento Sans" panose="020B0604020202020204" charset="0"/>
+          </a:endParaRPr>
         </a:p>
       </dsp:txBody>
       <dsp:txXfrm>
@@ -10242,7 +9970,7 @@
         </a:bodyPr>
         <a:lstStyle/>
         <a:p>
-          <a:pPr lvl="0" algn="l" defTabSz="622300">
+          <a:pPr marL="0" lvl="0" indent="0" algn="l" defTabSz="622300">
             <a:lnSpc>
               <a:spcPct val="90000"/>
             </a:lnSpc>
@@ -10252,9 +9980,12 @@
             <a:spcAft>
               <a:spcPct val="35000"/>
             </a:spcAft>
+            <a:buNone/>
           </a:pPr>
           <a:r>
-            <a:rPr lang="en-GB" sz="1400" b="0" i="0" kern="1200" dirty="0"/>
+            <a:rPr lang="en-GB" sz="1400" b="0" i="0" kern="1200" dirty="0">
+              <a:latin typeface="Quattrocento Sans" panose="020B0604020202020204" charset="0"/>
+            </a:rPr>
             <a:t>Mute and how to use functionalities and code necessary regarding </a:t>
           </a:r>
           <a:r>
@@ -10262,22 +9993,31 @@
               <a:highlight>
                 <a:srgbClr val="CC95ED"/>
               </a:highlight>
+              <a:latin typeface="Quattrocento Sans" panose="020B0604020202020204" charset="0"/>
             </a:rPr>
             <a:t>route monitoring</a:t>
           </a:r>
           <a:r>
-            <a:rPr lang="en-GB" sz="1400" b="0" i="0" kern="1200" dirty="0"/>
+            <a:rPr lang="en-GB" sz="1400" b="0" i="0" kern="1200" dirty="0">
+              <a:latin typeface="Quattrocento Sans" panose="020B0604020202020204" charset="0"/>
+            </a:rPr>
             <a:t> in the </a:t>
           </a:r>
           <a:r>
-            <a:rPr lang="en-GB" sz="1400" b="0" i="0" u="none" kern="1200" dirty="0"/>
+            <a:rPr lang="en-GB" sz="1400" b="0" i="0" u="none" kern="1200" dirty="0">
+              <a:latin typeface="Quattrocento Sans" panose="020B0604020202020204" charset="0"/>
+            </a:rPr>
             <a:t>client</a:t>
           </a:r>
           <a:r>
-            <a:rPr lang="en-GB" sz="1400" b="0" i="0" kern="1200" dirty="0"/>
+            <a:rPr lang="en-GB" sz="1400" b="0" i="0" kern="1200" dirty="0">
+              <a:latin typeface="Quattrocento Sans" panose="020B0604020202020204" charset="0"/>
+            </a:rPr>
             <a:t>.</a:t>
           </a:r>
-          <a:endParaRPr lang="es-ES" sz="1400" kern="1200" dirty="0"/>
+          <a:endParaRPr lang="es-ES" sz="1400" kern="1200" dirty="0">
+            <a:latin typeface="Quattrocento Sans" panose="020B0604020202020204" charset="0"/>
+          </a:endParaRPr>
         </a:p>
       </dsp:txBody>
       <dsp:txXfrm>
@@ -10372,7 +10112,7 @@
         </a:bodyPr>
         <a:lstStyle/>
         <a:p>
-          <a:pPr lvl="0" algn="l" defTabSz="622300">
+          <a:pPr marL="0" lvl="0" indent="0" algn="l" defTabSz="622300">
             <a:lnSpc>
               <a:spcPct val="90000"/>
             </a:lnSpc>
@@ -10382,9 +10122,12 @@
             <a:spcAft>
               <a:spcPct val="35000"/>
             </a:spcAft>
+            <a:buNone/>
           </a:pPr>
           <a:r>
-            <a:rPr lang="en-GB" sz="1400" b="0" i="0" kern="1200" dirty="0"/>
+            <a:rPr lang="en-GB" sz="1400" b="0" i="0" kern="1200" dirty="0">
+              <a:latin typeface="Quattrocento Sans" panose="020B0604020202020204" charset="0"/>
+            </a:rPr>
             <a:t>Adaptation of the </a:t>
           </a:r>
           <a:r>
@@ -10392,14 +10135,19 @@
               <a:highlight>
                 <a:srgbClr val="CC95ED"/>
               </a:highlight>
+              <a:latin typeface="Quattrocento Sans" panose="020B0604020202020204" charset="0"/>
             </a:rPr>
             <a:t>server</a:t>
           </a:r>
           <a:r>
-            <a:rPr lang="en-GB" sz="1400" b="0" i="0" kern="1200" dirty="0"/>
+            <a:rPr lang="en-GB" sz="1400" b="0" i="0" kern="1200" dirty="0">
+              <a:latin typeface="Quattrocento Sans" panose="020B0604020202020204" charset="0"/>
+            </a:rPr>
             <a:t> code.</a:t>
           </a:r>
-          <a:endParaRPr lang="es-ES" sz="1400" kern="1200" dirty="0"/>
+          <a:endParaRPr lang="es-ES" sz="1400" kern="1200" dirty="0">
+            <a:latin typeface="Quattrocento Sans" panose="020B0604020202020204" charset="0"/>
+          </a:endParaRPr>
         </a:p>
       </dsp:txBody>
       <dsp:txXfrm>
@@ -10494,7 +10242,7 @@
         </a:bodyPr>
         <a:lstStyle/>
         <a:p>
-          <a:pPr lvl="0" algn="l" defTabSz="622300">
+          <a:pPr marL="0" lvl="0" indent="0" algn="l" defTabSz="622300">
             <a:lnSpc>
               <a:spcPct val="90000"/>
             </a:lnSpc>
@@ -10504,20 +10252,26 @@
             <a:spcAft>
               <a:spcPct val="35000"/>
             </a:spcAft>
+            <a:buNone/>
           </a:pPr>
           <a:r>
             <a:rPr lang="en-GB" sz="1400" b="0" i="0" u="sng" kern="1200" dirty="0">
               <a:highlight>
                 <a:srgbClr val="CC95ED"/>
               </a:highlight>
+              <a:latin typeface="Quattrocento Sans" panose="020B0604020202020204" charset="0"/>
             </a:rPr>
             <a:t>Evaluation</a:t>
           </a:r>
           <a:r>
-            <a:rPr lang="en-GB" sz="1400" b="0" i="0" kern="1200" dirty="0"/>
+            <a:rPr lang="en-GB" sz="1400" b="0" i="0" kern="1200" dirty="0">
+              <a:latin typeface="Quattrocento Sans" panose="020B0604020202020204" charset="0"/>
+            </a:rPr>
             <a:t> of the application.</a:t>
           </a:r>
-          <a:endParaRPr lang="es-ES" sz="1400" kern="1200" dirty="0"/>
+          <a:endParaRPr lang="es-ES" sz="1400" kern="1200" dirty="0">
+            <a:latin typeface="Quattrocento Sans" panose="020B0604020202020204" charset="0"/>
+          </a:endParaRPr>
         </a:p>
       </dsp:txBody>
       <dsp:txXfrm>
@@ -10624,7 +10378,7 @@
         </a:bodyPr>
         <a:lstStyle/>
         <a:p>
-          <a:pPr lvl="0" algn="l" defTabSz="622300">
+          <a:pPr marL="0" lvl="0" indent="0" algn="l" defTabSz="622300">
             <a:lnSpc>
               <a:spcPct val="90000"/>
             </a:lnSpc>
@@ -10634,6 +10388,7 @@
             <a:spcAft>
               <a:spcPct val="35000"/>
             </a:spcAft>
+            <a:buNone/>
           </a:pPr>
           <a:r>
             <a:rPr lang="en-US" sz="1400" b="0" i="0" kern="1200" dirty="0"/>
@@ -10750,7 +10505,7 @@
         </a:bodyPr>
         <a:lstStyle/>
         <a:p>
-          <a:pPr lvl="0" algn="l" defTabSz="622300">
+          <a:pPr marL="0" lvl="0" indent="0" algn="l" defTabSz="622300">
             <a:lnSpc>
               <a:spcPct val="90000"/>
             </a:lnSpc>
@@ -10760,6 +10515,7 @@
             <a:spcAft>
               <a:spcPct val="35000"/>
             </a:spcAft>
+            <a:buNone/>
           </a:pPr>
           <a:r>
             <a:rPr lang="en-GB" sz="1400" b="0" i="0" u="sng" kern="1200" dirty="0">
@@ -10876,7 +10632,7 @@
         </a:bodyPr>
         <a:lstStyle/>
         <a:p>
-          <a:pPr lvl="0" algn="l" defTabSz="622300">
+          <a:pPr marL="0" lvl="0" indent="0" algn="l" defTabSz="622300">
             <a:lnSpc>
               <a:spcPct val="90000"/>
             </a:lnSpc>
@@ -10886,6 +10642,7 @@
             <a:spcAft>
               <a:spcPct val="35000"/>
             </a:spcAft>
+            <a:buNone/>
           </a:pPr>
           <a:r>
             <a:rPr lang="es-ES" sz="1400" kern="1200" dirty="0" err="1"/>
@@ -11158,7 +10915,7 @@
         </a:bodyPr>
         <a:lstStyle/>
         <a:p>
-          <a:pPr lvl="0" algn="l" defTabSz="622300">
+          <a:pPr marL="0" lvl="0" indent="0" algn="l" defTabSz="622300">
             <a:lnSpc>
               <a:spcPct val="90000"/>
             </a:lnSpc>
@@ -11168,6 +10925,7 @@
             <a:spcAft>
               <a:spcPct val="35000"/>
             </a:spcAft>
+            <a:buNone/>
           </a:pPr>
           <a:r>
             <a:rPr lang="en-GB" sz="1400" b="0" i="0" u="sng" kern="1200" dirty="0">
@@ -26506,7 +26264,7 @@
           <p:cNvPr id="12" name="Imagen 11" descr="Imagen que contiene dibujo&#10;&#10;Descripción generada automáticamente">
             <a:extLst>
               <a:ext uri="{FF2B5EF4-FFF2-40B4-BE49-F238E27FC236}">
-                <a16:creationId xmlns:a16="http://schemas.microsoft.com/office/drawing/2014/main" xmlns="" id="{9AFF4060-1494-4884-9505-949950579B88}"/>
+                <a16:creationId xmlns:a16="http://schemas.microsoft.com/office/drawing/2014/main" id="{9AFF4060-1494-4884-9505-949950579B88}"/>
               </a:ext>
             </a:extLst>
           </p:cNvPr>
@@ -26536,7 +26294,7 @@
           <p:cNvPr id="13" name="Google Shape;71;p12">
             <a:extLst>
               <a:ext uri="{FF2B5EF4-FFF2-40B4-BE49-F238E27FC236}">
-                <a16:creationId xmlns:a16="http://schemas.microsoft.com/office/drawing/2014/main" xmlns="" id="{6823333A-071B-46C3-8D4F-7B3B51AD36EB}"/>
+                <a16:creationId xmlns:a16="http://schemas.microsoft.com/office/drawing/2014/main" id="{6823333A-071B-46C3-8D4F-7B3B51AD36EB}"/>
               </a:ext>
             </a:extLst>
           </p:cNvPr>
@@ -26829,7 +26587,7 @@
           <p:cNvPr id="2" name="CuadroTexto 1">
             <a:extLst>
               <a:ext uri="{FF2B5EF4-FFF2-40B4-BE49-F238E27FC236}">
-                <a16:creationId xmlns:a16="http://schemas.microsoft.com/office/drawing/2014/main" xmlns="" id="{DCE14179-D220-4B21-9ABC-06F09BAAF197}"/>
+                <a16:creationId xmlns:a16="http://schemas.microsoft.com/office/drawing/2014/main" id="{DCE14179-D220-4B21-9ABC-06F09BAAF197}"/>
               </a:ext>
             </a:extLst>
           </p:cNvPr>
@@ -26872,13 +26630,9 @@
   <p:clrMapOvr>
     <a:masterClrMapping/>
   </p:clrMapOvr>
-  <p:timing>
-    <p:tnLst>
-      <p:par>
-        <p:cTn id="1" dur="indefinite" restart="never" nodeType="tmRoot"/>
-      </p:par>
-    </p:tnLst>
-  </p:timing>
+  <p:transition advTm="5897">
+    <p:fade thruBlk="1"/>
+  </p:transition>
 </p:sld>
 </file>
 
@@ -26904,7 +26658,7 @@
           <p:cNvPr id="2" name="Marcador de número de diapositiva 1">
             <a:extLst>
               <a:ext uri="{FF2B5EF4-FFF2-40B4-BE49-F238E27FC236}">
-                <a16:creationId xmlns:a16="http://schemas.microsoft.com/office/drawing/2014/main" xmlns="" id="{1B812DD0-1E67-44AA-B8C3-14A08CDAE86A}"/>
+                <a16:creationId xmlns:a16="http://schemas.microsoft.com/office/drawing/2014/main" id="{1B812DD0-1E67-44AA-B8C3-14A08CDAE86A}"/>
               </a:ext>
             </a:extLst>
           </p:cNvPr>
@@ -26942,7 +26696,7 @@
           <p:cNvPr id="3" name="Grupo 2">
             <a:extLst>
               <a:ext uri="{FF2B5EF4-FFF2-40B4-BE49-F238E27FC236}">
-                <a16:creationId xmlns:a16="http://schemas.microsoft.com/office/drawing/2014/main" xmlns="" id="{ECFF9C62-6E06-4B19-84D3-DCD66C577B90}"/>
+                <a16:creationId xmlns:a16="http://schemas.microsoft.com/office/drawing/2014/main" id="{ECFF9C62-6E06-4B19-84D3-DCD66C577B90}"/>
               </a:ext>
             </a:extLst>
           </p:cNvPr>
@@ -26962,7 +26716,7 @@
             <p:cNvPr id="4" name="Imagen 3">
               <a:extLst>
                 <a:ext uri="{FF2B5EF4-FFF2-40B4-BE49-F238E27FC236}">
-                  <a16:creationId xmlns:a16="http://schemas.microsoft.com/office/drawing/2014/main" xmlns="" id="{7AD7B37B-49BA-4045-A098-FE738B6E0663}"/>
+                  <a16:creationId xmlns:a16="http://schemas.microsoft.com/office/drawing/2014/main" id="{7AD7B37B-49BA-4045-A098-FE738B6E0663}"/>
                 </a:ext>
               </a:extLst>
             </p:cNvPr>
@@ -26972,7 +26726,7 @@
             <p:nvPr/>
           </p:nvPicPr>
           <p:blipFill>
-            <a:blip r:embed="rId2">
+            <a:blip r:embed="rId3">
               <a:extLst>
                 <a:ext uri="{28A0092B-C50C-407E-A947-70E740481C1C}">
                   <a14:useLocalDpi xmlns:a14="http://schemas.microsoft.com/office/drawing/2010/main" val="0"/>
@@ -27003,7 +26757,7 @@
             <p:cNvPr id="5" name="Conector recto de flecha 4">
               <a:extLst>
                 <a:ext uri="{FF2B5EF4-FFF2-40B4-BE49-F238E27FC236}">
-                  <a16:creationId xmlns:a16="http://schemas.microsoft.com/office/drawing/2014/main" xmlns="" id="{A19F3F65-C2BE-4131-965D-D0B065261E0B}"/>
+                  <a16:creationId xmlns:a16="http://schemas.microsoft.com/office/drawing/2014/main" id="{A19F3F65-C2BE-4131-965D-D0B065261E0B}"/>
                 </a:ext>
               </a:extLst>
             </p:cNvPr>
@@ -27045,7 +26799,7 @@
             <p:cNvPr id="6" name="Conector recto de flecha 5">
               <a:extLst>
                 <a:ext uri="{FF2B5EF4-FFF2-40B4-BE49-F238E27FC236}">
-                  <a16:creationId xmlns:a16="http://schemas.microsoft.com/office/drawing/2014/main" xmlns="" id="{7B8253FF-33FB-47C8-ABB7-4BD6B0F6B76A}"/>
+                  <a16:creationId xmlns:a16="http://schemas.microsoft.com/office/drawing/2014/main" id="{7B8253FF-33FB-47C8-ABB7-4BD6B0F6B76A}"/>
                 </a:ext>
               </a:extLst>
             </p:cNvPr>
@@ -27087,7 +26841,7 @@
             <p:cNvPr id="7" name="Conector recto de flecha 6">
               <a:extLst>
                 <a:ext uri="{FF2B5EF4-FFF2-40B4-BE49-F238E27FC236}">
-                  <a16:creationId xmlns:a16="http://schemas.microsoft.com/office/drawing/2014/main" xmlns="" id="{4D272C4B-8EC6-4870-BA99-69C10D3E5D34}"/>
+                  <a16:creationId xmlns:a16="http://schemas.microsoft.com/office/drawing/2014/main" id="{4D272C4B-8EC6-4870-BA99-69C10D3E5D34}"/>
                 </a:ext>
               </a:extLst>
             </p:cNvPr>
@@ -27130,7 +26884,7 @@
           <p:cNvPr id="8" name="Grupo 7">
             <a:extLst>
               <a:ext uri="{FF2B5EF4-FFF2-40B4-BE49-F238E27FC236}">
-                <a16:creationId xmlns:a16="http://schemas.microsoft.com/office/drawing/2014/main" xmlns="" id="{94DC42A7-D2F8-4C17-A508-AB0EC21BEE0E}"/>
+                <a16:creationId xmlns:a16="http://schemas.microsoft.com/office/drawing/2014/main" id="{94DC42A7-D2F8-4C17-A508-AB0EC21BEE0E}"/>
               </a:ext>
             </a:extLst>
           </p:cNvPr>
@@ -27150,7 +26904,7 @@
             <p:cNvPr id="9" name="Imagen 8">
               <a:extLst>
                 <a:ext uri="{FF2B5EF4-FFF2-40B4-BE49-F238E27FC236}">
-                  <a16:creationId xmlns:a16="http://schemas.microsoft.com/office/drawing/2014/main" xmlns="" id="{B7DFC1E2-9F42-4678-AE69-5E33956C0A39}"/>
+                  <a16:creationId xmlns:a16="http://schemas.microsoft.com/office/drawing/2014/main" id="{B7DFC1E2-9F42-4678-AE69-5E33956C0A39}"/>
                 </a:ext>
               </a:extLst>
             </p:cNvPr>
@@ -27160,7 +26914,7 @@
             <p:nvPr/>
           </p:nvPicPr>
           <p:blipFill>
-            <a:blip r:embed="rId3">
+            <a:blip r:embed="rId4">
               <a:extLst>
                 <a:ext uri="{28A0092B-C50C-407E-A947-70E740481C1C}">
                   <a14:useLocalDpi xmlns:a14="http://schemas.microsoft.com/office/drawing/2010/main" val="0"/>
@@ -27191,7 +26945,7 @@
             <p:cNvPr id="10" name="Conector recto de flecha 9">
               <a:extLst>
                 <a:ext uri="{FF2B5EF4-FFF2-40B4-BE49-F238E27FC236}">
-                  <a16:creationId xmlns:a16="http://schemas.microsoft.com/office/drawing/2014/main" xmlns="" id="{FE5A8A33-9D84-41B6-94E0-819CD37B50E2}"/>
+                  <a16:creationId xmlns:a16="http://schemas.microsoft.com/office/drawing/2014/main" id="{FE5A8A33-9D84-41B6-94E0-819CD37B50E2}"/>
                 </a:ext>
               </a:extLst>
             </p:cNvPr>
@@ -27233,7 +26987,7 @@
             <p:cNvPr id="11" name="Conector recto de flecha 10">
               <a:extLst>
                 <a:ext uri="{FF2B5EF4-FFF2-40B4-BE49-F238E27FC236}">
-                  <a16:creationId xmlns:a16="http://schemas.microsoft.com/office/drawing/2014/main" xmlns="" id="{1D69FA28-131E-478A-84F4-6C4E244F33A1}"/>
+                  <a16:creationId xmlns:a16="http://schemas.microsoft.com/office/drawing/2014/main" id="{1D69FA28-131E-478A-84F4-6C4E244F33A1}"/>
                 </a:ext>
               </a:extLst>
             </p:cNvPr>
@@ -27276,7 +27030,7 @@
           <p:cNvPr id="48" name="Google Shape;323;p30">
             <a:extLst>
               <a:ext uri="{FF2B5EF4-FFF2-40B4-BE49-F238E27FC236}">
-                <a16:creationId xmlns:a16="http://schemas.microsoft.com/office/drawing/2014/main" xmlns="" id="{765E9BF0-8EB6-4DF6-9D9D-06A4230F32E0}"/>
+                <a16:creationId xmlns:a16="http://schemas.microsoft.com/office/drawing/2014/main" id="{765E9BF0-8EB6-4DF6-9D9D-06A4230F32E0}"/>
               </a:ext>
             </a:extLst>
           </p:cNvPr>
@@ -27634,7 +27388,7 @@
           <p:cNvPr id="49" name="Elipse 48">
             <a:extLst>
               <a:ext uri="{FF2B5EF4-FFF2-40B4-BE49-F238E27FC236}">
-                <a16:creationId xmlns:a16="http://schemas.microsoft.com/office/drawing/2014/main" xmlns="" id="{51106988-0BBE-409E-9A86-EA4931EC03DB}"/>
+                <a16:creationId xmlns:a16="http://schemas.microsoft.com/office/drawing/2014/main" id="{51106988-0BBE-409E-9A86-EA4931EC03DB}"/>
               </a:ext>
             </a:extLst>
           </p:cNvPr>
@@ -27688,7 +27442,7 @@
           <p:cNvPr id="30" name="Conector: curvado 29">
             <a:extLst>
               <a:ext uri="{FF2B5EF4-FFF2-40B4-BE49-F238E27FC236}">
-                <a16:creationId xmlns:a16="http://schemas.microsoft.com/office/drawing/2014/main" xmlns="" id="{4E87D652-F607-41E3-933C-9EB5AEF2D103}"/>
+                <a16:creationId xmlns:a16="http://schemas.microsoft.com/office/drawing/2014/main" id="{4E87D652-F607-41E3-933C-9EB5AEF2D103}"/>
               </a:ext>
             </a:extLst>
           </p:cNvPr>
@@ -27734,7 +27488,7 @@
           <p:cNvPr id="54" name="Conector: curvado 53">
             <a:extLst>
               <a:ext uri="{FF2B5EF4-FFF2-40B4-BE49-F238E27FC236}">
-                <a16:creationId xmlns:a16="http://schemas.microsoft.com/office/drawing/2014/main" xmlns="" id="{CC69F305-D12E-471A-A4AB-A570139FE425}"/>
+                <a16:creationId xmlns:a16="http://schemas.microsoft.com/office/drawing/2014/main" id="{CC69F305-D12E-471A-A4AB-A570139FE425}"/>
               </a:ext>
             </a:extLst>
           </p:cNvPr>
@@ -27780,7 +27534,7 @@
           <p:cNvPr id="77" name="Elipse 76">
             <a:extLst>
               <a:ext uri="{FF2B5EF4-FFF2-40B4-BE49-F238E27FC236}">
-                <a16:creationId xmlns:a16="http://schemas.microsoft.com/office/drawing/2014/main" xmlns="" id="{C76D0E11-07A8-4E28-8B73-6A9ADF144939}"/>
+                <a16:creationId xmlns:a16="http://schemas.microsoft.com/office/drawing/2014/main" id="{C76D0E11-07A8-4E28-8B73-6A9ADF144939}"/>
               </a:ext>
             </a:extLst>
           </p:cNvPr>
@@ -27834,7 +27588,7 @@
           <p:cNvPr id="78" name="Elipse 77">
             <a:extLst>
               <a:ext uri="{FF2B5EF4-FFF2-40B4-BE49-F238E27FC236}">
-                <a16:creationId xmlns:a16="http://schemas.microsoft.com/office/drawing/2014/main" xmlns="" id="{A1B036D7-4C1A-4D5E-82EF-B2CDA591B3FC}"/>
+                <a16:creationId xmlns:a16="http://schemas.microsoft.com/office/drawing/2014/main" id="{A1B036D7-4C1A-4D5E-82EF-B2CDA591B3FC}"/>
               </a:ext>
             </a:extLst>
           </p:cNvPr>
@@ -27888,7 +27642,7 @@
           <p:cNvPr id="79" name="Elipse 78">
             <a:extLst>
               <a:ext uri="{FF2B5EF4-FFF2-40B4-BE49-F238E27FC236}">
-                <a16:creationId xmlns:a16="http://schemas.microsoft.com/office/drawing/2014/main" xmlns="" id="{D1D4409C-D421-40C2-9209-CFEBB90C6924}"/>
+                <a16:creationId xmlns:a16="http://schemas.microsoft.com/office/drawing/2014/main" id="{D1D4409C-D421-40C2-9209-CFEBB90C6924}"/>
               </a:ext>
             </a:extLst>
           </p:cNvPr>
@@ -27938,6 +27692,9 @@
         </p:txBody>
       </p:sp>
     </p:spTree>
+    <p:custDataLst>
+      <p:tags r:id="rId1"/>
+    </p:custDataLst>
     <p:extLst>
       <p:ext uri="{BB962C8B-B14F-4D97-AF65-F5344CB8AC3E}">
         <p14:creationId xmlns:p14="http://schemas.microsoft.com/office/powerpoint/2010/main" val="1757590655"/>
@@ -27947,12 +27704,12 @@
   <p:clrMapOvr>
     <a:masterClrMapping/>
   </p:clrMapOvr>
-  <mc:AlternateContent xmlns:mc="http://schemas.openxmlformats.org/markup-compatibility/2006" xmlns:p14="http://schemas.microsoft.com/office/powerpoint/2010/main">
-    <mc:Choice Requires="p14">
-      <p:transition p14:dur="10"/>
+  <mc:AlternateContent xmlns:mc="http://schemas.openxmlformats.org/markup-compatibility/2006">
+    <mc:Choice xmlns:p14="http://schemas.microsoft.com/office/powerpoint/2010/main" Requires="p14">
+      <p:transition p14:dur="10" advTm="15039"/>
     </mc:Choice>
-    <mc:Fallback xmlns="">
-      <p:transition/>
+    <mc:Fallback>
+      <p:transition advTm="15039"/>
     </mc:Fallback>
   </mc:AlternateContent>
   <p:timing>
@@ -28358,7 +28115,7 @@
           <p:cNvPr id="2" name="Título 1">
             <a:extLst>
               <a:ext uri="{FF2B5EF4-FFF2-40B4-BE49-F238E27FC236}">
-                <a16:creationId xmlns:a16="http://schemas.microsoft.com/office/drawing/2014/main" xmlns="" id="{A2002B61-CFC2-44B1-9ADC-BED176A48C8A}"/>
+                <a16:creationId xmlns:a16="http://schemas.microsoft.com/office/drawing/2014/main" id="{A2002B61-CFC2-44B1-9ADC-BED176A48C8A}"/>
               </a:ext>
             </a:extLst>
           </p:cNvPr>
@@ -28386,7 +28143,7 @@
           <p:cNvPr id="3" name="Marcador de número de diapositiva 2">
             <a:extLst>
               <a:ext uri="{FF2B5EF4-FFF2-40B4-BE49-F238E27FC236}">
-                <a16:creationId xmlns:a16="http://schemas.microsoft.com/office/drawing/2014/main" xmlns="" id="{7596C399-3BD4-4B67-B510-3174663382D8}"/>
+                <a16:creationId xmlns:a16="http://schemas.microsoft.com/office/drawing/2014/main" id="{7596C399-3BD4-4B67-B510-3174663382D8}"/>
               </a:ext>
             </a:extLst>
           </p:cNvPr>
@@ -28424,7 +28181,7 @@
           <p:cNvPr id="4" name="Imagen 3">
             <a:extLst>
               <a:ext uri="{FF2B5EF4-FFF2-40B4-BE49-F238E27FC236}">
-                <a16:creationId xmlns:a16="http://schemas.microsoft.com/office/drawing/2014/main" xmlns="" id="{49330158-41E4-40EE-BDE2-E16B4AA2004E}"/>
+                <a16:creationId xmlns:a16="http://schemas.microsoft.com/office/drawing/2014/main" id="{49330158-41E4-40EE-BDE2-E16B4AA2004E}"/>
               </a:ext>
             </a:extLst>
           </p:cNvPr>
@@ -28432,7 +28189,7 @@
           <p:nvPr/>
         </p:nvPicPr>
         <p:blipFill rotWithShape="1">
-          <a:blip r:embed="rId2">
+          <a:blip r:embed="rId3">
             <a:extLst>
               <a:ext uri="{28A0092B-C50C-407E-A947-70E740481C1C}">
                 <a14:useLocalDpi xmlns:a14="http://schemas.microsoft.com/office/drawing/2010/main" val="0"/>
@@ -28461,7 +28218,7 @@
           <p:cNvPr id="5" name="Diagrama 4">
             <a:extLst>
               <a:ext uri="{FF2B5EF4-FFF2-40B4-BE49-F238E27FC236}">
-                <a16:creationId xmlns:a16="http://schemas.microsoft.com/office/drawing/2014/main" xmlns="" id="{E1D279FF-3548-49A6-B1C6-623FFBB4FF1B}"/>
+                <a16:creationId xmlns:a16="http://schemas.microsoft.com/office/drawing/2014/main" id="{E1D279FF-3548-49A6-B1C6-623FFBB4FF1B}"/>
               </a:ext>
             </a:extLst>
           </p:cNvPr>
@@ -28474,7 +28231,7 @@
         </p:xfrm>
         <a:graphic>
           <a:graphicData uri="http://schemas.openxmlformats.org/drawingml/2006/diagram">
-            <dgm:relIds xmlns:dgm="http://schemas.openxmlformats.org/drawingml/2006/diagram" xmlns:r="http://schemas.openxmlformats.org/officeDocument/2006/relationships" r:dm="rId3" r:lo="rId4" r:qs="rId5" r:cs="rId6"/>
+            <dgm:relIds xmlns:dgm="http://schemas.openxmlformats.org/drawingml/2006/diagram" xmlns:r="http://schemas.openxmlformats.org/officeDocument/2006/relationships" r:dm="rId4" r:lo="rId5" r:qs="rId6" r:cs="rId7"/>
           </a:graphicData>
         </a:graphic>
       </p:graphicFrame>
@@ -28483,7 +28240,7 @@
           <p:cNvPr id="6" name="Google Shape;112;p15">
             <a:extLst>
               <a:ext uri="{FF2B5EF4-FFF2-40B4-BE49-F238E27FC236}">
-                <a16:creationId xmlns:a16="http://schemas.microsoft.com/office/drawing/2014/main" xmlns="" id="{BBBC5EFC-9DA0-44A8-8AB0-804F507D8078}"/>
+                <a16:creationId xmlns:a16="http://schemas.microsoft.com/office/drawing/2014/main" id="{BBBC5EFC-9DA0-44A8-8AB0-804F507D8078}"/>
               </a:ext>
             </a:extLst>
           </p:cNvPr>
@@ -28540,6 +28297,9 @@
         </p:txBody>
       </p:sp>
     </p:spTree>
+    <p:custDataLst>
+      <p:tags r:id="rId1"/>
+    </p:custDataLst>
     <p:extLst>
       <p:ext uri="{BB962C8B-B14F-4D97-AF65-F5344CB8AC3E}">
         <p14:creationId xmlns:p14="http://schemas.microsoft.com/office/powerpoint/2010/main" val="1128434435"/>
@@ -28549,6 +28309,9 @@
   <p:clrMapOvr>
     <a:masterClrMapping/>
   </p:clrMapOvr>
+  <p:transition advTm="32773">
+    <p:fade thruBlk="1"/>
+  </p:transition>
   <p:timing>
     <p:tnLst>
       <p:par>
@@ -29142,7 +28905,7 @@
           <p:cNvPr id="12" name="CuadroTexto 5">
             <a:extLst>
               <a:ext uri="{FF2B5EF4-FFF2-40B4-BE49-F238E27FC236}">
-                <a16:creationId xmlns:a16="http://schemas.microsoft.com/office/drawing/2014/main" xmlns="" id="{7A05EF92-AEC3-4F9D-955D-AA9888E3E5D5}"/>
+                <a16:creationId xmlns:a16="http://schemas.microsoft.com/office/drawing/2014/main" id="{7A05EF92-AEC3-4F9D-955D-AA9888E3E5D5}"/>
               </a:ext>
             </a:extLst>
           </p:cNvPr>
@@ -29211,7 +28974,7 @@
           <p:cNvPr id="13" name="CuadroTexto 5">
             <a:extLst>
               <a:ext uri="{FF2B5EF4-FFF2-40B4-BE49-F238E27FC236}">
-                <a16:creationId xmlns:a16="http://schemas.microsoft.com/office/drawing/2014/main" xmlns="" id="{7A05EF92-AEC3-4F9D-955D-AA9888E3E5D5}"/>
+                <a16:creationId xmlns:a16="http://schemas.microsoft.com/office/drawing/2014/main" id="{7A05EF92-AEC3-4F9D-955D-AA9888E3E5D5}"/>
               </a:ext>
             </a:extLst>
           </p:cNvPr>
@@ -32272,7 +32035,7 @@
             </p:blipFill>
             <p:spPr>
               <a:xfrm>
-                <a:off x="5141361" y="3114880"/>
+                <a:off x="5123431" y="3114880"/>
                 <a:ext cx="972674" cy="1633765"/>
               </a:xfrm>
               <a:prstGeom prst="rect">
@@ -33001,7 +32764,7 @@
             </p:blipFill>
             <p:spPr>
               <a:xfrm>
-                <a:off x="6522471" y="3114880"/>
+                <a:off x="6513506" y="3114880"/>
                 <a:ext cx="987184" cy="1633765"/>
               </a:xfrm>
               <a:prstGeom prst="rect">
@@ -33745,7 +33508,7 @@
           <p:cNvPr id="27" name="Google Shape;112;p15">
             <a:extLst>
               <a:ext uri="{FF2B5EF4-FFF2-40B4-BE49-F238E27FC236}">
-                <a16:creationId xmlns:a16="http://schemas.microsoft.com/office/drawing/2014/main" xmlns="" id="{819AEBCD-F5CC-411C-9BF5-54B940F4E4AD}"/>
+                <a16:creationId xmlns:a16="http://schemas.microsoft.com/office/drawing/2014/main" id="{819AEBCD-F5CC-411C-9BF5-54B940F4E4AD}"/>
               </a:ext>
             </a:extLst>
           </p:cNvPr>
@@ -33754,7 +33517,7 @@
         </p:nvSpPr>
         <p:spPr>
           <a:xfrm>
-            <a:off x="695208" y="311384"/>
+            <a:off x="690834" y="322161"/>
             <a:ext cx="645459" cy="435600"/>
           </a:xfrm>
           <a:prstGeom prst="rect">
@@ -33781,7 +33544,7 @@
               <a:buNone/>
             </a:pPr>
             <a:r>
-              <a:rPr lang="es-ES" sz="1600" dirty="0">
+              <a:rPr lang="es-ES" sz="2400" dirty="0">
                 <a:solidFill>
                   <a:schemeClr val="dk1"/>
                 </a:solidFill>
@@ -33792,7 +33555,7 @@
               </a:rPr>
               <a:t>5</a:t>
             </a:r>
-            <a:endParaRPr sz="1600" dirty="0">
+            <a:endParaRPr sz="2400" dirty="0">
               <a:latin typeface="Lora"/>
               <a:ea typeface="Lora"/>
               <a:cs typeface="Lora"/>
@@ -33811,13 +33574,9 @@
   <p:clrMapOvr>
     <a:masterClrMapping/>
   </p:clrMapOvr>
-  <p:timing>
-    <p:tnLst>
-      <p:par>
-        <p:cTn id="1" dur="indefinite" restart="never" nodeType="tmRoot"/>
-      </p:par>
-    </p:tnLst>
-  </p:timing>
+  <p:transition advTm="40698">
+    <p:fade thruBlk="1"/>
+  </p:transition>
 </p:sld>
 </file>
 
@@ -35406,7 +35165,7 @@
             <p:cNvPr id="18" name="CuadroTexto 5">
               <a:extLst>
                 <a:ext uri="{FF2B5EF4-FFF2-40B4-BE49-F238E27FC236}">
-                  <a16:creationId xmlns:a16="http://schemas.microsoft.com/office/drawing/2014/main" xmlns="" id="{7A05EF92-AEC3-4F9D-955D-AA9888E3E5D5}"/>
+                  <a16:creationId xmlns:a16="http://schemas.microsoft.com/office/drawing/2014/main" id="{7A05EF92-AEC3-4F9D-955D-AA9888E3E5D5}"/>
                 </a:ext>
               </a:extLst>
             </p:cNvPr>
@@ -35477,7 +35236,7 @@
             <p:cNvPr id="22" name="CuadroTexto 5">
               <a:extLst>
                 <a:ext uri="{FF2B5EF4-FFF2-40B4-BE49-F238E27FC236}">
-                  <a16:creationId xmlns:a16="http://schemas.microsoft.com/office/drawing/2014/main" xmlns="" id="{7A05EF92-AEC3-4F9D-955D-AA9888E3E5D5}"/>
+                  <a16:creationId xmlns:a16="http://schemas.microsoft.com/office/drawing/2014/main" id="{7A05EF92-AEC3-4F9D-955D-AA9888E3E5D5}"/>
                 </a:ext>
               </a:extLst>
             </p:cNvPr>
@@ -35594,7 +35353,7 @@
             <p:cNvPr id="23" name="CuadroTexto 5">
               <a:extLst>
                 <a:ext uri="{FF2B5EF4-FFF2-40B4-BE49-F238E27FC236}">
-                  <a16:creationId xmlns:a16="http://schemas.microsoft.com/office/drawing/2014/main" xmlns="" id="{7A05EF92-AEC3-4F9D-955D-AA9888E3E5D5}"/>
+                  <a16:creationId xmlns:a16="http://schemas.microsoft.com/office/drawing/2014/main" id="{7A05EF92-AEC3-4F9D-955D-AA9888E3E5D5}"/>
                 </a:ext>
               </a:extLst>
             </p:cNvPr>
@@ -35709,7 +35468,7 @@
           <p:cNvPr id="16" name="Google Shape;112;p15">
             <a:extLst>
               <a:ext uri="{FF2B5EF4-FFF2-40B4-BE49-F238E27FC236}">
-                <a16:creationId xmlns:a16="http://schemas.microsoft.com/office/drawing/2014/main" xmlns="" id="{022E271D-0F8E-4B18-91F0-AA2D456C8189}"/>
+                <a16:creationId xmlns:a16="http://schemas.microsoft.com/office/drawing/2014/main" id="{022E271D-0F8E-4B18-91F0-AA2D456C8189}"/>
               </a:ext>
             </a:extLst>
           </p:cNvPr>
@@ -35718,7 +35477,7 @@
         </p:nvSpPr>
         <p:spPr>
           <a:xfrm>
-            <a:off x="695208" y="296885"/>
+            <a:off x="704173" y="323780"/>
             <a:ext cx="645459" cy="435600"/>
           </a:xfrm>
           <a:prstGeom prst="rect">
@@ -35765,6 +35524,55 @@
           </a:p>
         </p:txBody>
       </p:sp>
+      <p:cxnSp>
+        <p:nvCxnSpPr>
+          <p:cNvPr id="9" name="Conector: curvado 8">
+            <a:extLst>
+              <a:ext uri="{FF2B5EF4-FFF2-40B4-BE49-F238E27FC236}">
+                <a16:creationId xmlns:a16="http://schemas.microsoft.com/office/drawing/2014/main" id="{24B6273F-B458-4914-91EE-BF8844881905}"/>
+              </a:ext>
+            </a:extLst>
+          </p:cNvPr>
+          <p:cNvCxnSpPr>
+            <a:cxnSpLocks/>
+          </p:cNvCxnSpPr>
+          <p:nvPr/>
+        </p:nvCxnSpPr>
+        <p:spPr>
+          <a:xfrm flipV="1">
+            <a:off x="5441576" y="2235889"/>
+            <a:ext cx="1972236" cy="256299"/>
+          </a:xfrm>
+          <a:prstGeom prst="curvedConnector3">
+            <a:avLst>
+              <a:gd name="adj1" fmla="val -3637"/>
+            </a:avLst>
+          </a:prstGeom>
+          <a:ln w="19050">
+            <a:solidFill>
+              <a:schemeClr val="accent2">
+                <a:lumMod val="90000"/>
+                <a:lumOff val="10000"/>
+              </a:schemeClr>
+            </a:solidFill>
+            <a:tailEnd type="triangle"/>
+          </a:ln>
+        </p:spPr>
+        <p:style>
+          <a:lnRef idx="1">
+            <a:schemeClr val="accent1"/>
+          </a:lnRef>
+          <a:fillRef idx="0">
+            <a:schemeClr val="accent1"/>
+          </a:fillRef>
+          <a:effectRef idx="0">
+            <a:schemeClr val="accent1"/>
+          </a:effectRef>
+          <a:fontRef idx="minor">
+            <a:schemeClr val="tx1"/>
+          </a:fontRef>
+        </p:style>
+      </p:cxnSp>
     </p:spTree>
     <p:extLst>
       <p:ext uri="{BB962C8B-B14F-4D97-AF65-F5344CB8AC3E}">
@@ -35775,13 +35583,9 @@
   <p:clrMapOvr>
     <a:masterClrMapping/>
   </p:clrMapOvr>
-  <p:timing>
-    <p:tnLst>
-      <p:par>
-        <p:cTn id="1" dur="indefinite" restart="never" nodeType="tmRoot"/>
-      </p:par>
-    </p:tnLst>
-  </p:timing>
+  <p:transition advTm="26357">
+    <p:fade thruBlk="1"/>
+  </p:transition>
 </p:sld>
 </file>
 
@@ -36626,7 +36430,7 @@
             <p:cNvPr id="13" name="CuadroTexto 5">
               <a:extLst>
                 <a:ext uri="{FF2B5EF4-FFF2-40B4-BE49-F238E27FC236}">
-                  <a16:creationId xmlns:a16="http://schemas.microsoft.com/office/drawing/2014/main" xmlns="" id="{7A05EF92-AEC3-4F9D-955D-AA9888E3E5D5}"/>
+                  <a16:creationId xmlns:a16="http://schemas.microsoft.com/office/drawing/2014/main" id="{7A05EF92-AEC3-4F9D-955D-AA9888E3E5D5}"/>
                 </a:ext>
               </a:extLst>
             </p:cNvPr>
@@ -36687,7 +36491,7 @@
             <p:cNvPr id="14" name="CuadroTexto 5">
               <a:extLst>
                 <a:ext uri="{FF2B5EF4-FFF2-40B4-BE49-F238E27FC236}">
-                  <a16:creationId xmlns:a16="http://schemas.microsoft.com/office/drawing/2014/main" xmlns="" id="{7A05EF92-AEC3-4F9D-955D-AA9888E3E5D5}"/>
+                  <a16:creationId xmlns:a16="http://schemas.microsoft.com/office/drawing/2014/main" id="{7A05EF92-AEC3-4F9D-955D-AA9888E3E5D5}"/>
                 </a:ext>
               </a:extLst>
             </p:cNvPr>
@@ -36804,7 +36608,7 @@
             <p:cNvPr id="15" name="CuadroTexto 5">
               <a:extLst>
                 <a:ext uri="{FF2B5EF4-FFF2-40B4-BE49-F238E27FC236}">
-                  <a16:creationId xmlns:a16="http://schemas.microsoft.com/office/drawing/2014/main" xmlns="" id="{7A05EF92-AEC3-4F9D-955D-AA9888E3E5D5}"/>
+                  <a16:creationId xmlns:a16="http://schemas.microsoft.com/office/drawing/2014/main" id="{7A05EF92-AEC3-4F9D-955D-AA9888E3E5D5}"/>
                 </a:ext>
               </a:extLst>
             </p:cNvPr>
@@ -36899,7 +36703,7 @@
           <p:cNvPr id="12" name="Google Shape;112;p15">
             <a:extLst>
               <a:ext uri="{FF2B5EF4-FFF2-40B4-BE49-F238E27FC236}">
-                <a16:creationId xmlns:a16="http://schemas.microsoft.com/office/drawing/2014/main" xmlns="" id="{022E271D-0F8E-4B18-91F0-AA2D456C8189}"/>
+                <a16:creationId xmlns:a16="http://schemas.microsoft.com/office/drawing/2014/main" id="{022E271D-0F8E-4B18-91F0-AA2D456C8189}"/>
               </a:ext>
             </a:extLst>
           </p:cNvPr>
@@ -36908,7 +36712,7 @@
         </p:nvSpPr>
         <p:spPr>
           <a:xfrm>
-            <a:off x="695208" y="296885"/>
+            <a:off x="695208" y="314815"/>
             <a:ext cx="645459" cy="435600"/>
           </a:xfrm>
           <a:prstGeom prst="rect">
@@ -36935,7 +36739,7 @@
               <a:buNone/>
             </a:pPr>
             <a:r>
-              <a:rPr lang="es-ES" sz="1600" dirty="0" smtClean="0">
+              <a:rPr lang="es-ES" sz="1600" dirty="0">
                 <a:solidFill>
                   <a:schemeClr val="dk1"/>
                 </a:solidFill>
@@ -36965,13 +36769,9 @@
   <p:clrMapOvr>
     <a:masterClrMapping/>
   </p:clrMapOvr>
-  <p:timing>
-    <p:tnLst>
-      <p:par>
-        <p:cTn id="1" dur="indefinite" restart="never" nodeType="tmRoot"/>
-      </p:par>
-    </p:tnLst>
-  </p:timing>
+  <p:transition advTm="19993">
+    <p:fade thruBlk="1"/>
+  </p:transition>
 </p:sld>
 </file>
 
@@ -37128,7 +36928,7 @@
           <p:cNvPr id="6" name="CuadroTexto 5">
             <a:extLst>
               <a:ext uri="{FF2B5EF4-FFF2-40B4-BE49-F238E27FC236}">
-                <a16:creationId xmlns:a16="http://schemas.microsoft.com/office/drawing/2014/main" xmlns="" id="{7A05EF92-AEC3-4F9D-955D-AA9888E3E5D5}"/>
+                <a16:creationId xmlns:a16="http://schemas.microsoft.com/office/drawing/2014/main" id="{7A05EF92-AEC3-4F9D-955D-AA9888E3E5D5}"/>
               </a:ext>
             </a:extLst>
           </p:cNvPr>
@@ -37199,7 +36999,7 @@
           <p:cNvPr id="12" name="CuadroTexto 11">
             <a:extLst>
               <a:ext uri="{FF2B5EF4-FFF2-40B4-BE49-F238E27FC236}">
-                <a16:creationId xmlns:a16="http://schemas.microsoft.com/office/drawing/2014/main" xmlns="" id="{20840E76-3DE8-432F-A63B-48B5CBAD5272}"/>
+                <a16:creationId xmlns:a16="http://schemas.microsoft.com/office/drawing/2014/main" id="{20840E76-3DE8-432F-A63B-48B5CBAD5272}"/>
               </a:ext>
             </a:extLst>
           </p:cNvPr>
@@ -37294,7 +37094,7 @@
           <p:cNvPr id="4" name="CuadroTexto 3">
             <a:extLst>
               <a:ext uri="{FF2B5EF4-FFF2-40B4-BE49-F238E27FC236}">
-                <a16:creationId xmlns:a16="http://schemas.microsoft.com/office/drawing/2014/main" xmlns="" id="{D5FA0BEC-68D7-4EB6-BE83-6AA4E90DDB87}"/>
+                <a16:creationId xmlns:a16="http://schemas.microsoft.com/office/drawing/2014/main" id="{D5FA0BEC-68D7-4EB6-BE83-6AA4E90DDB87}"/>
               </a:ext>
             </a:extLst>
           </p:cNvPr>
@@ -37358,13 +37158,9 @@
   <p:clrMapOvr>
     <a:masterClrMapping/>
   </p:clrMapOvr>
-  <p:timing>
-    <p:tnLst>
-      <p:par>
-        <p:cTn id="1" dur="indefinite" restart="never" nodeType="tmRoot"/>
-      </p:par>
-    </p:tnLst>
-  </p:timing>
+  <p:transition advTm="14665">
+    <p:fade thruBlk="1"/>
+  </p:transition>
 </p:sld>
 </file>
 
@@ -37390,7 +37186,7 @@
           <p:cNvPr id="2" name="Título 1">
             <a:extLst>
               <a:ext uri="{FF2B5EF4-FFF2-40B4-BE49-F238E27FC236}">
-                <a16:creationId xmlns:a16="http://schemas.microsoft.com/office/drawing/2014/main" xmlns="" id="{133E19B1-FFB9-41F4-8288-92E8EFB14293}"/>
+                <a16:creationId xmlns:a16="http://schemas.microsoft.com/office/drawing/2014/main" id="{133E19B1-FFB9-41F4-8288-92E8EFB14293}"/>
               </a:ext>
             </a:extLst>
           </p:cNvPr>
@@ -37418,7 +37214,7 @@
           <p:cNvPr id="4" name="Marcador de número de diapositiva 3">
             <a:extLst>
               <a:ext uri="{FF2B5EF4-FFF2-40B4-BE49-F238E27FC236}">
-                <a16:creationId xmlns:a16="http://schemas.microsoft.com/office/drawing/2014/main" xmlns="" id="{131A4E16-D80F-497A-98EA-D0A605CB27CC}"/>
+                <a16:creationId xmlns:a16="http://schemas.microsoft.com/office/drawing/2014/main" id="{131A4E16-D80F-497A-98EA-D0A605CB27CC}"/>
               </a:ext>
             </a:extLst>
           </p:cNvPr>
@@ -37456,7 +37252,7 @@
           <p:cNvPr id="7" name="Diagrama 6">
             <a:extLst>
               <a:ext uri="{FF2B5EF4-FFF2-40B4-BE49-F238E27FC236}">
-                <a16:creationId xmlns:a16="http://schemas.microsoft.com/office/drawing/2014/main" xmlns="" id="{01DEEBBA-377C-4A04-BF38-2977C8C09A6D}"/>
+                <a16:creationId xmlns:a16="http://schemas.microsoft.com/office/drawing/2014/main" id="{01DEEBBA-377C-4A04-BF38-2977C8C09A6D}"/>
               </a:ext>
             </a:extLst>
           </p:cNvPr>
@@ -37469,7 +37265,7 @@
         </p:xfrm>
         <a:graphic>
           <a:graphicData uri="http://schemas.openxmlformats.org/drawingml/2006/diagram">
-            <dgm:relIds xmlns:dgm="http://schemas.openxmlformats.org/drawingml/2006/diagram" xmlns:r="http://schemas.openxmlformats.org/officeDocument/2006/relationships" r:dm="rId2" r:lo="rId3" r:qs="rId4" r:cs="rId5"/>
+            <dgm:relIds xmlns:dgm="http://schemas.openxmlformats.org/drawingml/2006/diagram" xmlns:r="http://schemas.openxmlformats.org/officeDocument/2006/relationships" r:dm="rId3" r:lo="rId4" r:qs="rId5" r:cs="rId6"/>
           </a:graphicData>
         </a:graphic>
       </p:graphicFrame>
@@ -37478,7 +37274,7 @@
           <p:cNvPr id="8" name="CuadroTexto 7">
             <a:extLst>
               <a:ext uri="{FF2B5EF4-FFF2-40B4-BE49-F238E27FC236}">
-                <a16:creationId xmlns:a16="http://schemas.microsoft.com/office/drawing/2014/main" xmlns="" id="{6521D497-F4D4-4D6E-800F-683C9B806989}"/>
+                <a16:creationId xmlns:a16="http://schemas.microsoft.com/office/drawing/2014/main" id="{6521D497-F4D4-4D6E-800F-683C9B806989}"/>
               </a:ext>
             </a:extLst>
           </p:cNvPr>
@@ -37559,7 +37355,7 @@
           <p:cNvPr id="9" name="CuadroTexto 8">
             <a:extLst>
               <a:ext uri="{FF2B5EF4-FFF2-40B4-BE49-F238E27FC236}">
-                <a16:creationId xmlns:a16="http://schemas.microsoft.com/office/drawing/2014/main" xmlns="" id="{3F1CD0E6-9318-4C76-BE4E-ACAEE91DC8A5}"/>
+                <a16:creationId xmlns:a16="http://schemas.microsoft.com/office/drawing/2014/main" id="{3F1CD0E6-9318-4C76-BE4E-ACAEE91DC8A5}"/>
               </a:ext>
             </a:extLst>
           </p:cNvPr>
@@ -37626,7 +37422,7 @@
           <p:cNvPr id="10" name="Google Shape;112;p15">
             <a:extLst>
               <a:ext uri="{FF2B5EF4-FFF2-40B4-BE49-F238E27FC236}">
-                <a16:creationId xmlns:a16="http://schemas.microsoft.com/office/drawing/2014/main" xmlns="" id="{32FCFC43-5C04-4C69-A771-00C6AE7AC472}"/>
+                <a16:creationId xmlns:a16="http://schemas.microsoft.com/office/drawing/2014/main" id="{32FCFC43-5C04-4C69-A771-00C6AE7AC472}"/>
               </a:ext>
             </a:extLst>
           </p:cNvPr>
@@ -37683,6 +37479,9 @@
         </p:txBody>
       </p:sp>
     </p:spTree>
+    <p:custDataLst>
+      <p:tags r:id="rId1"/>
+    </p:custDataLst>
     <p:extLst>
       <p:ext uri="{BB962C8B-B14F-4D97-AF65-F5344CB8AC3E}">
         <p14:creationId xmlns:p14="http://schemas.microsoft.com/office/powerpoint/2010/main" val="2431968598"/>
@@ -37692,6 +37491,9 @@
   <p:clrMapOvr>
     <a:masterClrMapping/>
   </p:clrMapOvr>
+  <p:transition advTm="18102">
+    <p:fade thruBlk="1"/>
+  </p:transition>
   <p:timing>
     <p:tnLst>
       <p:par>
@@ -37839,7 +37641,7 @@
           <p:cNvPr id="2" name="Título 1">
             <a:extLst>
               <a:ext uri="{FF2B5EF4-FFF2-40B4-BE49-F238E27FC236}">
-                <a16:creationId xmlns:a16="http://schemas.microsoft.com/office/drawing/2014/main" xmlns="" id="{22120D53-D3EB-4EA0-8C12-6A42097435D0}"/>
+                <a16:creationId xmlns:a16="http://schemas.microsoft.com/office/drawing/2014/main" id="{22120D53-D3EB-4EA0-8C12-6A42097435D0}"/>
               </a:ext>
             </a:extLst>
           </p:cNvPr>
@@ -37867,7 +37669,7 @@
           <p:cNvPr id="4" name="Marcador de número de diapositiva 3">
             <a:extLst>
               <a:ext uri="{FF2B5EF4-FFF2-40B4-BE49-F238E27FC236}">
-                <a16:creationId xmlns:a16="http://schemas.microsoft.com/office/drawing/2014/main" xmlns="" id="{247DACE4-E052-4F15-BB54-A0E70A9CC0FA}"/>
+                <a16:creationId xmlns:a16="http://schemas.microsoft.com/office/drawing/2014/main" id="{247DACE4-E052-4F15-BB54-A0E70A9CC0FA}"/>
               </a:ext>
             </a:extLst>
           </p:cNvPr>
@@ -37905,7 +37707,7 @@
           <p:cNvPr id="7" name="CuadroTexto 6">
             <a:extLst>
               <a:ext uri="{FF2B5EF4-FFF2-40B4-BE49-F238E27FC236}">
-                <a16:creationId xmlns:a16="http://schemas.microsoft.com/office/drawing/2014/main" xmlns="" id="{37CCFB8F-CFE9-491A-9715-61EAC838F363}"/>
+                <a16:creationId xmlns:a16="http://schemas.microsoft.com/office/drawing/2014/main" id="{37CCFB8F-CFE9-491A-9715-61EAC838F363}"/>
               </a:ext>
             </a:extLst>
           </p:cNvPr>
@@ -38092,7 +37894,7 @@
           <p:cNvPr id="10" name="CuadroTexto 9">
             <a:extLst>
               <a:ext uri="{FF2B5EF4-FFF2-40B4-BE49-F238E27FC236}">
-                <a16:creationId xmlns:a16="http://schemas.microsoft.com/office/drawing/2014/main" xmlns="" id="{1137B7F1-8E15-41AE-8A1D-60BBCEDF7BE0}"/>
+                <a16:creationId xmlns:a16="http://schemas.microsoft.com/office/drawing/2014/main" id="{1137B7F1-8E15-41AE-8A1D-60BBCEDF7BE0}"/>
               </a:ext>
             </a:extLst>
           </p:cNvPr>
@@ -38132,7 +37934,7 @@
           <p:cNvPr id="8" name="Google Shape;112;p15">
             <a:extLst>
               <a:ext uri="{FF2B5EF4-FFF2-40B4-BE49-F238E27FC236}">
-                <a16:creationId xmlns:a16="http://schemas.microsoft.com/office/drawing/2014/main" xmlns="" id="{31B16089-5143-4851-9A63-FAF082B20268}"/>
+                <a16:creationId xmlns:a16="http://schemas.microsoft.com/office/drawing/2014/main" id="{31B16089-5143-4851-9A63-FAF082B20268}"/>
               </a:ext>
             </a:extLst>
           </p:cNvPr>
@@ -38193,7 +37995,7 @@
           <p:cNvPr id="6" name="Imagen 5" descr="Imagen que contiene texto, mapa&#10;&#10;Descripción generada automáticamente">
             <a:extLst>
               <a:ext uri="{FF2B5EF4-FFF2-40B4-BE49-F238E27FC236}">
-                <a16:creationId xmlns:a16="http://schemas.microsoft.com/office/drawing/2014/main" xmlns="" id="{4378F44F-4807-4F25-83D9-D73A4F9D3053}"/>
+                <a16:creationId xmlns:a16="http://schemas.microsoft.com/office/drawing/2014/main" id="{4378F44F-4807-4F25-83D9-D73A4F9D3053}"/>
               </a:ext>
             </a:extLst>
           </p:cNvPr>
@@ -38203,7 +38005,7 @@
           <p:nvPr/>
         </p:nvPicPr>
         <p:blipFill rotWithShape="1">
-          <a:blip r:embed="rId2"/>
+          <a:blip r:embed="rId3"/>
           <a:srcRect r="38328"/>
           <a:stretch/>
         </p:blipFill>
@@ -38218,6 +38020,9 @@
         </p:spPr>
       </p:pic>
     </p:spTree>
+    <p:custDataLst>
+      <p:tags r:id="rId1"/>
+    </p:custDataLst>
     <p:extLst>
       <p:ext uri="{BB962C8B-B14F-4D97-AF65-F5344CB8AC3E}">
         <p14:creationId xmlns:p14="http://schemas.microsoft.com/office/powerpoint/2010/main" val="3887456986"/>
@@ -38227,6 +38032,9 @@
   <p:clrMapOvr>
     <a:masterClrMapping/>
   </p:clrMapOvr>
+  <p:transition advTm="14426">
+    <p:fade thruBlk="1"/>
+  </p:transition>
   <p:timing>
     <p:tnLst>
       <p:par>
@@ -38338,7 +38146,7 @@
           <p:cNvPr id="2" name="Título 1">
             <a:extLst>
               <a:ext uri="{FF2B5EF4-FFF2-40B4-BE49-F238E27FC236}">
-                <a16:creationId xmlns:a16="http://schemas.microsoft.com/office/drawing/2014/main" xmlns="" id="{22120D53-D3EB-4EA0-8C12-6A42097435D0}"/>
+                <a16:creationId xmlns:a16="http://schemas.microsoft.com/office/drawing/2014/main" id="{22120D53-D3EB-4EA0-8C12-6A42097435D0}"/>
               </a:ext>
             </a:extLst>
           </p:cNvPr>
@@ -38366,7 +38174,7 @@
           <p:cNvPr id="4" name="Marcador de número de diapositiva 3">
             <a:extLst>
               <a:ext uri="{FF2B5EF4-FFF2-40B4-BE49-F238E27FC236}">
-                <a16:creationId xmlns:a16="http://schemas.microsoft.com/office/drawing/2014/main" xmlns="" id="{247DACE4-E052-4F15-BB54-A0E70A9CC0FA}"/>
+                <a16:creationId xmlns:a16="http://schemas.microsoft.com/office/drawing/2014/main" id="{247DACE4-E052-4F15-BB54-A0E70A9CC0FA}"/>
               </a:ext>
             </a:extLst>
           </p:cNvPr>
@@ -38404,7 +38212,7 @@
           <p:cNvPr id="5" name="Imagen 4">
             <a:extLst>
               <a:ext uri="{FF2B5EF4-FFF2-40B4-BE49-F238E27FC236}">
-                <a16:creationId xmlns:a16="http://schemas.microsoft.com/office/drawing/2014/main" xmlns="" id="{B3980D6E-B426-4A47-B974-5B0D5B84411A}"/>
+                <a16:creationId xmlns:a16="http://schemas.microsoft.com/office/drawing/2014/main" id="{B3980D6E-B426-4A47-B974-5B0D5B84411A}"/>
               </a:ext>
             </a:extLst>
           </p:cNvPr>
@@ -38412,7 +38220,7 @@
           <p:nvPr/>
         </p:nvPicPr>
         <p:blipFill rotWithShape="1">
-          <a:blip r:embed="rId2">
+          <a:blip r:embed="rId3">
             <a:extLst>
               <a:ext uri="{28A0092B-C50C-407E-A947-70E740481C1C}">
                 <a14:useLocalDpi xmlns:a14="http://schemas.microsoft.com/office/drawing/2010/main" val="0"/>
@@ -38446,7 +38254,7 @@
           <p:cNvPr id="7" name="CuadroTexto 6">
             <a:extLst>
               <a:ext uri="{FF2B5EF4-FFF2-40B4-BE49-F238E27FC236}">
-                <a16:creationId xmlns:a16="http://schemas.microsoft.com/office/drawing/2014/main" xmlns="" id="{37CCFB8F-CFE9-491A-9715-61EAC838F363}"/>
+                <a16:creationId xmlns:a16="http://schemas.microsoft.com/office/drawing/2014/main" id="{37CCFB8F-CFE9-491A-9715-61EAC838F363}"/>
               </a:ext>
             </a:extLst>
           </p:cNvPr>
@@ -38642,7 +38450,7 @@
           <p:cNvPr id="10" name="CuadroTexto 9">
             <a:extLst>
               <a:ext uri="{FF2B5EF4-FFF2-40B4-BE49-F238E27FC236}">
-                <a16:creationId xmlns:a16="http://schemas.microsoft.com/office/drawing/2014/main" xmlns="" id="{1137B7F1-8E15-41AE-8A1D-60BBCEDF7BE0}"/>
+                <a16:creationId xmlns:a16="http://schemas.microsoft.com/office/drawing/2014/main" id="{1137B7F1-8E15-41AE-8A1D-60BBCEDF7BE0}"/>
               </a:ext>
             </a:extLst>
           </p:cNvPr>
@@ -38688,7 +38496,7 @@
           <p:cNvPr id="8" name="Google Shape;112;p15">
             <a:extLst>
               <a:ext uri="{FF2B5EF4-FFF2-40B4-BE49-F238E27FC236}">
-                <a16:creationId xmlns:a16="http://schemas.microsoft.com/office/drawing/2014/main" xmlns="" id="{31B16089-5143-4851-9A63-FAF082B20268}"/>
+                <a16:creationId xmlns:a16="http://schemas.microsoft.com/office/drawing/2014/main" id="{31B16089-5143-4851-9A63-FAF082B20268}"/>
               </a:ext>
             </a:extLst>
           </p:cNvPr>
@@ -38745,6 +38553,9 @@
         </p:txBody>
       </p:sp>
     </p:spTree>
+    <p:custDataLst>
+      <p:tags r:id="rId1"/>
+    </p:custDataLst>
     <p:extLst>
       <p:ext uri="{BB962C8B-B14F-4D97-AF65-F5344CB8AC3E}">
         <p14:creationId xmlns:p14="http://schemas.microsoft.com/office/powerpoint/2010/main" val="1808171800"/>
@@ -38754,6 +38565,9 @@
   <p:clrMapOvr>
     <a:masterClrMapping/>
   </p:clrMapOvr>
+  <p:transition advTm="23609">
+    <p:fade thruBlk="1"/>
+  </p:transition>
   <p:timing>
     <p:tnLst>
       <p:par>
@@ -38865,7 +38679,7 @@
           <p:cNvPr id="2" name="Título 1">
             <a:extLst>
               <a:ext uri="{FF2B5EF4-FFF2-40B4-BE49-F238E27FC236}">
-                <a16:creationId xmlns:a16="http://schemas.microsoft.com/office/drawing/2014/main" xmlns="" id="{22120D53-D3EB-4EA0-8C12-6A42097435D0}"/>
+                <a16:creationId xmlns:a16="http://schemas.microsoft.com/office/drawing/2014/main" id="{22120D53-D3EB-4EA0-8C12-6A42097435D0}"/>
               </a:ext>
             </a:extLst>
           </p:cNvPr>
@@ -38893,7 +38707,7 @@
           <p:cNvPr id="4" name="Marcador de número de diapositiva 3">
             <a:extLst>
               <a:ext uri="{FF2B5EF4-FFF2-40B4-BE49-F238E27FC236}">
-                <a16:creationId xmlns:a16="http://schemas.microsoft.com/office/drawing/2014/main" xmlns="" id="{247DACE4-E052-4F15-BB54-A0E70A9CC0FA}"/>
+                <a16:creationId xmlns:a16="http://schemas.microsoft.com/office/drawing/2014/main" id="{247DACE4-E052-4F15-BB54-A0E70A9CC0FA}"/>
               </a:ext>
             </a:extLst>
           </p:cNvPr>
@@ -38931,7 +38745,7 @@
           <p:cNvPr id="7" name="CuadroTexto 6">
             <a:extLst>
               <a:ext uri="{FF2B5EF4-FFF2-40B4-BE49-F238E27FC236}">
-                <a16:creationId xmlns:a16="http://schemas.microsoft.com/office/drawing/2014/main" xmlns="" id="{37CCFB8F-CFE9-491A-9715-61EAC838F363}"/>
+                <a16:creationId xmlns:a16="http://schemas.microsoft.com/office/drawing/2014/main" id="{37CCFB8F-CFE9-491A-9715-61EAC838F363}"/>
               </a:ext>
             </a:extLst>
           </p:cNvPr>
@@ -39053,7 +38867,7 @@
           <p:cNvPr id="10" name="CuadroTexto 9">
             <a:extLst>
               <a:ext uri="{FF2B5EF4-FFF2-40B4-BE49-F238E27FC236}">
-                <a16:creationId xmlns:a16="http://schemas.microsoft.com/office/drawing/2014/main" xmlns="" id="{1137B7F1-8E15-41AE-8A1D-60BBCEDF7BE0}"/>
+                <a16:creationId xmlns:a16="http://schemas.microsoft.com/office/drawing/2014/main" id="{1137B7F1-8E15-41AE-8A1D-60BBCEDF7BE0}"/>
               </a:ext>
             </a:extLst>
           </p:cNvPr>
@@ -39093,7 +38907,7 @@
           <p:cNvPr id="8" name="Imagen 7">
             <a:extLst>
               <a:ext uri="{FF2B5EF4-FFF2-40B4-BE49-F238E27FC236}">
-                <a16:creationId xmlns:a16="http://schemas.microsoft.com/office/drawing/2014/main" xmlns="" id="{4DFE78E1-644F-49E6-862A-1EEA3CD07242}"/>
+                <a16:creationId xmlns:a16="http://schemas.microsoft.com/office/drawing/2014/main" id="{4DFE78E1-644F-49E6-862A-1EEA3CD07242}"/>
               </a:ext>
             </a:extLst>
           </p:cNvPr>
@@ -39101,7 +38915,7 @@
           <p:nvPr/>
         </p:nvPicPr>
         <p:blipFill>
-          <a:blip r:embed="rId2">
+          <a:blip r:embed="rId3">
             <a:extLst>
               <a:ext uri="{28A0092B-C50C-407E-A947-70E740481C1C}">
                 <a14:useLocalDpi xmlns:a14="http://schemas.microsoft.com/office/drawing/2010/main" val="0"/>
@@ -39132,7 +38946,7 @@
           <p:cNvPr id="9" name="Google Shape;112;p15">
             <a:extLst>
               <a:ext uri="{FF2B5EF4-FFF2-40B4-BE49-F238E27FC236}">
-                <a16:creationId xmlns:a16="http://schemas.microsoft.com/office/drawing/2014/main" xmlns="" id="{9008DA4A-1FBE-4461-9CAF-30A471522324}"/>
+                <a16:creationId xmlns:a16="http://schemas.microsoft.com/office/drawing/2014/main" id="{9008DA4A-1FBE-4461-9CAF-30A471522324}"/>
               </a:ext>
             </a:extLst>
           </p:cNvPr>
@@ -39189,6 +39003,9 @@
         </p:txBody>
       </p:sp>
     </p:spTree>
+    <p:custDataLst>
+      <p:tags r:id="rId1"/>
+    </p:custDataLst>
     <p:extLst>
       <p:ext uri="{BB962C8B-B14F-4D97-AF65-F5344CB8AC3E}">
         <p14:creationId xmlns:p14="http://schemas.microsoft.com/office/powerpoint/2010/main" val="1623246431"/>
@@ -39198,6 +39015,9 @@
   <p:clrMapOvr>
     <a:masterClrMapping/>
   </p:clrMapOvr>
+  <p:transition advTm="19258">
+    <p:fade thruBlk="1"/>
+  </p:transition>
   <p:timing>
     <p:tnLst>
       <p:par>
@@ -39494,7 +39314,7 @@
           <p:cNvPr id="8" name="Google Shape;112;p15">
             <a:extLst>
               <a:ext uri="{FF2B5EF4-FFF2-40B4-BE49-F238E27FC236}">
-                <a16:creationId xmlns:a16="http://schemas.microsoft.com/office/drawing/2014/main" xmlns="" id="{604371DA-FED7-4159-AB63-E18474060AB1}"/>
+                <a16:creationId xmlns:a16="http://schemas.microsoft.com/office/drawing/2014/main" id="{604371DA-FED7-4159-AB63-E18474060AB1}"/>
               </a:ext>
             </a:extLst>
           </p:cNvPr>
@@ -39503,7 +39323,7 @@
         </p:nvSpPr>
         <p:spPr>
           <a:xfrm>
-            <a:off x="717175" y="297090"/>
+            <a:off x="726140" y="313066"/>
             <a:ext cx="591671" cy="435600"/>
           </a:xfrm>
           <a:prstGeom prst="rect">
@@ -39530,7 +39350,7 @@
               <a:buNone/>
             </a:pPr>
             <a:r>
-              <a:rPr lang="es-ES" sz="1600" dirty="0">
+              <a:rPr lang="es-ES" sz="2400" dirty="0">
                 <a:solidFill>
                   <a:schemeClr val="dk1"/>
                 </a:solidFill>
@@ -39541,7 +39361,7 @@
               </a:rPr>
               <a:t>1</a:t>
             </a:r>
-            <a:endParaRPr sz="1600" dirty="0">
+            <a:endParaRPr sz="2400" dirty="0">
               <a:latin typeface="Lora"/>
               <a:ea typeface="Lora"/>
               <a:cs typeface="Lora"/>
@@ -39560,13 +39380,9 @@
   <p:clrMapOvr>
     <a:masterClrMapping/>
   </p:clrMapOvr>
-  <p:timing>
-    <p:tnLst>
-      <p:par>
-        <p:cTn id="1" dur="indefinite" restart="never" nodeType="tmRoot"/>
-      </p:par>
-    </p:tnLst>
-  </p:timing>
+  <p:transition advTm="53567">
+    <p:fade thruBlk="1"/>
+  </p:transition>
 </p:sld>
 </file>
 
@@ -39592,7 +39408,7 @@
           <p:cNvPr id="2" name="Título 1">
             <a:extLst>
               <a:ext uri="{FF2B5EF4-FFF2-40B4-BE49-F238E27FC236}">
-                <a16:creationId xmlns:a16="http://schemas.microsoft.com/office/drawing/2014/main" xmlns="" id="{22120D53-D3EB-4EA0-8C12-6A42097435D0}"/>
+                <a16:creationId xmlns:a16="http://schemas.microsoft.com/office/drawing/2014/main" id="{22120D53-D3EB-4EA0-8C12-6A42097435D0}"/>
               </a:ext>
             </a:extLst>
           </p:cNvPr>
@@ -39620,7 +39436,7 @@
           <p:cNvPr id="4" name="Marcador de número de diapositiva 3">
             <a:extLst>
               <a:ext uri="{FF2B5EF4-FFF2-40B4-BE49-F238E27FC236}">
-                <a16:creationId xmlns:a16="http://schemas.microsoft.com/office/drawing/2014/main" xmlns="" id="{247DACE4-E052-4F15-BB54-A0E70A9CC0FA}"/>
+                <a16:creationId xmlns:a16="http://schemas.microsoft.com/office/drawing/2014/main" id="{247DACE4-E052-4F15-BB54-A0E70A9CC0FA}"/>
               </a:ext>
             </a:extLst>
           </p:cNvPr>
@@ -39658,7 +39474,7 @@
           <p:cNvPr id="7" name="CuadroTexto 6">
             <a:extLst>
               <a:ext uri="{FF2B5EF4-FFF2-40B4-BE49-F238E27FC236}">
-                <a16:creationId xmlns:a16="http://schemas.microsoft.com/office/drawing/2014/main" xmlns="" id="{37CCFB8F-CFE9-491A-9715-61EAC838F363}"/>
+                <a16:creationId xmlns:a16="http://schemas.microsoft.com/office/drawing/2014/main" id="{37CCFB8F-CFE9-491A-9715-61EAC838F363}"/>
               </a:ext>
             </a:extLst>
           </p:cNvPr>
@@ -39795,7 +39611,7 @@
           <p:cNvPr id="9" name="Google Shape;112;p15">
             <a:extLst>
               <a:ext uri="{FF2B5EF4-FFF2-40B4-BE49-F238E27FC236}">
-                <a16:creationId xmlns:a16="http://schemas.microsoft.com/office/drawing/2014/main" xmlns="" id="{9008DA4A-1FBE-4461-9CAF-30A471522324}"/>
+                <a16:creationId xmlns:a16="http://schemas.microsoft.com/office/drawing/2014/main" id="{9008DA4A-1FBE-4461-9CAF-30A471522324}"/>
               </a:ext>
             </a:extLst>
           </p:cNvPr>
@@ -39861,13 +39677,9 @@
   <p:clrMapOvr>
     <a:masterClrMapping/>
   </p:clrMapOvr>
-  <p:timing>
-    <p:tnLst>
-      <p:par>
-        <p:cTn id="1" dur="indefinite" restart="never" nodeType="tmRoot"/>
-      </p:par>
-    </p:tnLst>
-  </p:timing>
+  <p:transition advTm="16416">
+    <p:fade thruBlk="1"/>
+  </p:transition>
 </p:sld>
 </file>
 
@@ -40024,7 +39836,7 @@
           <p:cNvPr id="4" name="CuadroTexto 3">
             <a:extLst>
               <a:ext uri="{FF2B5EF4-FFF2-40B4-BE49-F238E27FC236}">
-                <a16:creationId xmlns:a16="http://schemas.microsoft.com/office/drawing/2014/main" xmlns="" id="{828ABA87-303F-44EE-BA55-C1C42CAE1EAA}"/>
+                <a16:creationId xmlns:a16="http://schemas.microsoft.com/office/drawing/2014/main" id="{828ABA87-303F-44EE-BA55-C1C42CAE1EAA}"/>
               </a:ext>
             </a:extLst>
           </p:cNvPr>
@@ -40401,13 +40213,9 @@
   <p:clrMapOvr>
     <a:masterClrMapping/>
   </p:clrMapOvr>
-  <p:timing>
-    <p:tnLst>
-      <p:par>
-        <p:cTn id="1" dur="indefinite" restart="never" nodeType="tmRoot"/>
-      </p:par>
-    </p:tnLst>
-  </p:timing>
+  <p:transition advTm="20439">
+    <p:fade thruBlk="1"/>
+  </p:transition>
 </p:sld>
 </file>
 
@@ -40433,7 +40241,7 @@
           <p:cNvPr id="2" name="Título 1">
             <a:extLst>
               <a:ext uri="{FF2B5EF4-FFF2-40B4-BE49-F238E27FC236}">
-                <a16:creationId xmlns:a16="http://schemas.microsoft.com/office/drawing/2014/main" xmlns="" id="{22120D53-D3EB-4EA0-8C12-6A42097435D0}"/>
+                <a16:creationId xmlns:a16="http://schemas.microsoft.com/office/drawing/2014/main" id="{22120D53-D3EB-4EA0-8C12-6A42097435D0}"/>
               </a:ext>
             </a:extLst>
           </p:cNvPr>
@@ -40461,7 +40269,7 @@
           <p:cNvPr id="4" name="Marcador de número de diapositiva 3">
             <a:extLst>
               <a:ext uri="{FF2B5EF4-FFF2-40B4-BE49-F238E27FC236}">
-                <a16:creationId xmlns:a16="http://schemas.microsoft.com/office/drawing/2014/main" xmlns="" id="{247DACE4-E052-4F15-BB54-A0E70A9CC0FA}"/>
+                <a16:creationId xmlns:a16="http://schemas.microsoft.com/office/drawing/2014/main" id="{247DACE4-E052-4F15-BB54-A0E70A9CC0FA}"/>
               </a:ext>
             </a:extLst>
           </p:cNvPr>
@@ -40499,7 +40307,7 @@
           <p:cNvPr id="9" name="Google Shape;112;p15">
             <a:extLst>
               <a:ext uri="{FF2B5EF4-FFF2-40B4-BE49-F238E27FC236}">
-                <a16:creationId xmlns:a16="http://schemas.microsoft.com/office/drawing/2014/main" xmlns="" id="{9008DA4A-1FBE-4461-9CAF-30A471522324}"/>
+                <a16:creationId xmlns:a16="http://schemas.microsoft.com/office/drawing/2014/main" id="{9008DA4A-1FBE-4461-9CAF-30A471522324}"/>
               </a:ext>
             </a:extLst>
           </p:cNvPr>
@@ -40560,7 +40368,7 @@
           <p:cNvPr id="3" name="CuadroTexto 2">
             <a:extLst>
               <a:ext uri="{FF2B5EF4-FFF2-40B4-BE49-F238E27FC236}">
-                <a16:creationId xmlns:a16="http://schemas.microsoft.com/office/drawing/2014/main" xmlns="" id="{A1FF8D6D-78E6-42F8-97C7-E79ABDFAB777}"/>
+                <a16:creationId xmlns:a16="http://schemas.microsoft.com/office/drawing/2014/main" id="{A1FF8D6D-78E6-42F8-97C7-E79ABDFAB777}"/>
               </a:ext>
             </a:extLst>
           </p:cNvPr>
@@ -40612,7 +40420,7 @@
               <a:t>usuarios finales</a:t>
             </a:r>
             <a:r>
-              <a:rPr lang="es-ES" sz="1800" dirty="0" smtClean="0">
+              <a:rPr lang="es-ES" sz="1800" dirty="0">
                 <a:latin typeface="Quattrocento Sans" panose="020B0604020202020204" charset="0"/>
               </a:rPr>
               <a:t>.</a:t>
@@ -40645,7 +40453,7 @@
               <a:buChar char="•"/>
             </a:pPr>
             <a:r>
-              <a:rPr lang="es-ES" sz="1800" u="sng" dirty="0" smtClean="0">
+              <a:rPr lang="es-ES" sz="1800" u="sng" dirty="0">
                 <a:highlight>
                   <a:srgbClr val="CC95ED"/>
                 </a:highlight>
@@ -40654,16 +40462,10 @@
               <a:t>Despliegue</a:t>
             </a:r>
             <a:r>
-              <a:rPr lang="es-ES" sz="1800" dirty="0" smtClean="0">
-                <a:latin typeface="Quattrocento Sans" panose="020B0604020202020204" charset="0"/>
-              </a:rPr>
-              <a:t> </a:t>
-            </a:r>
-            <a:r>
               <a:rPr lang="es-ES" sz="1800" dirty="0">
                 <a:latin typeface="Quattrocento Sans" panose="020B0604020202020204" charset="0"/>
               </a:rPr>
-              <a:t>de la aplicación en la Facultad de Informática.</a:t>
+              <a:t> de la aplicación en la Facultad de Informática.</a:t>
             </a:r>
           </a:p>
           <a:p>
@@ -40709,13 +40511,9 @@
   <p:clrMapOvr>
     <a:masterClrMapping/>
   </p:clrMapOvr>
-  <p:timing>
-    <p:tnLst>
-      <p:par>
-        <p:cTn id="1" dur="indefinite" restart="never" nodeType="tmRoot"/>
-      </p:par>
-    </p:tnLst>
-  </p:timing>
+  <p:transition advTm="14342">
+    <p:fade thruBlk="1"/>
+  </p:transition>
 </p:sld>
 </file>
 
@@ -40917,13 +40715,9 @@
   <p:clrMapOvr>
     <a:masterClrMapping/>
   </p:clrMapOvr>
-  <p:timing>
-    <p:tnLst>
-      <p:par>
-        <p:cTn id="1" dur="indefinite" restart="never" nodeType="tmRoot"/>
-      </p:par>
-    </p:tnLst>
-  </p:timing>
+  <p:transition advTm="2808">
+    <p:fade thruBlk="1"/>
+  </p:transition>
 </p:sld>
 </file>
 
@@ -40949,7 +40743,7 @@
           <p:cNvPr id="2" name="Título 1">
             <a:extLst>
               <a:ext uri="{FF2B5EF4-FFF2-40B4-BE49-F238E27FC236}">
-                <a16:creationId xmlns:a16="http://schemas.microsoft.com/office/drawing/2014/main" xmlns="" id="{22120D53-D3EB-4EA0-8C12-6A42097435D0}"/>
+                <a16:creationId xmlns:a16="http://schemas.microsoft.com/office/drawing/2014/main" id="{22120D53-D3EB-4EA0-8C12-6A42097435D0}"/>
               </a:ext>
             </a:extLst>
           </p:cNvPr>
@@ -40977,7 +40771,7 @@
           <p:cNvPr id="4" name="Marcador de número de diapositiva 3">
             <a:extLst>
               <a:ext uri="{FF2B5EF4-FFF2-40B4-BE49-F238E27FC236}">
-                <a16:creationId xmlns:a16="http://schemas.microsoft.com/office/drawing/2014/main" xmlns="" id="{247DACE4-E052-4F15-BB54-A0E70A9CC0FA}"/>
+                <a16:creationId xmlns:a16="http://schemas.microsoft.com/office/drawing/2014/main" id="{247DACE4-E052-4F15-BB54-A0E70A9CC0FA}"/>
               </a:ext>
             </a:extLst>
           </p:cNvPr>
@@ -41015,7 +40809,7 @@
           <p:cNvPr id="3" name="Diagrama 2">
             <a:extLst>
               <a:ext uri="{FF2B5EF4-FFF2-40B4-BE49-F238E27FC236}">
-                <a16:creationId xmlns:a16="http://schemas.microsoft.com/office/drawing/2014/main" xmlns="" id="{10DBFD7C-0ED0-4BCD-ABC0-ED108C096DD8}"/>
+                <a16:creationId xmlns:a16="http://schemas.microsoft.com/office/drawing/2014/main" id="{10DBFD7C-0ED0-4BCD-ABC0-ED108C096DD8}"/>
               </a:ext>
             </a:extLst>
           </p:cNvPr>
@@ -41023,7 +40817,7 @@
           <p:nvPr>
             <p:extLst>
               <p:ext uri="{D42A27DB-BD31-4B8C-83A1-F6EECF244321}">
-                <p14:modId xmlns:p14="http://schemas.microsoft.com/office/powerpoint/2010/main" val="4216596033"/>
+                <p14:modId xmlns:p14="http://schemas.microsoft.com/office/powerpoint/2010/main" val="2883356111"/>
               </p:ext>
             </p:extLst>
           </p:nvPr>
@@ -41034,7 +40828,7 @@
         </p:xfrm>
         <a:graphic>
           <a:graphicData uri="http://schemas.openxmlformats.org/drawingml/2006/diagram">
-            <dgm:relIds xmlns:dgm="http://schemas.openxmlformats.org/drawingml/2006/diagram" xmlns:r="http://schemas.openxmlformats.org/officeDocument/2006/relationships" r:dm="rId2" r:lo="rId3" r:qs="rId4" r:cs="rId5"/>
+            <dgm:relIds xmlns:dgm="http://schemas.openxmlformats.org/drawingml/2006/diagram" xmlns:r="http://schemas.openxmlformats.org/officeDocument/2006/relationships" r:dm="rId3" r:lo="rId4" r:qs="rId5" r:cs="rId6"/>
           </a:graphicData>
         </a:graphic>
       </p:graphicFrame>
@@ -41043,7 +40837,7 @@
           <p:cNvPr id="9" name="Google Shape;112;p15">
             <a:extLst>
               <a:ext uri="{FF2B5EF4-FFF2-40B4-BE49-F238E27FC236}">
-                <a16:creationId xmlns:a16="http://schemas.microsoft.com/office/drawing/2014/main" xmlns="" id="{9008DA4A-1FBE-4461-9CAF-30A471522324}"/>
+                <a16:creationId xmlns:a16="http://schemas.microsoft.com/office/drawing/2014/main" id="{9008DA4A-1FBE-4461-9CAF-30A471522324}"/>
               </a:ext>
             </a:extLst>
           </p:cNvPr>
@@ -41100,6 +40894,9 @@
         </p:txBody>
       </p:sp>
     </p:spTree>
+    <p:custDataLst>
+      <p:tags r:id="rId1"/>
+    </p:custDataLst>
     <p:extLst>
       <p:ext uri="{BB962C8B-B14F-4D97-AF65-F5344CB8AC3E}">
         <p14:creationId xmlns:p14="http://schemas.microsoft.com/office/powerpoint/2010/main" val="297679091"/>
@@ -41109,6 +40906,9 @@
   <p:clrMapOvr>
     <a:masterClrMapping/>
   </p:clrMapOvr>
+  <p:transition advTm="22171">
+    <p:fade thruBlk="1"/>
+  </p:transition>
   <p:timing>
     <p:tnLst>
       <p:par>
@@ -41691,7 +41491,7 @@
           <p:cNvPr id="2" name="Título 1">
             <a:extLst>
               <a:ext uri="{FF2B5EF4-FFF2-40B4-BE49-F238E27FC236}">
-                <a16:creationId xmlns:a16="http://schemas.microsoft.com/office/drawing/2014/main" xmlns="" id="{22120D53-D3EB-4EA0-8C12-6A42097435D0}"/>
+                <a16:creationId xmlns:a16="http://schemas.microsoft.com/office/drawing/2014/main" id="{22120D53-D3EB-4EA0-8C12-6A42097435D0}"/>
               </a:ext>
             </a:extLst>
           </p:cNvPr>
@@ -41719,7 +41519,7 @@
           <p:cNvPr id="4" name="Marcador de número de diapositiva 3">
             <a:extLst>
               <a:ext uri="{FF2B5EF4-FFF2-40B4-BE49-F238E27FC236}">
-                <a16:creationId xmlns:a16="http://schemas.microsoft.com/office/drawing/2014/main" xmlns="" id="{247DACE4-E052-4F15-BB54-A0E70A9CC0FA}"/>
+                <a16:creationId xmlns:a16="http://schemas.microsoft.com/office/drawing/2014/main" id="{247DACE4-E052-4F15-BB54-A0E70A9CC0FA}"/>
               </a:ext>
             </a:extLst>
           </p:cNvPr>
@@ -41757,7 +41557,7 @@
           <p:cNvPr id="9" name="Google Shape;112;p15">
             <a:extLst>
               <a:ext uri="{FF2B5EF4-FFF2-40B4-BE49-F238E27FC236}">
-                <a16:creationId xmlns:a16="http://schemas.microsoft.com/office/drawing/2014/main" xmlns="" id="{9008DA4A-1FBE-4461-9CAF-30A471522324}"/>
+                <a16:creationId xmlns:a16="http://schemas.microsoft.com/office/drawing/2014/main" id="{9008DA4A-1FBE-4461-9CAF-30A471522324}"/>
               </a:ext>
             </a:extLst>
           </p:cNvPr>
@@ -41766,7 +41566,7 @@
         </p:nvSpPr>
         <p:spPr>
           <a:xfrm>
-            <a:off x="717175" y="309604"/>
+            <a:off x="726140" y="318569"/>
             <a:ext cx="591671" cy="435600"/>
           </a:xfrm>
           <a:prstGeom prst="rect">
@@ -41818,7 +41618,7 @@
           <p:cNvPr id="6" name="Diagrama 2">
             <a:extLst>
               <a:ext uri="{FF2B5EF4-FFF2-40B4-BE49-F238E27FC236}">
-                <a16:creationId xmlns:a16="http://schemas.microsoft.com/office/drawing/2014/main" xmlns="" id="{10DBFD7C-0ED0-4BCD-ABC0-ED108C096DD8}"/>
+                <a16:creationId xmlns:a16="http://schemas.microsoft.com/office/drawing/2014/main" id="{10DBFD7C-0ED0-4BCD-ABC0-ED108C096DD8}"/>
               </a:ext>
             </a:extLst>
           </p:cNvPr>
@@ -41837,11 +41637,14 @@
         </p:xfrm>
         <a:graphic>
           <a:graphicData uri="http://schemas.openxmlformats.org/drawingml/2006/diagram">
-            <dgm:relIds xmlns:dgm="http://schemas.openxmlformats.org/drawingml/2006/diagram" xmlns:r="http://schemas.openxmlformats.org/officeDocument/2006/relationships" r:dm="rId2" r:lo="rId3" r:qs="rId4" r:cs="rId5"/>
+            <dgm:relIds xmlns:dgm="http://schemas.openxmlformats.org/drawingml/2006/diagram" xmlns:r="http://schemas.openxmlformats.org/officeDocument/2006/relationships" r:dm="rId3" r:lo="rId4" r:qs="rId5" r:cs="rId6"/>
           </a:graphicData>
         </a:graphic>
       </p:graphicFrame>
     </p:spTree>
+    <p:custDataLst>
+      <p:tags r:id="rId1"/>
+    </p:custDataLst>
     <p:extLst>
       <p:ext uri="{BB962C8B-B14F-4D97-AF65-F5344CB8AC3E}">
         <p14:creationId xmlns:p14="http://schemas.microsoft.com/office/powerpoint/2010/main" val="2813790840"/>
@@ -41851,6 +41654,9 @@
   <p:clrMapOvr>
     <a:masterClrMapping/>
   </p:clrMapOvr>
+  <p:transition advTm="15942">
+    <p:fade thruBlk="1"/>
+  </p:transition>
   <p:timing>
     <p:tnLst>
       <p:par>
@@ -42486,7 +42292,7 @@
           <p:cNvPr id="3" name="Imagen 2" descr="Imagen que contiene dibujo&#10;&#10;Descripción generada automáticamente">
             <a:extLst>
               <a:ext uri="{FF2B5EF4-FFF2-40B4-BE49-F238E27FC236}">
-                <a16:creationId xmlns:a16="http://schemas.microsoft.com/office/drawing/2014/main" xmlns="" id="{5AD2632B-30DA-40CE-9C9C-3826BD3C3180}"/>
+                <a16:creationId xmlns:a16="http://schemas.microsoft.com/office/drawing/2014/main" id="{5AD2632B-30DA-40CE-9C9C-3826BD3C3180}"/>
               </a:ext>
             </a:extLst>
           </p:cNvPr>
@@ -42516,7 +42322,7 @@
           <p:cNvPr id="21" name="Google Shape;85;p13">
             <a:extLst>
               <a:ext uri="{FF2B5EF4-FFF2-40B4-BE49-F238E27FC236}">
-                <a16:creationId xmlns:a16="http://schemas.microsoft.com/office/drawing/2014/main" xmlns="" id="{9951FC2E-B18F-44A0-AF54-765653F167B4}"/>
+                <a16:creationId xmlns:a16="http://schemas.microsoft.com/office/drawing/2014/main" id="{9951FC2E-B18F-44A0-AF54-765653F167B4}"/>
               </a:ext>
             </a:extLst>
           </p:cNvPr>
@@ -42565,7 +42371,7 @@
           <p:cNvPr id="22" name="Google Shape;94;p13">
             <a:extLst>
               <a:ext uri="{FF2B5EF4-FFF2-40B4-BE49-F238E27FC236}">
-                <a16:creationId xmlns:a16="http://schemas.microsoft.com/office/drawing/2014/main" xmlns="" id="{2C810E6E-2008-4E05-BC4C-C00F6BAFC117}"/>
+                <a16:creationId xmlns:a16="http://schemas.microsoft.com/office/drawing/2014/main" id="{2C810E6E-2008-4E05-BC4C-C00F6BAFC117}"/>
               </a:ext>
             </a:extLst>
           </p:cNvPr>
@@ -42611,7 +42417,7 @@
                 <a:hlinkClick r:id="rId4">
                   <a:extLst>
                     <a:ext uri="{A12FA001-AC4F-418D-AE19-62706E023703}">
-                      <ahyp:hlinkClr xmlns:ahyp="http://schemas.microsoft.com/office/drawing/2018/hyperlinkcolor" xmlns="" val="tx"/>
+                      <ahyp:hlinkClr xmlns:ahyp="http://schemas.microsoft.com/office/drawing/2018/hyperlinkcolor" val="tx"/>
                     </a:ext>
                   </a:extLst>
                 </a:hlinkClick>
@@ -42682,7 +42488,7 @@
                 <a:hlinkClick r:id="rId5">
                   <a:extLst>
                     <a:ext uri="{A12FA001-AC4F-418D-AE19-62706E023703}">
-                      <ahyp:hlinkClr xmlns:ahyp="http://schemas.microsoft.com/office/drawing/2018/hyperlinkcolor" xmlns="" val="tx"/>
+                      <ahyp:hlinkClr xmlns:ahyp="http://schemas.microsoft.com/office/drawing/2018/hyperlinkcolor" val="tx"/>
                     </a:ext>
                   </a:extLst>
                 </a:hlinkClick>
@@ -42764,13 +42570,9 @@
   <p:clrMapOvr>
     <a:masterClrMapping/>
   </p:clrMapOvr>
-  <p:timing>
-    <p:tnLst>
-      <p:par>
-        <p:cTn id="1" dur="indefinite" restart="never" nodeType="tmRoot"/>
-      </p:par>
-    </p:tnLst>
-  </p:timing>
+  <p:transition advTm="7551">
+    <p:fade thruBlk="1"/>
+  </p:transition>
 </p:sld>
 </file>
 
@@ -42879,7 +42681,7 @@
         </p:nvSpPr>
         <p:spPr>
           <a:xfrm>
-            <a:off x="759902" y="244141"/>
+            <a:off x="759901" y="255962"/>
             <a:ext cx="543900" cy="562200"/>
           </a:xfrm>
           <a:prstGeom prst="rect">
@@ -42906,7 +42708,7 @@
               <a:buNone/>
             </a:pPr>
             <a:r>
-              <a:rPr lang="es-ES" sz="2000" dirty="0">
+              <a:rPr lang="es-ES" sz="1600" dirty="0">
                 <a:solidFill>
                   <a:schemeClr val="dk1"/>
                 </a:solidFill>
@@ -42917,7 +42719,7 @@
               </a:rPr>
               <a:t>1.1</a:t>
             </a:r>
-            <a:endParaRPr sz="2000" dirty="0">
+            <a:endParaRPr sz="1600" dirty="0">
               <a:latin typeface="Lora"/>
               <a:ea typeface="Lora"/>
               <a:cs typeface="Lora"/>
@@ -42931,7 +42733,7 @@
           <p:cNvPr id="13" name="CuadroTexto 11">
             <a:extLst>
               <a:ext uri="{FF2B5EF4-FFF2-40B4-BE49-F238E27FC236}">
-                <a16:creationId xmlns:a16="http://schemas.microsoft.com/office/drawing/2014/main" xmlns="" id="{20840E76-3DE8-432F-A63B-48B5CBAD5272}"/>
+                <a16:creationId xmlns:a16="http://schemas.microsoft.com/office/drawing/2014/main" id="{20840E76-3DE8-432F-A63B-48B5CBAD5272}"/>
               </a:ext>
             </a:extLst>
           </p:cNvPr>
@@ -43006,7 +42808,7 @@
           <p:nvPr/>
         </p:nvPicPr>
         <p:blipFill>
-          <a:blip r:embed="rId3">
+          <a:blip r:embed="rId4">
             <a:extLst>
               <a:ext uri="{28A0092B-C50C-407E-A947-70E740481C1C}">
                 <a14:useLocalDpi xmlns:a14="http://schemas.microsoft.com/office/drawing/2010/main" val="0"/>
@@ -43047,7 +42849,7 @@
           <p:nvPr/>
         </p:nvPicPr>
         <p:blipFill>
-          <a:blip r:embed="rId3">
+          <a:blip r:embed="rId4">
             <a:extLst>
               <a:ext uri="{28A0092B-C50C-407E-A947-70E740481C1C}">
                 <a14:useLocalDpi xmlns:a14="http://schemas.microsoft.com/office/drawing/2010/main" val="0"/>
@@ -43088,7 +42890,7 @@
           <p:nvPr/>
         </p:nvPicPr>
         <p:blipFill>
-          <a:blip r:embed="rId3">
+          <a:blip r:embed="rId4">
             <a:extLst>
               <a:ext uri="{28A0092B-C50C-407E-A947-70E740481C1C}">
                 <a14:useLocalDpi xmlns:a14="http://schemas.microsoft.com/office/drawing/2010/main" val="0"/>
@@ -43129,7 +42931,7 @@
           <p:nvPr/>
         </p:nvPicPr>
         <p:blipFill>
-          <a:blip r:embed="rId3">
+          <a:blip r:embed="rId4">
             <a:extLst>
               <a:ext uri="{28A0092B-C50C-407E-A947-70E740481C1C}">
                 <a14:useLocalDpi xmlns:a14="http://schemas.microsoft.com/office/drawing/2010/main" val="0"/>
@@ -43170,7 +42972,7 @@
           <p:nvPr/>
         </p:nvPicPr>
         <p:blipFill>
-          <a:blip r:embed="rId4">
+          <a:blip r:embed="rId5">
             <a:extLst>
               <a:ext uri="{28A0092B-C50C-407E-A947-70E740481C1C}">
                 <a14:useLocalDpi xmlns:a14="http://schemas.microsoft.com/office/drawing/2010/main" val="0"/>
@@ -43207,7 +43009,7 @@
           <p:cNvPr id="6" name="CuadroTexto 5">
             <a:extLst>
               <a:ext uri="{FF2B5EF4-FFF2-40B4-BE49-F238E27FC236}">
-                <a16:creationId xmlns:a16="http://schemas.microsoft.com/office/drawing/2014/main" xmlns="" id="{7A05EF92-AEC3-4F9D-955D-AA9888E3E5D5}"/>
+                <a16:creationId xmlns:a16="http://schemas.microsoft.com/office/drawing/2014/main" id="{7A05EF92-AEC3-4F9D-955D-AA9888E3E5D5}"/>
               </a:ext>
             </a:extLst>
           </p:cNvPr>
@@ -43268,7 +43070,7 @@
           <p:cNvPr id="8" name="CuadroTexto 5">
             <a:extLst>
               <a:ext uri="{FF2B5EF4-FFF2-40B4-BE49-F238E27FC236}">
-                <a16:creationId xmlns:a16="http://schemas.microsoft.com/office/drawing/2014/main" xmlns="" id="{7A05EF92-AEC3-4F9D-955D-AA9888E3E5D5}"/>
+                <a16:creationId xmlns:a16="http://schemas.microsoft.com/office/drawing/2014/main" id="{7A05EF92-AEC3-4F9D-955D-AA9888E3E5D5}"/>
               </a:ext>
             </a:extLst>
           </p:cNvPr>
@@ -43359,7 +43161,7 @@
           <p:cNvPr id="11" name="CuadroTexto 11">
             <a:extLst>
               <a:ext uri="{FF2B5EF4-FFF2-40B4-BE49-F238E27FC236}">
-                <a16:creationId xmlns:a16="http://schemas.microsoft.com/office/drawing/2014/main" xmlns="" id="{20840E76-3DE8-432F-A63B-48B5CBAD5272}"/>
+                <a16:creationId xmlns:a16="http://schemas.microsoft.com/office/drawing/2014/main" id="{20840E76-3DE8-432F-A63B-48B5CBAD5272}"/>
               </a:ext>
             </a:extLst>
           </p:cNvPr>
@@ -43430,7 +43232,7 @@
           <p:cNvPr id="18" name="CuadroTexto 11">
             <a:extLst>
               <a:ext uri="{FF2B5EF4-FFF2-40B4-BE49-F238E27FC236}">
-                <a16:creationId xmlns:a16="http://schemas.microsoft.com/office/drawing/2014/main" xmlns="" id="{20840E76-3DE8-432F-A63B-48B5CBAD5272}"/>
+                <a16:creationId xmlns:a16="http://schemas.microsoft.com/office/drawing/2014/main" id="{20840E76-3DE8-432F-A63B-48B5CBAD5272}"/>
               </a:ext>
             </a:extLst>
           </p:cNvPr>
@@ -43548,7 +43350,7 @@
           <p:nvPr/>
         </p:nvPicPr>
         <p:blipFill>
-          <a:blip r:embed="rId3">
+          <a:blip r:embed="rId4">
             <a:extLst>
               <a:ext uri="{28A0092B-C50C-407E-A947-70E740481C1C}">
                 <a14:useLocalDpi xmlns:a14="http://schemas.microsoft.com/office/drawing/2010/main" val="0"/>
@@ -43585,7 +43387,7 @@
           <p:cNvPr id="22" name="CuadroTexto 5">
             <a:extLst>
               <a:ext uri="{FF2B5EF4-FFF2-40B4-BE49-F238E27FC236}">
-                <a16:creationId xmlns:a16="http://schemas.microsoft.com/office/drawing/2014/main" xmlns="" id="{7A05EF92-AEC3-4F9D-955D-AA9888E3E5D5}"/>
+                <a16:creationId xmlns:a16="http://schemas.microsoft.com/office/drawing/2014/main" id="{7A05EF92-AEC3-4F9D-955D-AA9888E3E5D5}"/>
               </a:ext>
             </a:extLst>
           </p:cNvPr>
@@ -43652,6 +43454,9 @@
         </p:txBody>
       </p:sp>
     </p:spTree>
+    <p:custDataLst>
+      <p:tags r:id="rId1"/>
+    </p:custDataLst>
     <p:extLst>
       <p:ext uri="{BB962C8B-B14F-4D97-AF65-F5344CB8AC3E}">
         <p14:creationId xmlns:p14="http://schemas.microsoft.com/office/powerpoint/2010/main" val="1788210672"/>
@@ -43661,6 +43466,9 @@
   <p:clrMapOvr>
     <a:masterClrMapping/>
   </p:clrMapOvr>
+  <p:transition advTm="40122">
+    <p:fade thruBlk="1"/>
+  </p:transition>
   <p:timing>
     <p:tnLst>
       <p:par>
@@ -44526,7 +44334,7 @@
         </p:nvSpPr>
         <p:spPr>
           <a:xfrm>
-            <a:off x="853420" y="363591"/>
+            <a:off x="844455" y="390486"/>
             <a:ext cx="341535" cy="306577"/>
           </a:xfrm>
           <a:prstGeom prst="rect">
@@ -44553,7 +44361,7 @@
               <a:buNone/>
             </a:pPr>
             <a:r>
-              <a:rPr lang="es-ES" sz="2000" dirty="0">
+              <a:rPr lang="es-ES" sz="2400" dirty="0">
                 <a:solidFill>
                   <a:schemeClr val="dk1"/>
                 </a:solidFill>
@@ -44564,7 +44372,7 @@
               </a:rPr>
               <a:t>2</a:t>
             </a:r>
-            <a:endParaRPr sz="2000" dirty="0">
+            <a:endParaRPr sz="2400" dirty="0">
               <a:latin typeface="Lora"/>
               <a:ea typeface="Lora"/>
               <a:cs typeface="Lora"/>
@@ -44921,13 +44729,9 @@
   <p:clrMapOvr>
     <a:masterClrMapping/>
   </p:clrMapOvr>
-  <p:timing>
-    <p:tnLst>
-      <p:par>
-        <p:cTn id="1" dur="indefinite" restart="never" nodeType="tmRoot"/>
-      </p:par>
-    </p:tnLst>
-  </p:timing>
+  <p:transition advTm="40699">
+    <p:fade thruBlk="1"/>
+  </p:transition>
 </p:sld>
 </file>
 
@@ -45010,7 +44814,7 @@
         </p:nvSpPr>
         <p:spPr>
           <a:xfrm>
-            <a:off x="853420" y="373982"/>
+            <a:off x="844455" y="391912"/>
             <a:ext cx="341535" cy="306577"/>
           </a:xfrm>
           <a:prstGeom prst="rect">
@@ -45037,7 +44841,7 @@
               <a:buNone/>
             </a:pPr>
             <a:r>
-              <a:rPr lang="es-ES" sz="2000" dirty="0">
+              <a:rPr lang="es-ES" sz="2400" dirty="0">
                 <a:solidFill>
                   <a:schemeClr val="dk1"/>
                 </a:solidFill>
@@ -45048,7 +44852,7 @@
               </a:rPr>
               <a:t>3</a:t>
             </a:r>
-            <a:endParaRPr sz="2000" dirty="0">
+            <a:endParaRPr sz="2400" dirty="0">
               <a:latin typeface="Lora"/>
               <a:ea typeface="Lora"/>
               <a:cs typeface="Lora"/>
@@ -45066,7 +44870,7 @@
           <p:nvPr/>
         </p:nvPicPr>
         <p:blipFill>
-          <a:blip r:embed="rId2">
+          <a:blip r:embed="rId3">
             <a:extLst>
               <a:ext uri="{28A0092B-C50C-407E-A947-70E740481C1C}">
                 <a14:useLocalDpi xmlns:a14="http://schemas.microsoft.com/office/drawing/2010/main" val="0"/>
@@ -45096,7 +44900,7 @@
           <p:nvPr/>
         </p:nvPicPr>
         <p:blipFill>
-          <a:blip r:embed="rId3">
+          <a:blip r:embed="rId4">
             <a:extLst>
               <a:ext uri="{28A0092B-C50C-407E-A947-70E740481C1C}">
                 <a14:useLocalDpi xmlns:a14="http://schemas.microsoft.com/office/drawing/2010/main" val="0"/>
@@ -45122,7 +44926,7 @@
           <p:cNvPr id="9" name="CuadroTexto 5">
             <a:extLst>
               <a:ext uri="{FF2B5EF4-FFF2-40B4-BE49-F238E27FC236}">
-                <a16:creationId xmlns:a16="http://schemas.microsoft.com/office/drawing/2014/main" xmlns="" id="{7A05EF92-AEC3-4F9D-955D-AA9888E3E5D5}"/>
+                <a16:creationId xmlns:a16="http://schemas.microsoft.com/office/drawing/2014/main" id="{7A05EF92-AEC3-4F9D-955D-AA9888E3E5D5}"/>
               </a:ext>
             </a:extLst>
           </p:cNvPr>
@@ -45188,7 +44992,7 @@
           <p:cNvPr id="10" name="CuadroTexto 5">
             <a:extLst>
               <a:ext uri="{FF2B5EF4-FFF2-40B4-BE49-F238E27FC236}">
-                <a16:creationId xmlns:a16="http://schemas.microsoft.com/office/drawing/2014/main" xmlns="" id="{7A05EF92-AEC3-4F9D-955D-AA9888E3E5D5}"/>
+                <a16:creationId xmlns:a16="http://schemas.microsoft.com/office/drawing/2014/main" id="{7A05EF92-AEC3-4F9D-955D-AA9888E3E5D5}"/>
               </a:ext>
             </a:extLst>
           </p:cNvPr>
@@ -45254,7 +45058,7 @@
           <p:cNvPr id="11" name="Elipse 19">
             <a:extLst>
               <a:ext uri="{FF2B5EF4-FFF2-40B4-BE49-F238E27FC236}">
-                <a16:creationId xmlns:a16="http://schemas.microsoft.com/office/drawing/2014/main" xmlns="" id="{EEAF8E42-F797-4606-9A0E-73990ED570CB}"/>
+                <a16:creationId xmlns:a16="http://schemas.microsoft.com/office/drawing/2014/main" id="{EEAF8E42-F797-4606-9A0E-73990ED570CB}"/>
               </a:ext>
             </a:extLst>
           </p:cNvPr>
@@ -45308,7 +45112,7 @@
           <p:cNvPr id="12" name="Elipse 19">
             <a:extLst>
               <a:ext uri="{FF2B5EF4-FFF2-40B4-BE49-F238E27FC236}">
-                <a16:creationId xmlns:a16="http://schemas.microsoft.com/office/drawing/2014/main" xmlns="" id="{EEAF8E42-F797-4606-9A0E-73990ED570CB}"/>
+                <a16:creationId xmlns:a16="http://schemas.microsoft.com/office/drawing/2014/main" id="{EEAF8E42-F797-4606-9A0E-73990ED570CB}"/>
               </a:ext>
             </a:extLst>
           </p:cNvPr>
@@ -45362,7 +45166,7 @@
           <p:cNvPr id="13" name="Elipse 19">
             <a:extLst>
               <a:ext uri="{FF2B5EF4-FFF2-40B4-BE49-F238E27FC236}">
-                <a16:creationId xmlns:a16="http://schemas.microsoft.com/office/drawing/2014/main" xmlns="" id="{EEAF8E42-F797-4606-9A0E-73990ED570CB}"/>
+                <a16:creationId xmlns:a16="http://schemas.microsoft.com/office/drawing/2014/main" id="{EEAF8E42-F797-4606-9A0E-73990ED570CB}"/>
               </a:ext>
             </a:extLst>
           </p:cNvPr>
@@ -45416,7 +45220,7 @@
           <p:cNvPr id="14" name="Elipse 19">
             <a:extLst>
               <a:ext uri="{FF2B5EF4-FFF2-40B4-BE49-F238E27FC236}">
-                <a16:creationId xmlns:a16="http://schemas.microsoft.com/office/drawing/2014/main" xmlns="" id="{EEAF8E42-F797-4606-9A0E-73990ED570CB}"/>
+                <a16:creationId xmlns:a16="http://schemas.microsoft.com/office/drawing/2014/main" id="{EEAF8E42-F797-4606-9A0E-73990ED570CB}"/>
               </a:ext>
             </a:extLst>
           </p:cNvPr>
@@ -45470,7 +45274,7 @@
           <p:cNvPr id="16" name="Elipse 19">
             <a:extLst>
               <a:ext uri="{FF2B5EF4-FFF2-40B4-BE49-F238E27FC236}">
-                <a16:creationId xmlns:a16="http://schemas.microsoft.com/office/drawing/2014/main" xmlns="" id="{EEAF8E42-F797-4606-9A0E-73990ED570CB}"/>
+                <a16:creationId xmlns:a16="http://schemas.microsoft.com/office/drawing/2014/main" id="{EEAF8E42-F797-4606-9A0E-73990ED570CB}"/>
               </a:ext>
             </a:extLst>
           </p:cNvPr>
@@ -45520,6 +45324,9 @@
         </p:txBody>
       </p:sp>
     </p:spTree>
+    <p:custDataLst>
+      <p:tags r:id="rId1"/>
+    </p:custDataLst>
     <p:extLst>
       <p:ext uri="{BB962C8B-B14F-4D97-AF65-F5344CB8AC3E}">
         <p14:creationId xmlns:p14="http://schemas.microsoft.com/office/powerpoint/2010/main" val="263670159"/>
@@ -45529,6 +45336,9 @@
   <p:clrMapOvr>
     <a:masterClrMapping/>
   </p:clrMapOvr>
+  <p:transition advTm="49207">
+    <p:fade thruBlk="1"/>
+  </p:transition>
   <p:timing>
     <p:tnLst>
       <p:par>
@@ -46226,7 +46036,7 @@
           <p:cNvPr id="6" name="CuadroTexto 5">
             <a:extLst>
               <a:ext uri="{FF2B5EF4-FFF2-40B4-BE49-F238E27FC236}">
-                <a16:creationId xmlns:a16="http://schemas.microsoft.com/office/drawing/2014/main" xmlns="" id="{7A05EF92-AEC3-4F9D-955D-AA9888E3E5D5}"/>
+                <a16:creationId xmlns:a16="http://schemas.microsoft.com/office/drawing/2014/main" id="{7A05EF92-AEC3-4F9D-955D-AA9888E3E5D5}"/>
               </a:ext>
             </a:extLst>
           </p:cNvPr>
@@ -46272,7 +46082,7 @@
           <p:cNvPr id="7" name="CuadroTexto 5">
             <a:extLst>
               <a:ext uri="{FF2B5EF4-FFF2-40B4-BE49-F238E27FC236}">
-                <a16:creationId xmlns:a16="http://schemas.microsoft.com/office/drawing/2014/main" xmlns="" id="{7A05EF92-AEC3-4F9D-955D-AA9888E3E5D5}"/>
+                <a16:creationId xmlns:a16="http://schemas.microsoft.com/office/drawing/2014/main" id="{7A05EF92-AEC3-4F9D-955D-AA9888E3E5D5}"/>
               </a:ext>
             </a:extLst>
           </p:cNvPr>
@@ -46348,7 +46158,7 @@
           <p:cNvPr id="8" name="Google Shape;112;p15">
             <a:extLst>
               <a:ext uri="{FF2B5EF4-FFF2-40B4-BE49-F238E27FC236}">
-                <a16:creationId xmlns:a16="http://schemas.microsoft.com/office/drawing/2014/main" xmlns="" id="{06A01938-A855-492F-AC33-4AC9D0D96A9E}"/>
+                <a16:creationId xmlns:a16="http://schemas.microsoft.com/office/drawing/2014/main" id="{06A01938-A855-492F-AC33-4AC9D0D96A9E}"/>
               </a:ext>
             </a:extLst>
           </p:cNvPr>
@@ -46357,7 +46167,7 @@
         </p:nvSpPr>
         <p:spPr>
           <a:xfrm>
-            <a:off x="717176" y="309604"/>
+            <a:off x="717176" y="327534"/>
             <a:ext cx="591671" cy="435600"/>
           </a:xfrm>
           <a:prstGeom prst="rect">
@@ -46414,13 +46224,9 @@
   <p:clrMapOvr>
     <a:masterClrMapping/>
   </p:clrMapOvr>
-  <p:timing>
-    <p:tnLst>
-      <p:par>
-        <p:cTn id="1" dur="indefinite" restart="never" nodeType="tmRoot"/>
-      </p:par>
-    </p:tnLst>
-  </p:timing>
+  <p:transition advTm="33982">
+    <p:fade thruBlk="1"/>
+  </p:transition>
 </p:sld>
 </file>
 
@@ -46580,7 +46386,7 @@
           <p:cNvPr id="2" name="Diagrama 1">
             <a:extLst>
               <a:ext uri="{FF2B5EF4-FFF2-40B4-BE49-F238E27FC236}">
-                <a16:creationId xmlns:a16="http://schemas.microsoft.com/office/drawing/2014/main" xmlns="" id="{33E693B4-1F63-40D9-BBBC-98ACFCF27D34}"/>
+                <a16:creationId xmlns:a16="http://schemas.microsoft.com/office/drawing/2014/main" id="{33E693B4-1F63-40D9-BBBC-98ACFCF27D34}"/>
               </a:ext>
             </a:extLst>
           </p:cNvPr>
@@ -46593,7 +46399,7 @@
         </p:xfrm>
         <a:graphic>
           <a:graphicData uri="http://schemas.openxmlformats.org/drawingml/2006/diagram">
-            <dgm:relIds xmlns:dgm="http://schemas.openxmlformats.org/drawingml/2006/diagram" xmlns:r="http://schemas.openxmlformats.org/officeDocument/2006/relationships" r:dm="rId3" r:lo="rId4" r:qs="rId5" r:cs="rId6"/>
+            <dgm:relIds xmlns:dgm="http://schemas.openxmlformats.org/drawingml/2006/diagram" xmlns:r="http://schemas.openxmlformats.org/officeDocument/2006/relationships" r:dm="rId4" r:lo="rId5" r:qs="rId6" r:cs="rId7"/>
           </a:graphicData>
         </a:graphic>
       </p:graphicFrame>
@@ -46602,7 +46408,7 @@
           <p:cNvPr id="7" name="Google Shape;112;p15">
             <a:extLst>
               <a:ext uri="{FF2B5EF4-FFF2-40B4-BE49-F238E27FC236}">
-                <a16:creationId xmlns:a16="http://schemas.microsoft.com/office/drawing/2014/main" xmlns="" id="{4732C92D-2871-4E13-A6C8-4DCD5DC2259E}"/>
+                <a16:creationId xmlns:a16="http://schemas.microsoft.com/office/drawing/2014/main" id="{4732C92D-2871-4E13-A6C8-4DCD5DC2259E}"/>
               </a:ext>
             </a:extLst>
           </p:cNvPr>
@@ -46663,7 +46469,7 @@
           <p:cNvPr id="6" name="CuadroTexto 5">
             <a:extLst>
               <a:ext uri="{FF2B5EF4-FFF2-40B4-BE49-F238E27FC236}">
-                <a16:creationId xmlns:a16="http://schemas.microsoft.com/office/drawing/2014/main" xmlns="" id="{D007768A-98EF-49CF-BBCD-FF7BCFF3BA37}"/>
+                <a16:creationId xmlns:a16="http://schemas.microsoft.com/office/drawing/2014/main" id="{D007768A-98EF-49CF-BBCD-FF7BCFF3BA37}"/>
               </a:ext>
             </a:extLst>
           </p:cNvPr>
@@ -46905,7 +46711,7 @@
           <p:cNvPr id="8" name="Rectángulo 7">
             <a:extLst>
               <a:ext uri="{FF2B5EF4-FFF2-40B4-BE49-F238E27FC236}">
-                <a16:creationId xmlns:a16="http://schemas.microsoft.com/office/drawing/2014/main" xmlns="" id="{1DD38BA3-103B-4444-8387-62E56DE381C8}"/>
+                <a16:creationId xmlns:a16="http://schemas.microsoft.com/office/drawing/2014/main" id="{1DD38BA3-103B-4444-8387-62E56DE381C8}"/>
               </a:ext>
             </a:extLst>
           </p:cNvPr>
@@ -46959,7 +46765,7 @@
           <p:cNvPr id="9" name="Rectángulo 8">
             <a:extLst>
               <a:ext uri="{FF2B5EF4-FFF2-40B4-BE49-F238E27FC236}">
-                <a16:creationId xmlns:a16="http://schemas.microsoft.com/office/drawing/2014/main" xmlns="" id="{B96E9EFB-9646-4189-BF6D-D2930F099054}"/>
+                <a16:creationId xmlns:a16="http://schemas.microsoft.com/office/drawing/2014/main" id="{B96E9EFB-9646-4189-BF6D-D2930F099054}"/>
               </a:ext>
             </a:extLst>
           </p:cNvPr>
@@ -47013,7 +46819,7 @@
           <p:cNvPr id="14" name="Rectángulo 13">
             <a:extLst>
               <a:ext uri="{FF2B5EF4-FFF2-40B4-BE49-F238E27FC236}">
-                <a16:creationId xmlns:a16="http://schemas.microsoft.com/office/drawing/2014/main" xmlns="" id="{10E7F003-6436-4E73-98B4-C207256D5C8F}"/>
+                <a16:creationId xmlns:a16="http://schemas.microsoft.com/office/drawing/2014/main" id="{10E7F003-6436-4E73-98B4-C207256D5C8F}"/>
               </a:ext>
             </a:extLst>
           </p:cNvPr>
@@ -47067,7 +46873,7 @@
           <p:cNvPr id="15" name="Rectángulo 14">
             <a:extLst>
               <a:ext uri="{FF2B5EF4-FFF2-40B4-BE49-F238E27FC236}">
-                <a16:creationId xmlns:a16="http://schemas.microsoft.com/office/drawing/2014/main" xmlns="" id="{805EA854-1D24-4416-AA2D-7F53A0511751}"/>
+                <a16:creationId xmlns:a16="http://schemas.microsoft.com/office/drawing/2014/main" id="{805EA854-1D24-4416-AA2D-7F53A0511751}"/>
               </a:ext>
             </a:extLst>
           </p:cNvPr>
@@ -47117,6 +46923,9 @@
         </p:txBody>
       </p:sp>
     </p:spTree>
+    <p:custDataLst>
+      <p:tags r:id="rId1"/>
+    </p:custDataLst>
     <p:extLst>
       <p:ext uri="{BB962C8B-B14F-4D97-AF65-F5344CB8AC3E}">
         <p14:creationId xmlns:p14="http://schemas.microsoft.com/office/powerpoint/2010/main" val="845222504"/>
@@ -47126,6 +46935,9 @@
   <p:clrMapOvr>
     <a:masterClrMapping/>
   </p:clrMapOvr>
+  <p:transition advTm="16821">
+    <p:fade thruBlk="1"/>
+  </p:transition>
   <p:timing>
     <p:tnLst>
       <p:par>
@@ -47702,7 +47514,7 @@
           <p:cNvPr id="2" name="Título 1">
             <a:extLst>
               <a:ext uri="{FF2B5EF4-FFF2-40B4-BE49-F238E27FC236}">
-                <a16:creationId xmlns:a16="http://schemas.microsoft.com/office/drawing/2014/main" xmlns="" id="{75681E77-92C5-4AD9-AD48-31DC62B85AB2}"/>
+                <a16:creationId xmlns:a16="http://schemas.microsoft.com/office/drawing/2014/main" id="{75681E77-92C5-4AD9-AD48-31DC62B85AB2}"/>
               </a:ext>
             </a:extLst>
           </p:cNvPr>
@@ -47730,7 +47542,7 @@
           <p:cNvPr id="5" name="Marcador de número de diapositiva 4">
             <a:extLst>
               <a:ext uri="{FF2B5EF4-FFF2-40B4-BE49-F238E27FC236}">
-                <a16:creationId xmlns:a16="http://schemas.microsoft.com/office/drawing/2014/main" xmlns="" id="{941208BD-DF9B-4E66-9368-74C9E20E2CF1}"/>
+                <a16:creationId xmlns:a16="http://schemas.microsoft.com/office/drawing/2014/main" id="{941208BD-DF9B-4E66-9368-74C9E20E2CF1}"/>
               </a:ext>
             </a:extLst>
           </p:cNvPr>
@@ -47768,7 +47580,7 @@
           <p:cNvPr id="10" name="Grupo 9">
             <a:extLst>
               <a:ext uri="{FF2B5EF4-FFF2-40B4-BE49-F238E27FC236}">
-                <a16:creationId xmlns:a16="http://schemas.microsoft.com/office/drawing/2014/main" xmlns="" id="{95E60C3B-FF23-426C-90DC-60791A37057A}"/>
+                <a16:creationId xmlns:a16="http://schemas.microsoft.com/office/drawing/2014/main" id="{95E60C3B-FF23-426C-90DC-60791A37057A}"/>
               </a:ext>
             </a:extLst>
           </p:cNvPr>
@@ -47788,7 +47600,7 @@
             <p:cNvPr id="11" name="Imagen 10">
               <a:extLst>
                 <a:ext uri="{FF2B5EF4-FFF2-40B4-BE49-F238E27FC236}">
-                  <a16:creationId xmlns:a16="http://schemas.microsoft.com/office/drawing/2014/main" xmlns="" id="{55BD3E3A-863D-4C12-B906-2A711BBC812A}"/>
+                  <a16:creationId xmlns:a16="http://schemas.microsoft.com/office/drawing/2014/main" id="{55BD3E3A-863D-4C12-B906-2A711BBC812A}"/>
                 </a:ext>
               </a:extLst>
             </p:cNvPr>
@@ -47829,7 +47641,7 @@
             <p:cNvPr id="12" name="Conector recto de flecha 11">
               <a:extLst>
                 <a:ext uri="{FF2B5EF4-FFF2-40B4-BE49-F238E27FC236}">
-                  <a16:creationId xmlns:a16="http://schemas.microsoft.com/office/drawing/2014/main" xmlns="" id="{A3487EDA-1A56-494E-B6DF-07D963B5143A}"/>
+                  <a16:creationId xmlns:a16="http://schemas.microsoft.com/office/drawing/2014/main" id="{A3487EDA-1A56-494E-B6DF-07D963B5143A}"/>
                 </a:ext>
               </a:extLst>
             </p:cNvPr>
@@ -47871,7 +47683,7 @@
             <p:cNvPr id="13" name="Conector recto de flecha 12">
               <a:extLst>
                 <a:ext uri="{FF2B5EF4-FFF2-40B4-BE49-F238E27FC236}">
-                  <a16:creationId xmlns:a16="http://schemas.microsoft.com/office/drawing/2014/main" xmlns="" id="{51B2F211-CE33-405A-B46F-F7664BC2C50C}"/>
+                  <a16:creationId xmlns:a16="http://schemas.microsoft.com/office/drawing/2014/main" id="{51B2F211-CE33-405A-B46F-F7664BC2C50C}"/>
                 </a:ext>
               </a:extLst>
             </p:cNvPr>
@@ -47913,7 +47725,7 @@
             <p:cNvPr id="14" name="Conector recto de flecha 13">
               <a:extLst>
                 <a:ext uri="{FF2B5EF4-FFF2-40B4-BE49-F238E27FC236}">
-                  <a16:creationId xmlns:a16="http://schemas.microsoft.com/office/drawing/2014/main" xmlns="" id="{8FC73BD1-BE9D-4CA7-94BB-6B1C0C2F4147}"/>
+                  <a16:creationId xmlns:a16="http://schemas.microsoft.com/office/drawing/2014/main" id="{8FC73BD1-BE9D-4CA7-94BB-6B1C0C2F4147}"/>
                 </a:ext>
               </a:extLst>
             </p:cNvPr>
@@ -47956,7 +47768,7 @@
           <p:cNvPr id="15" name="Grupo 14">
             <a:extLst>
               <a:ext uri="{FF2B5EF4-FFF2-40B4-BE49-F238E27FC236}">
-                <a16:creationId xmlns:a16="http://schemas.microsoft.com/office/drawing/2014/main" xmlns="" id="{D818BFED-2153-4FA8-8059-75A5A38D8D76}"/>
+                <a16:creationId xmlns:a16="http://schemas.microsoft.com/office/drawing/2014/main" id="{D818BFED-2153-4FA8-8059-75A5A38D8D76}"/>
               </a:ext>
             </a:extLst>
           </p:cNvPr>
@@ -47976,7 +47788,7 @@
             <p:cNvPr id="16" name="Imagen 15">
               <a:extLst>
                 <a:ext uri="{FF2B5EF4-FFF2-40B4-BE49-F238E27FC236}">
-                  <a16:creationId xmlns:a16="http://schemas.microsoft.com/office/drawing/2014/main" xmlns="" id="{90DAA2F8-8C45-4C18-959B-BFB152D14237}"/>
+                  <a16:creationId xmlns:a16="http://schemas.microsoft.com/office/drawing/2014/main" id="{90DAA2F8-8C45-4C18-959B-BFB152D14237}"/>
                 </a:ext>
               </a:extLst>
             </p:cNvPr>
@@ -48017,7 +47829,7 @@
             <p:cNvPr id="17" name="Conector recto de flecha 16">
               <a:extLst>
                 <a:ext uri="{FF2B5EF4-FFF2-40B4-BE49-F238E27FC236}">
-                  <a16:creationId xmlns:a16="http://schemas.microsoft.com/office/drawing/2014/main" xmlns="" id="{5C43D222-31D6-40C2-90C8-78598DB9DFF6}"/>
+                  <a16:creationId xmlns:a16="http://schemas.microsoft.com/office/drawing/2014/main" id="{5C43D222-31D6-40C2-90C8-78598DB9DFF6}"/>
                 </a:ext>
               </a:extLst>
             </p:cNvPr>
@@ -48059,7 +47871,7 @@
             <p:cNvPr id="18" name="Conector recto de flecha 17">
               <a:extLst>
                 <a:ext uri="{FF2B5EF4-FFF2-40B4-BE49-F238E27FC236}">
-                  <a16:creationId xmlns:a16="http://schemas.microsoft.com/office/drawing/2014/main" xmlns="" id="{2C585DD7-7002-40E5-B98F-8DBF32118D86}"/>
+                  <a16:creationId xmlns:a16="http://schemas.microsoft.com/office/drawing/2014/main" id="{2C585DD7-7002-40E5-B98F-8DBF32118D86}"/>
                 </a:ext>
               </a:extLst>
             </p:cNvPr>
@@ -48102,7 +47914,7 @@
           <p:cNvPr id="19" name="Google Shape;93;p13">
             <a:extLst>
               <a:ext uri="{FF2B5EF4-FFF2-40B4-BE49-F238E27FC236}">
-                <a16:creationId xmlns:a16="http://schemas.microsoft.com/office/drawing/2014/main" xmlns="" id="{DCAAB932-0E5B-4579-A70F-D346E6CB873F}"/>
+                <a16:creationId xmlns:a16="http://schemas.microsoft.com/office/drawing/2014/main" id="{DCAAB932-0E5B-4579-A70F-D346E6CB873F}"/>
               </a:ext>
             </a:extLst>
           </p:cNvPr>
@@ -48219,7 +48031,7 @@
           <p:cNvPr id="20" name="Google Shape;112;p15">
             <a:extLst>
               <a:ext uri="{FF2B5EF4-FFF2-40B4-BE49-F238E27FC236}">
-                <a16:creationId xmlns:a16="http://schemas.microsoft.com/office/drawing/2014/main" xmlns="" id="{186EC496-CAE5-420D-9365-6EE262114F8E}"/>
+                <a16:creationId xmlns:a16="http://schemas.microsoft.com/office/drawing/2014/main" id="{186EC496-CAE5-420D-9365-6EE262114F8E}"/>
               </a:ext>
             </a:extLst>
           </p:cNvPr>
@@ -48280,7 +48092,7 @@
           <p:cNvPr id="3" name="CuadroTexto 2">
             <a:extLst>
               <a:ext uri="{FF2B5EF4-FFF2-40B4-BE49-F238E27FC236}">
-                <a16:creationId xmlns:a16="http://schemas.microsoft.com/office/drawing/2014/main" xmlns="" id="{2B582307-1B76-43A3-AFE0-8D921C5C4B2E}"/>
+                <a16:creationId xmlns:a16="http://schemas.microsoft.com/office/drawing/2014/main" id="{2B582307-1B76-43A3-AFE0-8D921C5C4B2E}"/>
               </a:ext>
             </a:extLst>
           </p:cNvPr>
@@ -48318,7 +48130,7 @@
           <p:cNvPr id="21" name="CuadroTexto 20">
             <a:extLst>
               <a:ext uri="{FF2B5EF4-FFF2-40B4-BE49-F238E27FC236}">
-                <a16:creationId xmlns:a16="http://schemas.microsoft.com/office/drawing/2014/main" xmlns="" id="{3FA6C5EF-636C-4DF5-A3BD-890309DC99AC}"/>
+                <a16:creationId xmlns:a16="http://schemas.microsoft.com/office/drawing/2014/main" id="{3FA6C5EF-636C-4DF5-A3BD-890309DC99AC}"/>
               </a:ext>
             </a:extLst>
           </p:cNvPr>
@@ -48378,7 +48190,7 @@
           <p:cNvPr id="22" name="CuadroTexto 21">
             <a:extLst>
               <a:ext uri="{FF2B5EF4-FFF2-40B4-BE49-F238E27FC236}">
-                <a16:creationId xmlns:a16="http://schemas.microsoft.com/office/drawing/2014/main" xmlns="" id="{2CF54A0D-6C6F-43AF-8113-B904B1FFA646}"/>
+                <a16:creationId xmlns:a16="http://schemas.microsoft.com/office/drawing/2014/main" id="{2CF54A0D-6C6F-43AF-8113-B904B1FFA646}"/>
               </a:ext>
             </a:extLst>
           </p:cNvPr>
@@ -48438,7 +48250,7 @@
           <p:cNvPr id="23" name="CuadroTexto 22">
             <a:extLst>
               <a:ext uri="{FF2B5EF4-FFF2-40B4-BE49-F238E27FC236}">
-                <a16:creationId xmlns:a16="http://schemas.microsoft.com/office/drawing/2014/main" xmlns="" id="{033143FD-9A7F-40DC-8487-523192308594}"/>
+                <a16:creationId xmlns:a16="http://schemas.microsoft.com/office/drawing/2014/main" id="{033143FD-9A7F-40DC-8487-523192308594}"/>
               </a:ext>
             </a:extLst>
           </p:cNvPr>
@@ -48498,7 +48310,7 @@
           <p:cNvPr id="24" name="CuadroTexto 23">
             <a:extLst>
               <a:ext uri="{FF2B5EF4-FFF2-40B4-BE49-F238E27FC236}">
-                <a16:creationId xmlns:a16="http://schemas.microsoft.com/office/drawing/2014/main" xmlns="" id="{55D7A72C-44DA-49E4-AA0D-05F3D3131776}"/>
+                <a16:creationId xmlns:a16="http://schemas.microsoft.com/office/drawing/2014/main" id="{55D7A72C-44DA-49E4-AA0D-05F3D3131776}"/>
               </a:ext>
             </a:extLst>
           </p:cNvPr>
@@ -48558,7 +48370,7 @@
           <p:cNvPr id="25" name="CuadroTexto 24">
             <a:extLst>
               <a:ext uri="{FF2B5EF4-FFF2-40B4-BE49-F238E27FC236}">
-                <a16:creationId xmlns:a16="http://schemas.microsoft.com/office/drawing/2014/main" xmlns="" id="{E8E09D92-C15D-4CD2-8330-3945191D9225}"/>
+                <a16:creationId xmlns:a16="http://schemas.microsoft.com/office/drawing/2014/main" id="{E8E09D92-C15D-4CD2-8330-3945191D9225}"/>
               </a:ext>
             </a:extLst>
           </p:cNvPr>
@@ -48596,7 +48408,7 @@
           <p:cNvPr id="6" name="Conector recto de flecha 5">
             <a:extLst>
               <a:ext uri="{FF2B5EF4-FFF2-40B4-BE49-F238E27FC236}">
-                <a16:creationId xmlns:a16="http://schemas.microsoft.com/office/drawing/2014/main" xmlns="" id="{9D88EECC-7E78-45EB-B41C-DF0DC1F89A93}"/>
+                <a16:creationId xmlns:a16="http://schemas.microsoft.com/office/drawing/2014/main" id="{9D88EECC-7E78-45EB-B41C-DF0DC1F89A93}"/>
               </a:ext>
             </a:extLst>
           </p:cNvPr>
@@ -48640,7 +48452,7 @@
           <p:cNvPr id="26" name="Conector recto de flecha 25">
             <a:extLst>
               <a:ext uri="{FF2B5EF4-FFF2-40B4-BE49-F238E27FC236}">
-                <a16:creationId xmlns:a16="http://schemas.microsoft.com/office/drawing/2014/main" xmlns="" id="{633981AA-C7F5-427A-AA83-6A8B0FEAEBDF}"/>
+                <a16:creationId xmlns:a16="http://schemas.microsoft.com/office/drawing/2014/main" id="{633981AA-C7F5-427A-AA83-6A8B0FEAEBDF}"/>
               </a:ext>
             </a:extLst>
           </p:cNvPr>
@@ -48685,7 +48497,7 @@
           <p:cNvPr id="30" name="Conector recto de flecha 29">
             <a:extLst>
               <a:ext uri="{FF2B5EF4-FFF2-40B4-BE49-F238E27FC236}">
-                <a16:creationId xmlns:a16="http://schemas.microsoft.com/office/drawing/2014/main" xmlns="" id="{12B0FEA7-1D81-4356-AEE2-5BDFBAA4DA19}"/>
+                <a16:creationId xmlns:a16="http://schemas.microsoft.com/office/drawing/2014/main" id="{12B0FEA7-1D81-4356-AEE2-5BDFBAA4DA19}"/>
               </a:ext>
             </a:extLst>
           </p:cNvPr>
@@ -48729,7 +48541,7 @@
           <p:cNvPr id="32" name="Conector recto de flecha 31">
             <a:extLst>
               <a:ext uri="{FF2B5EF4-FFF2-40B4-BE49-F238E27FC236}">
-                <a16:creationId xmlns:a16="http://schemas.microsoft.com/office/drawing/2014/main" xmlns="" id="{9A629AF6-7C3D-48CB-843E-76CE45A5A7F9}"/>
+                <a16:creationId xmlns:a16="http://schemas.microsoft.com/office/drawing/2014/main" id="{9A629AF6-7C3D-48CB-843E-76CE45A5A7F9}"/>
               </a:ext>
             </a:extLst>
           </p:cNvPr>
@@ -48778,13 +48590,9 @@
   <p:clrMapOvr>
     <a:masterClrMapping/>
   </p:clrMapOvr>
-  <p:timing>
-    <p:tnLst>
-      <p:par>
-        <p:cTn id="1" dur="indefinite" restart="never" nodeType="tmRoot"/>
-      </p:par>
-    </p:tnLst>
-  </p:timing>
+  <p:transition advTm="12179">
+    <p:fade thruBlk="1"/>
+  </p:transition>
 </p:sld>
 </file>
 
@@ -48810,7 +48618,7 @@
           <p:cNvPr id="2" name="Marcador de número de diapositiva 1">
             <a:extLst>
               <a:ext uri="{FF2B5EF4-FFF2-40B4-BE49-F238E27FC236}">
-                <a16:creationId xmlns:a16="http://schemas.microsoft.com/office/drawing/2014/main" xmlns="" id="{1B812DD0-1E67-44AA-B8C3-14A08CDAE86A}"/>
+                <a16:creationId xmlns:a16="http://schemas.microsoft.com/office/drawing/2014/main" id="{1B812DD0-1E67-44AA-B8C3-14A08CDAE86A}"/>
               </a:ext>
             </a:extLst>
           </p:cNvPr>
@@ -48848,7 +48656,7 @@
           <p:cNvPr id="3" name="Grupo 2">
             <a:extLst>
               <a:ext uri="{FF2B5EF4-FFF2-40B4-BE49-F238E27FC236}">
-                <a16:creationId xmlns:a16="http://schemas.microsoft.com/office/drawing/2014/main" xmlns="" id="{ECFF9C62-6E06-4B19-84D3-DCD66C577B90}"/>
+                <a16:creationId xmlns:a16="http://schemas.microsoft.com/office/drawing/2014/main" id="{ECFF9C62-6E06-4B19-84D3-DCD66C577B90}"/>
               </a:ext>
             </a:extLst>
           </p:cNvPr>
@@ -48868,7 +48676,7 @@
             <p:cNvPr id="4" name="Imagen 3">
               <a:extLst>
                 <a:ext uri="{FF2B5EF4-FFF2-40B4-BE49-F238E27FC236}">
-                  <a16:creationId xmlns:a16="http://schemas.microsoft.com/office/drawing/2014/main" xmlns="" id="{7AD7B37B-49BA-4045-A098-FE738B6E0663}"/>
+                  <a16:creationId xmlns:a16="http://schemas.microsoft.com/office/drawing/2014/main" id="{7AD7B37B-49BA-4045-A098-FE738B6E0663}"/>
                 </a:ext>
               </a:extLst>
             </p:cNvPr>
@@ -48878,7 +48686,7 @@
             <p:nvPr/>
           </p:nvPicPr>
           <p:blipFill>
-            <a:blip r:embed="rId2">
+            <a:blip r:embed="rId3">
               <a:extLst>
                 <a:ext uri="{28A0092B-C50C-407E-A947-70E740481C1C}">
                   <a14:useLocalDpi xmlns:a14="http://schemas.microsoft.com/office/drawing/2010/main" val="0"/>
@@ -48909,7 +48717,7 @@
             <p:cNvPr id="5" name="Conector recto de flecha 4">
               <a:extLst>
                 <a:ext uri="{FF2B5EF4-FFF2-40B4-BE49-F238E27FC236}">
-                  <a16:creationId xmlns:a16="http://schemas.microsoft.com/office/drawing/2014/main" xmlns="" id="{A19F3F65-C2BE-4131-965D-D0B065261E0B}"/>
+                  <a16:creationId xmlns:a16="http://schemas.microsoft.com/office/drawing/2014/main" id="{A19F3F65-C2BE-4131-965D-D0B065261E0B}"/>
                 </a:ext>
               </a:extLst>
             </p:cNvPr>
@@ -48951,7 +48759,7 @@
             <p:cNvPr id="6" name="Conector recto de flecha 5">
               <a:extLst>
                 <a:ext uri="{FF2B5EF4-FFF2-40B4-BE49-F238E27FC236}">
-                  <a16:creationId xmlns:a16="http://schemas.microsoft.com/office/drawing/2014/main" xmlns="" id="{7B8253FF-33FB-47C8-ABB7-4BD6B0F6B76A}"/>
+                  <a16:creationId xmlns:a16="http://schemas.microsoft.com/office/drawing/2014/main" id="{7B8253FF-33FB-47C8-ABB7-4BD6B0F6B76A}"/>
                 </a:ext>
               </a:extLst>
             </p:cNvPr>
@@ -48993,7 +48801,7 @@
             <p:cNvPr id="7" name="Conector recto de flecha 6">
               <a:extLst>
                 <a:ext uri="{FF2B5EF4-FFF2-40B4-BE49-F238E27FC236}">
-                  <a16:creationId xmlns:a16="http://schemas.microsoft.com/office/drawing/2014/main" xmlns="" id="{4D272C4B-8EC6-4870-BA99-69C10D3E5D34}"/>
+                  <a16:creationId xmlns:a16="http://schemas.microsoft.com/office/drawing/2014/main" id="{4D272C4B-8EC6-4870-BA99-69C10D3E5D34}"/>
                 </a:ext>
               </a:extLst>
             </p:cNvPr>
@@ -49036,7 +48844,7 @@
           <p:cNvPr id="8" name="Grupo 7">
             <a:extLst>
               <a:ext uri="{FF2B5EF4-FFF2-40B4-BE49-F238E27FC236}">
-                <a16:creationId xmlns:a16="http://schemas.microsoft.com/office/drawing/2014/main" xmlns="" id="{94DC42A7-D2F8-4C17-A508-AB0EC21BEE0E}"/>
+                <a16:creationId xmlns:a16="http://schemas.microsoft.com/office/drawing/2014/main" id="{94DC42A7-D2F8-4C17-A508-AB0EC21BEE0E}"/>
               </a:ext>
             </a:extLst>
           </p:cNvPr>
@@ -49056,7 +48864,7 @@
             <p:cNvPr id="9" name="Imagen 8">
               <a:extLst>
                 <a:ext uri="{FF2B5EF4-FFF2-40B4-BE49-F238E27FC236}">
-                  <a16:creationId xmlns:a16="http://schemas.microsoft.com/office/drawing/2014/main" xmlns="" id="{B7DFC1E2-9F42-4678-AE69-5E33956C0A39}"/>
+                  <a16:creationId xmlns:a16="http://schemas.microsoft.com/office/drawing/2014/main" id="{B7DFC1E2-9F42-4678-AE69-5E33956C0A39}"/>
                 </a:ext>
               </a:extLst>
             </p:cNvPr>
@@ -49066,7 +48874,7 @@
             <p:nvPr/>
           </p:nvPicPr>
           <p:blipFill>
-            <a:blip r:embed="rId3">
+            <a:blip r:embed="rId4">
               <a:extLst>
                 <a:ext uri="{28A0092B-C50C-407E-A947-70E740481C1C}">
                   <a14:useLocalDpi xmlns:a14="http://schemas.microsoft.com/office/drawing/2010/main" val="0"/>
@@ -49097,7 +48905,7 @@
             <p:cNvPr id="10" name="Conector recto de flecha 9">
               <a:extLst>
                 <a:ext uri="{FF2B5EF4-FFF2-40B4-BE49-F238E27FC236}">
-                  <a16:creationId xmlns:a16="http://schemas.microsoft.com/office/drawing/2014/main" xmlns="" id="{FE5A8A33-9D84-41B6-94E0-819CD37B50E2}"/>
+                  <a16:creationId xmlns:a16="http://schemas.microsoft.com/office/drawing/2014/main" id="{FE5A8A33-9D84-41B6-94E0-819CD37B50E2}"/>
                 </a:ext>
               </a:extLst>
             </p:cNvPr>
@@ -49139,7 +48947,7 @@
             <p:cNvPr id="11" name="Conector recto de flecha 10">
               <a:extLst>
                 <a:ext uri="{FF2B5EF4-FFF2-40B4-BE49-F238E27FC236}">
-                  <a16:creationId xmlns:a16="http://schemas.microsoft.com/office/drawing/2014/main" xmlns="" id="{1D69FA28-131E-478A-84F4-6C4E244F33A1}"/>
+                  <a16:creationId xmlns:a16="http://schemas.microsoft.com/office/drawing/2014/main" id="{1D69FA28-131E-478A-84F4-6C4E244F33A1}"/>
                 </a:ext>
               </a:extLst>
             </p:cNvPr>
@@ -49182,7 +48990,7 @@
           <p:cNvPr id="12" name="Rectángulo 11">
             <a:extLst>
               <a:ext uri="{FF2B5EF4-FFF2-40B4-BE49-F238E27FC236}">
-                <a16:creationId xmlns:a16="http://schemas.microsoft.com/office/drawing/2014/main" xmlns="" id="{F182BC27-4E7B-4E9F-A67B-FF616FB561A3}"/>
+                <a16:creationId xmlns:a16="http://schemas.microsoft.com/office/drawing/2014/main" id="{F182BC27-4E7B-4E9F-A67B-FF616FB561A3}"/>
               </a:ext>
             </a:extLst>
           </p:cNvPr>
@@ -49234,7 +49042,7 @@
           <p:cNvPr id="13" name="Google Shape;323;p30">
             <a:extLst>
               <a:ext uri="{FF2B5EF4-FFF2-40B4-BE49-F238E27FC236}">
-                <a16:creationId xmlns:a16="http://schemas.microsoft.com/office/drawing/2014/main" xmlns="" id="{3BC63B04-FEF3-401C-B554-DA5FFA3A5B1B}"/>
+                <a16:creationId xmlns:a16="http://schemas.microsoft.com/office/drawing/2014/main" id="{3BC63B04-FEF3-401C-B554-DA5FFA3A5B1B}"/>
               </a:ext>
             </a:extLst>
           </p:cNvPr>
@@ -49644,7 +49452,7 @@
           <p:cNvPr id="14" name="Google Shape;323;p30">
             <a:extLst>
               <a:ext uri="{FF2B5EF4-FFF2-40B4-BE49-F238E27FC236}">
-                <a16:creationId xmlns:a16="http://schemas.microsoft.com/office/drawing/2014/main" xmlns="" id="{3E71A46A-54E7-4476-A8EC-E9D49626AC5E}"/>
+                <a16:creationId xmlns:a16="http://schemas.microsoft.com/office/drawing/2014/main" id="{3E71A46A-54E7-4476-A8EC-E9D49626AC5E}"/>
               </a:ext>
             </a:extLst>
           </p:cNvPr>
@@ -49922,7 +49730,7 @@
           <p:cNvPr id="15" name="Elipse 14">
             <a:extLst>
               <a:ext uri="{FF2B5EF4-FFF2-40B4-BE49-F238E27FC236}">
-                <a16:creationId xmlns:a16="http://schemas.microsoft.com/office/drawing/2014/main" xmlns="" id="{2C804EC6-3949-4673-A9B9-765FB1E3BB19}"/>
+                <a16:creationId xmlns:a16="http://schemas.microsoft.com/office/drawing/2014/main" id="{2C804EC6-3949-4673-A9B9-765FB1E3BB19}"/>
               </a:ext>
             </a:extLst>
           </p:cNvPr>
@@ -49976,7 +49784,7 @@
           <p:cNvPr id="16" name="Elipse 15">
             <a:extLst>
               <a:ext uri="{FF2B5EF4-FFF2-40B4-BE49-F238E27FC236}">
-                <a16:creationId xmlns:a16="http://schemas.microsoft.com/office/drawing/2014/main" xmlns="" id="{4B53D6D6-110F-4051-8C8A-209C9ABEA04D}"/>
+                <a16:creationId xmlns:a16="http://schemas.microsoft.com/office/drawing/2014/main" id="{4B53D6D6-110F-4051-8C8A-209C9ABEA04D}"/>
               </a:ext>
             </a:extLst>
           </p:cNvPr>
@@ -50030,7 +49838,7 @@
           <p:cNvPr id="17" name="Elipse 16">
             <a:extLst>
               <a:ext uri="{FF2B5EF4-FFF2-40B4-BE49-F238E27FC236}">
-                <a16:creationId xmlns:a16="http://schemas.microsoft.com/office/drawing/2014/main" xmlns="" id="{7EF4C29E-421E-429B-9CD2-EB14C1F0819A}"/>
+                <a16:creationId xmlns:a16="http://schemas.microsoft.com/office/drawing/2014/main" id="{7EF4C29E-421E-429B-9CD2-EB14C1F0819A}"/>
               </a:ext>
             </a:extLst>
           </p:cNvPr>
@@ -50084,7 +49892,7 @@
           <p:cNvPr id="18" name="Elipse 17">
             <a:extLst>
               <a:ext uri="{FF2B5EF4-FFF2-40B4-BE49-F238E27FC236}">
-                <a16:creationId xmlns:a16="http://schemas.microsoft.com/office/drawing/2014/main" xmlns="" id="{B6588CF5-0930-45D3-99D2-E22D8D4024C2}"/>
+                <a16:creationId xmlns:a16="http://schemas.microsoft.com/office/drawing/2014/main" id="{B6588CF5-0930-45D3-99D2-E22D8D4024C2}"/>
               </a:ext>
             </a:extLst>
           </p:cNvPr>
@@ -50138,7 +49946,7 @@
           <p:cNvPr id="19" name="Elipse 18">
             <a:extLst>
               <a:ext uri="{FF2B5EF4-FFF2-40B4-BE49-F238E27FC236}">
-                <a16:creationId xmlns:a16="http://schemas.microsoft.com/office/drawing/2014/main" xmlns="" id="{D34FDBE5-1D86-4C0D-8E2D-134D13DA5548}"/>
+                <a16:creationId xmlns:a16="http://schemas.microsoft.com/office/drawing/2014/main" id="{D34FDBE5-1D86-4C0D-8E2D-134D13DA5548}"/>
               </a:ext>
             </a:extLst>
           </p:cNvPr>
@@ -50192,7 +50000,7 @@
           <p:cNvPr id="20" name="Elipse 19">
             <a:extLst>
               <a:ext uri="{FF2B5EF4-FFF2-40B4-BE49-F238E27FC236}">
-                <a16:creationId xmlns:a16="http://schemas.microsoft.com/office/drawing/2014/main" xmlns="" id="{EEAF8E42-F797-4606-9A0E-73990ED570CB}"/>
+                <a16:creationId xmlns:a16="http://schemas.microsoft.com/office/drawing/2014/main" id="{EEAF8E42-F797-4606-9A0E-73990ED570CB}"/>
               </a:ext>
             </a:extLst>
           </p:cNvPr>
@@ -50246,7 +50054,7 @@
           <p:cNvPr id="21" name="Elipse 20">
             <a:extLst>
               <a:ext uri="{FF2B5EF4-FFF2-40B4-BE49-F238E27FC236}">
-                <a16:creationId xmlns:a16="http://schemas.microsoft.com/office/drawing/2014/main" xmlns="" id="{549E74F6-ADA0-49A4-9BEE-44026C8820FB}"/>
+                <a16:creationId xmlns:a16="http://schemas.microsoft.com/office/drawing/2014/main" id="{549E74F6-ADA0-49A4-9BEE-44026C8820FB}"/>
               </a:ext>
             </a:extLst>
           </p:cNvPr>
@@ -50300,7 +50108,7 @@
           <p:cNvPr id="22" name="Elipse 21">
             <a:extLst>
               <a:ext uri="{FF2B5EF4-FFF2-40B4-BE49-F238E27FC236}">
-                <a16:creationId xmlns:a16="http://schemas.microsoft.com/office/drawing/2014/main" xmlns="" id="{9599B3CA-88E3-41C7-A84B-EB0AC84BA40B}"/>
+                <a16:creationId xmlns:a16="http://schemas.microsoft.com/office/drawing/2014/main" id="{9599B3CA-88E3-41C7-A84B-EB0AC84BA40B}"/>
               </a:ext>
             </a:extLst>
           </p:cNvPr>
@@ -50354,7 +50162,7 @@
           <p:cNvPr id="23" name="Elipse 22">
             <a:extLst>
               <a:ext uri="{FF2B5EF4-FFF2-40B4-BE49-F238E27FC236}">
-                <a16:creationId xmlns:a16="http://schemas.microsoft.com/office/drawing/2014/main" xmlns="" id="{1126791B-D06D-40DF-8FC6-BA7FFE15C395}"/>
+                <a16:creationId xmlns:a16="http://schemas.microsoft.com/office/drawing/2014/main" id="{1126791B-D06D-40DF-8FC6-BA7FFE15C395}"/>
               </a:ext>
             </a:extLst>
           </p:cNvPr>
@@ -50408,7 +50216,7 @@
           <p:cNvPr id="25" name="Elipse 24">
             <a:extLst>
               <a:ext uri="{FF2B5EF4-FFF2-40B4-BE49-F238E27FC236}">
-                <a16:creationId xmlns:a16="http://schemas.microsoft.com/office/drawing/2014/main" xmlns="" id="{5B609ADE-56B2-4E9C-8A53-053DC6FA52D8}"/>
+                <a16:creationId xmlns:a16="http://schemas.microsoft.com/office/drawing/2014/main" id="{5B609ADE-56B2-4E9C-8A53-053DC6FA52D8}"/>
               </a:ext>
             </a:extLst>
           </p:cNvPr>
@@ -50462,7 +50270,7 @@
           <p:cNvPr id="27" name="Elipse 26">
             <a:extLst>
               <a:ext uri="{FF2B5EF4-FFF2-40B4-BE49-F238E27FC236}">
-                <a16:creationId xmlns:a16="http://schemas.microsoft.com/office/drawing/2014/main" xmlns="" id="{1AA16F2B-758F-4E21-8F8F-4F90D93ED3FB}"/>
+                <a16:creationId xmlns:a16="http://schemas.microsoft.com/office/drawing/2014/main" id="{1AA16F2B-758F-4E21-8F8F-4F90D93ED3FB}"/>
               </a:ext>
             </a:extLst>
           </p:cNvPr>
@@ -50516,7 +50324,7 @@
           <p:cNvPr id="29" name="Elipse 28">
             <a:extLst>
               <a:ext uri="{FF2B5EF4-FFF2-40B4-BE49-F238E27FC236}">
-                <a16:creationId xmlns:a16="http://schemas.microsoft.com/office/drawing/2014/main" xmlns="" id="{2B2051D7-4C5F-4454-B50C-D64F52BE6006}"/>
+                <a16:creationId xmlns:a16="http://schemas.microsoft.com/office/drawing/2014/main" id="{2B2051D7-4C5F-4454-B50C-D64F52BE6006}"/>
               </a:ext>
             </a:extLst>
           </p:cNvPr>
@@ -50570,7 +50378,7 @@
           <p:cNvPr id="32" name="Flecha: hacia arriba 31">
             <a:extLst>
               <a:ext uri="{FF2B5EF4-FFF2-40B4-BE49-F238E27FC236}">
-                <a16:creationId xmlns:a16="http://schemas.microsoft.com/office/drawing/2014/main" xmlns="" id="{7BA44DC1-7914-4FE1-9886-F7E4776353CE}"/>
+                <a16:creationId xmlns:a16="http://schemas.microsoft.com/office/drawing/2014/main" id="{7BA44DC1-7914-4FE1-9886-F7E4776353CE}"/>
               </a:ext>
             </a:extLst>
           </p:cNvPr>
@@ -50624,7 +50432,7 @@
           <p:cNvPr id="33" name="Flecha: hacia arriba 32">
             <a:extLst>
               <a:ext uri="{FF2B5EF4-FFF2-40B4-BE49-F238E27FC236}">
-                <a16:creationId xmlns:a16="http://schemas.microsoft.com/office/drawing/2014/main" xmlns="" id="{7F5244B9-15F4-4842-A288-6E6FD305F329}"/>
+                <a16:creationId xmlns:a16="http://schemas.microsoft.com/office/drawing/2014/main" id="{7F5244B9-15F4-4842-A288-6E6FD305F329}"/>
               </a:ext>
             </a:extLst>
           </p:cNvPr>
@@ -50678,7 +50486,7 @@
           <p:cNvPr id="34" name="Flecha: doblada hacia arriba 33">
             <a:extLst>
               <a:ext uri="{FF2B5EF4-FFF2-40B4-BE49-F238E27FC236}">
-                <a16:creationId xmlns:a16="http://schemas.microsoft.com/office/drawing/2014/main" xmlns="" id="{BC1E695A-7C59-4A32-8A7C-A481EBDAB7A8}"/>
+                <a16:creationId xmlns:a16="http://schemas.microsoft.com/office/drawing/2014/main" id="{BC1E695A-7C59-4A32-8A7C-A481EBDAB7A8}"/>
               </a:ext>
             </a:extLst>
           </p:cNvPr>
@@ -50732,7 +50540,7 @@
           <p:cNvPr id="35" name="Flecha: doblada hacia arriba 34">
             <a:extLst>
               <a:ext uri="{FF2B5EF4-FFF2-40B4-BE49-F238E27FC236}">
-                <a16:creationId xmlns:a16="http://schemas.microsoft.com/office/drawing/2014/main" xmlns="" id="{BFF5D73A-1B29-4EB0-BF8B-A63BEB80DB26}"/>
+                <a16:creationId xmlns:a16="http://schemas.microsoft.com/office/drawing/2014/main" id="{BFF5D73A-1B29-4EB0-BF8B-A63BEB80DB26}"/>
               </a:ext>
             </a:extLst>
           </p:cNvPr>
@@ -50786,7 +50594,7 @@
           <p:cNvPr id="36" name="Flecha: doblada hacia arriba 35">
             <a:extLst>
               <a:ext uri="{FF2B5EF4-FFF2-40B4-BE49-F238E27FC236}">
-                <a16:creationId xmlns:a16="http://schemas.microsoft.com/office/drawing/2014/main" xmlns="" id="{77FDF8A2-43A7-4A71-B98E-E9BD4BD58C59}"/>
+                <a16:creationId xmlns:a16="http://schemas.microsoft.com/office/drawing/2014/main" id="{77FDF8A2-43A7-4A71-B98E-E9BD4BD58C59}"/>
               </a:ext>
             </a:extLst>
           </p:cNvPr>
@@ -50840,7 +50648,7 @@
           <p:cNvPr id="37" name="Flecha: doblada hacia arriba 36">
             <a:extLst>
               <a:ext uri="{FF2B5EF4-FFF2-40B4-BE49-F238E27FC236}">
-                <a16:creationId xmlns:a16="http://schemas.microsoft.com/office/drawing/2014/main" xmlns="" id="{37AF40E8-688D-4FE6-B510-355D80078D57}"/>
+                <a16:creationId xmlns:a16="http://schemas.microsoft.com/office/drawing/2014/main" id="{37AF40E8-688D-4FE6-B510-355D80078D57}"/>
               </a:ext>
             </a:extLst>
           </p:cNvPr>
@@ -50894,7 +50702,7 @@
           <p:cNvPr id="38" name="Elipse 37">
             <a:extLst>
               <a:ext uri="{FF2B5EF4-FFF2-40B4-BE49-F238E27FC236}">
-                <a16:creationId xmlns:a16="http://schemas.microsoft.com/office/drawing/2014/main" xmlns="" id="{7BB25BFF-A70E-4D1F-BFD1-F66246DAEA62}"/>
+                <a16:creationId xmlns:a16="http://schemas.microsoft.com/office/drawing/2014/main" id="{7BB25BFF-A70E-4D1F-BFD1-F66246DAEA62}"/>
               </a:ext>
             </a:extLst>
           </p:cNvPr>
@@ -50948,7 +50756,7 @@
           <p:cNvPr id="39" name="Elipse 38">
             <a:extLst>
               <a:ext uri="{FF2B5EF4-FFF2-40B4-BE49-F238E27FC236}">
-                <a16:creationId xmlns:a16="http://schemas.microsoft.com/office/drawing/2014/main" xmlns="" id="{98FF9945-2E0C-4C56-918A-14E3B4C2092B}"/>
+                <a16:creationId xmlns:a16="http://schemas.microsoft.com/office/drawing/2014/main" id="{98FF9945-2E0C-4C56-918A-14E3B4C2092B}"/>
               </a:ext>
             </a:extLst>
           </p:cNvPr>
@@ -51002,7 +50810,7 @@
           <p:cNvPr id="40" name="Elipse 39">
             <a:extLst>
               <a:ext uri="{FF2B5EF4-FFF2-40B4-BE49-F238E27FC236}">
-                <a16:creationId xmlns:a16="http://schemas.microsoft.com/office/drawing/2014/main" xmlns="" id="{20246CED-04AA-49DE-8FCB-FC8C973D0C46}"/>
+                <a16:creationId xmlns:a16="http://schemas.microsoft.com/office/drawing/2014/main" id="{20246CED-04AA-49DE-8FCB-FC8C973D0C46}"/>
               </a:ext>
             </a:extLst>
           </p:cNvPr>
@@ -51056,7 +50864,7 @@
           <p:cNvPr id="41" name="Flecha: doblada hacia arriba 40">
             <a:extLst>
               <a:ext uri="{FF2B5EF4-FFF2-40B4-BE49-F238E27FC236}">
-                <a16:creationId xmlns:a16="http://schemas.microsoft.com/office/drawing/2014/main" xmlns="" id="{FF6A3509-DA27-4DBE-8ABE-0AF98DBF2D32}"/>
+                <a16:creationId xmlns:a16="http://schemas.microsoft.com/office/drawing/2014/main" id="{FF6A3509-DA27-4DBE-8ABE-0AF98DBF2D32}"/>
               </a:ext>
             </a:extLst>
           </p:cNvPr>
@@ -51110,7 +50918,7 @@
           <p:cNvPr id="42" name="Elipse 41">
             <a:extLst>
               <a:ext uri="{FF2B5EF4-FFF2-40B4-BE49-F238E27FC236}">
-                <a16:creationId xmlns:a16="http://schemas.microsoft.com/office/drawing/2014/main" xmlns="" id="{DAB84F46-3731-4E1F-BAF0-AEB44696E247}"/>
+                <a16:creationId xmlns:a16="http://schemas.microsoft.com/office/drawing/2014/main" id="{DAB84F46-3731-4E1F-BAF0-AEB44696E247}"/>
               </a:ext>
             </a:extLst>
           </p:cNvPr>
@@ -51164,7 +50972,7 @@
           <p:cNvPr id="43" name="Flecha: doblada hacia arriba 42">
             <a:extLst>
               <a:ext uri="{FF2B5EF4-FFF2-40B4-BE49-F238E27FC236}">
-                <a16:creationId xmlns:a16="http://schemas.microsoft.com/office/drawing/2014/main" xmlns="" id="{5A9110BD-FE06-43E9-8EE9-5FC239C17204}"/>
+                <a16:creationId xmlns:a16="http://schemas.microsoft.com/office/drawing/2014/main" id="{5A9110BD-FE06-43E9-8EE9-5FC239C17204}"/>
               </a:ext>
             </a:extLst>
           </p:cNvPr>
@@ -51218,7 +51026,7 @@
           <p:cNvPr id="44" name="Elipse 43">
             <a:extLst>
               <a:ext uri="{FF2B5EF4-FFF2-40B4-BE49-F238E27FC236}">
-                <a16:creationId xmlns:a16="http://schemas.microsoft.com/office/drawing/2014/main" xmlns="" id="{7D559181-5EB9-4348-A846-71C7A3D3C0E9}"/>
+                <a16:creationId xmlns:a16="http://schemas.microsoft.com/office/drawing/2014/main" id="{7D559181-5EB9-4348-A846-71C7A3D3C0E9}"/>
               </a:ext>
             </a:extLst>
           </p:cNvPr>
@@ -51272,7 +51080,7 @@
           <p:cNvPr id="45" name="Elipse 44">
             <a:extLst>
               <a:ext uri="{FF2B5EF4-FFF2-40B4-BE49-F238E27FC236}">
-                <a16:creationId xmlns:a16="http://schemas.microsoft.com/office/drawing/2014/main" xmlns="" id="{B624F9B7-E176-446B-8BD6-69D4378B4B01}"/>
+                <a16:creationId xmlns:a16="http://schemas.microsoft.com/office/drawing/2014/main" id="{B624F9B7-E176-446B-8BD6-69D4378B4B01}"/>
               </a:ext>
             </a:extLst>
           </p:cNvPr>
@@ -51326,7 +51134,7 @@
           <p:cNvPr id="46" name="Flecha: doblada hacia arriba 45">
             <a:extLst>
               <a:ext uri="{FF2B5EF4-FFF2-40B4-BE49-F238E27FC236}">
-                <a16:creationId xmlns:a16="http://schemas.microsoft.com/office/drawing/2014/main" xmlns="" id="{B46BBD4C-986B-4A5B-9945-172F7A84DAD6}"/>
+                <a16:creationId xmlns:a16="http://schemas.microsoft.com/office/drawing/2014/main" id="{B46BBD4C-986B-4A5B-9945-172F7A84DAD6}"/>
               </a:ext>
             </a:extLst>
           </p:cNvPr>
@@ -51380,7 +51188,7 @@
           <p:cNvPr id="47" name="Elipse 46">
             <a:extLst>
               <a:ext uri="{FF2B5EF4-FFF2-40B4-BE49-F238E27FC236}">
-                <a16:creationId xmlns:a16="http://schemas.microsoft.com/office/drawing/2014/main" xmlns="" id="{44A51524-4A9E-4E5E-826D-78A627B5AA5F}"/>
+                <a16:creationId xmlns:a16="http://schemas.microsoft.com/office/drawing/2014/main" id="{44A51524-4A9E-4E5E-826D-78A627B5AA5F}"/>
               </a:ext>
             </a:extLst>
           </p:cNvPr>
@@ -51430,6 +51238,9 @@
         </p:txBody>
       </p:sp>
     </p:spTree>
+    <p:custDataLst>
+      <p:tags r:id="rId1"/>
+    </p:custDataLst>
     <p:extLst>
       <p:ext uri="{BB962C8B-B14F-4D97-AF65-F5344CB8AC3E}">
         <p14:creationId xmlns:p14="http://schemas.microsoft.com/office/powerpoint/2010/main" val="76555491"/>
@@ -51439,6 +51250,9 @@
   <p:clrMapOvr>
     <a:masterClrMapping/>
   </p:clrMapOvr>
+  <p:transition advTm="34489">
+    <p:fade thruBlk="1"/>
+  </p:transition>
   <p:timing>
     <p:tnLst>
       <p:par>
@@ -53164,6 +52978,78 @@
 </p:sld>
 </file>
 
+<file path=ppt/tags/tag1.xml><?xml version="1.0" encoding="utf-8"?>
+<p:tagLst xmlns:a="http://schemas.openxmlformats.org/drawingml/2006/main" xmlns:r="http://schemas.openxmlformats.org/officeDocument/2006/relationships" xmlns:p="http://schemas.openxmlformats.org/presentationml/2006/main">
+  <p:tag name="TIMING" val="|4|11.6|5.3|3.9|1.6|1.6|1.4|6.7"/>
+</p:tagLst>
+</file>
+
+<file path=ppt/tags/tag10.xml><?xml version="1.0" encoding="utf-8"?>
+<p:tagLst xmlns:a="http://schemas.openxmlformats.org/drawingml/2006/main" xmlns:r="http://schemas.openxmlformats.org/officeDocument/2006/relationships" xmlns:p="http://schemas.openxmlformats.org/presentationml/2006/main">
+  <p:tag name="TIMING" val="|8.1"/>
+</p:tagLst>
+</file>
+
+<file path=ppt/tags/tag11.xml><?xml version="1.0" encoding="utf-8"?>
+<p:tagLst xmlns:a="http://schemas.openxmlformats.org/drawingml/2006/main" xmlns:r="http://schemas.openxmlformats.org/officeDocument/2006/relationships" xmlns:p="http://schemas.openxmlformats.org/presentationml/2006/main">
+  <p:tag name="TIMING" val="|0.6|4.3|4.7|3.5|5.6"/>
+</p:tagLst>
+</file>
+
+<file path=ppt/tags/tag12.xml><?xml version="1.0" encoding="utf-8"?>
+<p:tagLst xmlns:a="http://schemas.openxmlformats.org/drawingml/2006/main" xmlns:r="http://schemas.openxmlformats.org/officeDocument/2006/relationships" xmlns:p="http://schemas.openxmlformats.org/presentationml/2006/main">
+  <p:tag name="TIMING" val="|0|4.2|2.6|4.3"/>
+</p:tagLst>
+</file>
+
+<file path=ppt/tags/tag2.xml><?xml version="1.0" encoding="utf-8"?>
+<p:tagLst xmlns:a="http://schemas.openxmlformats.org/drawingml/2006/main" xmlns:r="http://schemas.openxmlformats.org/officeDocument/2006/relationships" xmlns:p="http://schemas.openxmlformats.org/presentationml/2006/main">
+  <p:tag name="TIMING" val="|8.5|1.2|0.4|6.2|2.9|11.3|0.7|7.1|0.5|9.2"/>
+</p:tagLst>
+</file>
+
+<file path=ppt/tags/tag3.xml><?xml version="1.0" encoding="utf-8"?>
+<p:tagLst xmlns:a="http://schemas.openxmlformats.org/drawingml/2006/main" xmlns:r="http://schemas.openxmlformats.org/officeDocument/2006/relationships" xmlns:p="http://schemas.openxmlformats.org/presentationml/2006/main">
+  <p:tag name="TIMING" val="|5.1|2.1|1.8|1.3|1.7|1.1|0.8|1|0.6"/>
+</p:tagLst>
+</file>
+
+<file path=ppt/tags/tag4.xml><?xml version="1.0" encoding="utf-8"?>
+<p:tagLst xmlns:a="http://schemas.openxmlformats.org/drawingml/2006/main" xmlns:r="http://schemas.openxmlformats.org/officeDocument/2006/relationships" xmlns:p="http://schemas.openxmlformats.org/presentationml/2006/main">
+  <p:tag name="TIMING" val="|3.4|1.8|0.8|0.9|1.5|2|1.4|1.2|1.4|5.1|1.8|4.8|4.4|2.6"/>
+</p:tagLst>
+</file>
+
+<file path=ppt/tags/tag5.xml><?xml version="1.0" encoding="utf-8"?>
+<p:tagLst xmlns:a="http://schemas.openxmlformats.org/drawingml/2006/main" xmlns:r="http://schemas.openxmlformats.org/officeDocument/2006/relationships" xmlns:p="http://schemas.openxmlformats.org/presentationml/2006/main">
+  <p:tag name="TIMING" val="|4|5.6|4.5"/>
+</p:tagLst>
+</file>
+
+<file path=ppt/tags/tag6.xml><?xml version="1.0" encoding="utf-8"?>
+<p:tagLst xmlns:a="http://schemas.openxmlformats.org/drawingml/2006/main" xmlns:r="http://schemas.openxmlformats.org/officeDocument/2006/relationships" xmlns:p="http://schemas.openxmlformats.org/presentationml/2006/main">
+  <p:tag name="TIMING" val="|2.3|8.4|4.7|4.4|8.8"/>
+</p:tagLst>
+</file>
+
+<file path=ppt/tags/tag7.xml><?xml version="1.0" encoding="utf-8"?>
+<p:tagLst xmlns:a="http://schemas.openxmlformats.org/drawingml/2006/main" xmlns:r="http://schemas.openxmlformats.org/officeDocument/2006/relationships" xmlns:p="http://schemas.openxmlformats.org/presentationml/2006/main">
+  <p:tag name="TIMING" val="|1.4"/>
+</p:tagLst>
+</file>
+
+<file path=ppt/tags/tag8.xml><?xml version="1.0" encoding="utf-8"?>
+<p:tagLst xmlns:a="http://schemas.openxmlformats.org/drawingml/2006/main" xmlns:r="http://schemas.openxmlformats.org/officeDocument/2006/relationships" xmlns:p="http://schemas.openxmlformats.org/presentationml/2006/main">
+  <p:tag name="TIMING" val="|3.7"/>
+</p:tagLst>
+</file>
+
+<file path=ppt/tags/tag9.xml><?xml version="1.0" encoding="utf-8"?>
+<p:tagLst xmlns:a="http://schemas.openxmlformats.org/drawingml/2006/main" xmlns:r="http://schemas.openxmlformats.org/officeDocument/2006/relationships" xmlns:p="http://schemas.openxmlformats.org/presentationml/2006/main">
+  <p:tag name="TIMING" val="|3.6"/>
+</p:tagLst>
+</file>
+
 <file path=ppt/theme/theme1.xml><?xml version="1.0" encoding="utf-8"?>
 <a:theme xmlns:a="http://schemas.openxmlformats.org/drawingml/2006/main" name="Viola template">
   <a:themeElements>

</xml_diff>